<commit_message>
Update duak versus multi server text and diagram
</commit_message>
<xml_diff>
--- a/src/Planning/Illustrations.pptx
+++ b/src/Planning/Illustrations.pptx
@@ -117,7 +117,7 @@
 <file path=ppt/revisionInfo.xml><?xml version="1.0" encoding="utf-8"?>
 <p1510:revInfo xmlns:a="http://schemas.openxmlformats.org/drawingml/2006/main" xmlns:r="http://schemas.openxmlformats.org/officeDocument/2006/relationships" xmlns:p1510="http://schemas.microsoft.com/office/powerpoint/2015/10/main">
   <p1510:revLst>
-    <p1510:client id="{BCAB1FCD-C6E0-4904-9922-531ED0D800C6}" v="315" dt="2018-07-11T16:32:02.311"/>
+    <p1510:client id="{BCAB1FCD-C6E0-4904-9922-531ED0D800C6}" v="427" dt="2018-07-13T17:18:40.240"/>
   </p1510:revLst>
 </p1510:revInfo>
 </file>
@@ -126,8 +126,8 @@
 <pc:chgInfo xmlns:a="http://schemas.openxmlformats.org/drawingml/2006/main" xmlns:r="http://schemas.openxmlformats.org/officeDocument/2006/relationships" xmlns:ac="http://schemas.microsoft.com/office/drawing/2013/main/command" xmlns:pc="http://schemas.microsoft.com/office/powerpoint/2013/main/command">
   <pc:docChgLst>
     <pc:chgData name="Willy-Peter Schaub" userId="707b42e47e16ca84" providerId="LiveId" clId="{BCAB1FCD-C6E0-4904-9922-531ED0D800C6}"/>
-    <pc:docChg chg="undo custSel addSld modSld">
-      <pc:chgData name="Willy-Peter Schaub" userId="707b42e47e16ca84" providerId="LiveId" clId="{BCAB1FCD-C6E0-4904-9922-531ED0D800C6}" dt="2018-07-11T16:32:02.311" v="314" actId="1076"/>
+    <pc:docChg chg="undo custSel addSld delSld modSld">
+      <pc:chgData name="Willy-Peter Schaub" userId="707b42e47e16ca84" providerId="LiveId" clId="{BCAB1FCD-C6E0-4904-9922-531ED0D800C6}" dt="2018-07-13T17:18:40.240" v="426" actId="166"/>
       <pc:docMkLst>
         <pc:docMk/>
       </pc:docMkLst>
@@ -306,7 +306,7 @@
         </pc:grpChg>
       </pc:sldChg>
       <pc:sldChg chg="addSp delSp modSp add">
-        <pc:chgData name="Willy-Peter Schaub" userId="707b42e47e16ca84" providerId="LiveId" clId="{BCAB1FCD-C6E0-4904-9922-531ED0D800C6}" dt="2018-07-11T16:32:02.311" v="314" actId="1076"/>
+        <pc:chgData name="Willy-Peter Schaub" userId="707b42e47e16ca84" providerId="LiveId" clId="{BCAB1FCD-C6E0-4904-9922-531ED0D800C6}" dt="2018-07-13T17:18:40.240" v="426" actId="166"/>
         <pc:sldMkLst>
           <pc:docMk/>
           <pc:sldMk cId="1004767918" sldId="258"/>
@@ -320,7 +320,7 @@
           </ac:spMkLst>
         </pc:spChg>
         <pc:spChg chg="add mod">
-          <ac:chgData name="Willy-Peter Schaub" userId="707b42e47e16ca84" providerId="LiveId" clId="{BCAB1FCD-C6E0-4904-9922-531ED0D800C6}" dt="2018-07-11T16:29:26.017" v="258" actId="1076"/>
+          <ac:chgData name="Willy-Peter Schaub" userId="707b42e47e16ca84" providerId="LiveId" clId="{BCAB1FCD-C6E0-4904-9922-531ED0D800C6}" dt="2018-07-13T17:13:24.567" v="358" actId="20577"/>
           <ac:spMkLst>
             <pc:docMk/>
             <pc:sldMk cId="1004767918" sldId="258"/>
@@ -343,6 +343,22 @@
             <ac:spMk id="8" creationId="{AB1D389E-DFB1-4A58-9FC2-0930FA26F126}"/>
           </ac:spMkLst>
         </pc:spChg>
+        <pc:spChg chg="add mod ord">
+          <ac:chgData name="Willy-Peter Schaub" userId="707b42e47e16ca84" providerId="LiveId" clId="{BCAB1FCD-C6E0-4904-9922-531ED0D800C6}" dt="2018-07-13T17:16:23.443" v="395" actId="1076"/>
+          <ac:spMkLst>
+            <pc:docMk/>
+            <pc:sldMk cId="1004767918" sldId="258"/>
+            <ac:spMk id="9" creationId="{45FE0AEE-21E3-46F3-9237-DED8682EF883}"/>
+          </ac:spMkLst>
+        </pc:spChg>
+        <pc:spChg chg="add mod">
+          <ac:chgData name="Willy-Peter Schaub" userId="707b42e47e16ca84" providerId="LiveId" clId="{BCAB1FCD-C6E0-4904-9922-531ED0D800C6}" dt="2018-07-13T17:18:32.064" v="423" actId="208"/>
+          <ac:spMkLst>
+            <pc:docMk/>
+            <pc:sldMk cId="1004767918" sldId="258"/>
+            <ac:spMk id="10" creationId="{53646253-7167-44B1-B2F1-D30A4BBE4AEF}"/>
+          </ac:spMkLst>
+        </pc:spChg>
         <pc:spChg chg="add del mod">
           <ac:chgData name="Willy-Peter Schaub" userId="707b42e47e16ca84" providerId="LiveId" clId="{BCAB1FCD-C6E0-4904-9922-531ED0D800C6}" dt="2018-07-11T16:31:38.719" v="305" actId="478"/>
           <ac:spMkLst>
@@ -351,20 +367,164 @@
             <ac:spMk id="11" creationId="{2F9716E4-544C-46C0-8B88-FE8FA999C424}"/>
           </ac:spMkLst>
         </pc:spChg>
+        <pc:spChg chg="add del mod">
+          <ac:chgData name="Willy-Peter Schaub" userId="707b42e47e16ca84" providerId="LiveId" clId="{BCAB1FCD-C6E0-4904-9922-531ED0D800C6}" dt="2018-07-13T17:12:58.122" v="337"/>
+          <ac:spMkLst>
+            <pc:docMk/>
+            <pc:sldMk cId="1004767918" sldId="258"/>
+            <ac:spMk id="12" creationId="{B80D3410-1BC6-4E2B-9A40-B66BDE61FCA2}"/>
+          </ac:spMkLst>
+        </pc:spChg>
+        <pc:spChg chg="add del mod">
+          <ac:chgData name="Willy-Peter Schaub" userId="707b42e47e16ca84" providerId="LiveId" clId="{BCAB1FCD-C6E0-4904-9922-531ED0D800C6}" dt="2018-07-13T17:12:58.122" v="337"/>
+          <ac:spMkLst>
+            <pc:docMk/>
+            <pc:sldMk cId="1004767918" sldId="258"/>
+            <ac:spMk id="13" creationId="{24764FCC-57FD-4DBC-BC5E-A866EBD4D0D9}"/>
+          </ac:spMkLst>
+        </pc:spChg>
+        <pc:spChg chg="add del mod">
+          <ac:chgData name="Willy-Peter Schaub" userId="707b42e47e16ca84" providerId="LiveId" clId="{BCAB1FCD-C6E0-4904-9922-531ED0D800C6}" dt="2018-07-13T17:12:58.122" v="337"/>
+          <ac:spMkLst>
+            <pc:docMk/>
+            <pc:sldMk cId="1004767918" sldId="258"/>
+            <ac:spMk id="14" creationId="{D9151CAE-F5BE-41CC-BF75-B86D40DC3DB8}"/>
+          </ac:spMkLst>
+        </pc:spChg>
+        <pc:spChg chg="add del mod">
+          <ac:chgData name="Willy-Peter Schaub" userId="707b42e47e16ca84" providerId="LiveId" clId="{BCAB1FCD-C6E0-4904-9922-531ED0D800C6}" dt="2018-07-13T17:12:58.122" v="337"/>
+          <ac:spMkLst>
+            <pc:docMk/>
+            <pc:sldMk cId="1004767918" sldId="258"/>
+            <ac:spMk id="15" creationId="{C1596F56-041B-47D7-8F64-C90A4F36D059}"/>
+          </ac:spMkLst>
+        </pc:spChg>
+        <pc:spChg chg="add del mod">
+          <ac:chgData name="Willy-Peter Schaub" userId="707b42e47e16ca84" providerId="LiveId" clId="{BCAB1FCD-C6E0-4904-9922-531ED0D800C6}" dt="2018-07-13T17:12:58.122" v="337"/>
+          <ac:spMkLst>
+            <pc:docMk/>
+            <pc:sldMk cId="1004767918" sldId="258"/>
+            <ac:spMk id="16" creationId="{31DE5705-2BBC-4809-ADFF-579A3BE24C74}"/>
+          </ac:spMkLst>
+        </pc:spChg>
         <pc:spChg chg="add mod">
-          <ac:chgData name="Willy-Peter Schaub" userId="707b42e47e16ca84" providerId="LiveId" clId="{BCAB1FCD-C6E0-4904-9922-531ED0D800C6}" dt="2018-07-11T16:31:51.052" v="309" actId="1076"/>
+          <ac:chgData name="Willy-Peter Schaub" userId="707b42e47e16ca84" providerId="LiveId" clId="{BCAB1FCD-C6E0-4904-9922-531ED0D800C6}" dt="2018-07-13T17:13:40.602" v="359" actId="1076"/>
+          <ac:spMkLst>
+            <pc:docMk/>
+            <pc:sldMk cId="1004767918" sldId="258"/>
+            <ac:spMk id="19" creationId="{661D991E-A8E3-4BF6-B922-072FFF817D58}"/>
+          </ac:spMkLst>
+        </pc:spChg>
+        <pc:spChg chg="add del mod">
+          <ac:chgData name="Willy-Peter Schaub" userId="707b42e47e16ca84" providerId="LiveId" clId="{BCAB1FCD-C6E0-4904-9922-531ED0D800C6}" dt="2018-07-13T17:13:09.836" v="340" actId="478"/>
+          <ac:spMkLst>
+            <pc:docMk/>
+            <pc:sldMk cId="1004767918" sldId="258"/>
+            <ac:spMk id="20" creationId="{1E364BCF-870F-417C-B488-03F03B0DCC3E}"/>
+          </ac:spMkLst>
+        </pc:spChg>
+        <pc:spChg chg="add del mod">
+          <ac:chgData name="Willy-Peter Schaub" userId="707b42e47e16ca84" providerId="LiveId" clId="{BCAB1FCD-C6E0-4904-9922-531ED0D800C6}" dt="2018-07-13T17:13:13.463" v="342" actId="478"/>
           <ac:spMkLst>
             <pc:docMk/>
             <pc:sldMk cId="1004767918" sldId="258"/>
             <ac:spMk id="21" creationId="{A988BB02-25DF-47BA-A3EB-212DD3DBAAA6}"/>
           </ac:spMkLst>
         </pc:spChg>
-        <pc:spChg chg="add mod">
-          <ac:chgData name="Willy-Peter Schaub" userId="707b42e47e16ca84" providerId="LiveId" clId="{BCAB1FCD-C6E0-4904-9922-531ED0D800C6}" dt="2018-07-11T16:32:02.311" v="314" actId="1076"/>
+        <pc:spChg chg="add del mod">
+          <ac:chgData name="Willy-Peter Schaub" userId="707b42e47e16ca84" providerId="LiveId" clId="{BCAB1FCD-C6E0-4904-9922-531ED0D800C6}" dt="2018-07-13T17:13:12.696" v="341" actId="478"/>
           <ac:spMkLst>
             <pc:docMk/>
             <pc:sldMk cId="1004767918" sldId="258"/>
             <ac:spMk id="22" creationId="{2668471B-1D2A-487C-A7F6-18D22DD7745C}"/>
+          </ac:spMkLst>
+        </pc:spChg>
+        <pc:spChg chg="add del mod">
+          <ac:chgData name="Willy-Peter Schaub" userId="707b42e47e16ca84" providerId="LiveId" clId="{BCAB1FCD-C6E0-4904-9922-531ED0D800C6}" dt="2018-07-13T17:13:09.836" v="340" actId="478"/>
+          <ac:spMkLst>
+            <pc:docMk/>
+            <pc:sldMk cId="1004767918" sldId="258"/>
+            <ac:spMk id="23" creationId="{72251EC3-3953-4D5F-93EF-B7214034CEBE}"/>
+          </ac:spMkLst>
+        </pc:spChg>
+        <pc:spChg chg="add mod">
+          <ac:chgData name="Willy-Peter Schaub" userId="707b42e47e16ca84" providerId="LiveId" clId="{BCAB1FCD-C6E0-4904-9922-531ED0D800C6}" dt="2018-07-13T17:17:43.928" v="413" actId="1076"/>
+          <ac:spMkLst>
+            <pc:docMk/>
+            <pc:sldMk cId="1004767918" sldId="258"/>
+            <ac:spMk id="24" creationId="{86313812-FD22-48FF-A13C-D499E79E8BDD}"/>
+          </ac:spMkLst>
+        </pc:spChg>
+        <pc:spChg chg="add mod">
+          <ac:chgData name="Willy-Peter Schaub" userId="707b42e47e16ca84" providerId="LiveId" clId="{BCAB1FCD-C6E0-4904-9922-531ED0D800C6}" dt="2018-07-13T17:17:43.928" v="413" actId="1076"/>
+          <ac:spMkLst>
+            <pc:docMk/>
+            <pc:sldMk cId="1004767918" sldId="258"/>
+            <ac:spMk id="25" creationId="{7DA156EE-C2E7-4676-B84C-B1897B6EE61A}"/>
+          </ac:spMkLst>
+        </pc:spChg>
+        <pc:spChg chg="add del mod ord">
+          <ac:chgData name="Willy-Peter Schaub" userId="707b42e47e16ca84" providerId="LiveId" clId="{BCAB1FCD-C6E0-4904-9922-531ED0D800C6}" dt="2018-07-13T17:15:44.771" v="384" actId="478"/>
+          <ac:spMkLst>
+            <pc:docMk/>
+            <pc:sldMk cId="1004767918" sldId="258"/>
+            <ac:spMk id="26" creationId="{D7493103-F84B-4B2C-BED2-A77B93574EF5}"/>
+          </ac:spMkLst>
+        </pc:spChg>
+        <pc:spChg chg="add del mod">
+          <ac:chgData name="Willy-Peter Schaub" userId="707b42e47e16ca84" providerId="LiveId" clId="{BCAB1FCD-C6E0-4904-9922-531ED0D800C6}" dt="2018-07-13T17:16:15.121" v="394" actId="478"/>
+          <ac:spMkLst>
+            <pc:docMk/>
+            <pc:sldMk cId="1004767918" sldId="258"/>
+            <ac:spMk id="27" creationId="{DF36E5FD-3D03-40CC-B87B-4C475B5B81E9}"/>
+          </ac:spMkLst>
+        </pc:spChg>
+        <pc:spChg chg="add mod ord">
+          <ac:chgData name="Willy-Peter Schaub" userId="707b42e47e16ca84" providerId="LiveId" clId="{BCAB1FCD-C6E0-4904-9922-531ED0D800C6}" dt="2018-07-13T17:16:31.430" v="398" actId="167"/>
+          <ac:spMkLst>
+            <pc:docMk/>
+            <pc:sldMk cId="1004767918" sldId="258"/>
+            <ac:spMk id="28" creationId="{F46C9C2E-03AB-4609-AC7C-E311F5360658}"/>
+          </ac:spMkLst>
+        </pc:spChg>
+        <pc:spChg chg="add mod ord">
+          <ac:chgData name="Willy-Peter Schaub" userId="707b42e47e16ca84" providerId="LiveId" clId="{BCAB1FCD-C6E0-4904-9922-531ED0D800C6}" dt="2018-07-13T17:16:37.392" v="401" actId="167"/>
+          <ac:spMkLst>
+            <pc:docMk/>
+            <pc:sldMk cId="1004767918" sldId="258"/>
+            <ac:spMk id="29" creationId="{C1E5DD80-9DDB-49BC-AC06-45F7862D1E9A}"/>
+          </ac:spMkLst>
+        </pc:spChg>
+        <pc:spChg chg="add mod ord">
+          <ac:chgData name="Willy-Peter Schaub" userId="707b42e47e16ca84" providerId="LiveId" clId="{BCAB1FCD-C6E0-4904-9922-531ED0D800C6}" dt="2018-07-13T17:16:48.840" v="404" actId="167"/>
+          <ac:spMkLst>
+            <pc:docMk/>
+            <pc:sldMk cId="1004767918" sldId="258"/>
+            <ac:spMk id="30" creationId="{64403DCA-A631-415A-BDFD-D0C7D9DE37CF}"/>
+          </ac:spMkLst>
+        </pc:spChg>
+        <pc:spChg chg="add mod ord">
+          <ac:chgData name="Willy-Peter Schaub" userId="707b42e47e16ca84" providerId="LiveId" clId="{BCAB1FCD-C6E0-4904-9922-531ED0D800C6}" dt="2018-07-13T17:16:48.840" v="404" actId="167"/>
+          <ac:spMkLst>
+            <pc:docMk/>
+            <pc:sldMk cId="1004767918" sldId="258"/>
+            <ac:spMk id="31" creationId="{3835CF37-40DA-42B5-96B9-AC7DCD7A7542}"/>
+          </ac:spMkLst>
+        </pc:spChg>
+        <pc:spChg chg="add mod ord">
+          <ac:chgData name="Willy-Peter Schaub" userId="707b42e47e16ca84" providerId="LiveId" clId="{BCAB1FCD-C6E0-4904-9922-531ED0D800C6}" dt="2018-07-13T17:17:04.304" v="405" actId="166"/>
+          <ac:spMkLst>
+            <pc:docMk/>
+            <pc:sldMk cId="1004767918" sldId="258"/>
+            <ac:spMk id="32" creationId="{C7A697F2-9467-499B-8F9A-7086888540A0}"/>
+          </ac:spMkLst>
+        </pc:spChg>
+        <pc:spChg chg="add mod">
+          <ac:chgData name="Willy-Peter Schaub" userId="707b42e47e16ca84" providerId="LiveId" clId="{BCAB1FCD-C6E0-4904-9922-531ED0D800C6}" dt="2018-07-13T17:18:35.887" v="425" actId="1076"/>
+          <ac:spMkLst>
+            <pc:docMk/>
+            <pc:sldMk cId="1004767918" sldId="258"/>
+            <ac:spMk id="33" creationId="{11C97EDE-6312-4B03-99CE-D834205F461F}"/>
           </ac:spMkLst>
         </pc:spChg>
         <pc:picChg chg="add mod">
@@ -407,6 +567,14 @@
             <ac:picMk id="10" creationId="{0EC9637C-3DC3-4492-9FE2-ADCF9B58B970}"/>
           </ac:picMkLst>
         </pc:picChg>
+        <pc:picChg chg="add del mod">
+          <ac:chgData name="Willy-Peter Schaub" userId="707b42e47e16ca84" providerId="LiveId" clId="{BCAB1FCD-C6E0-4904-9922-531ED0D800C6}" dt="2018-07-13T17:12:58.122" v="337"/>
+          <ac:picMkLst>
+            <pc:docMk/>
+            <pc:sldMk cId="1004767918" sldId="258"/>
+            <ac:picMk id="11" creationId="{97D7480E-ABFD-4877-BCF1-5B27E9314766}"/>
+          </ac:picMkLst>
+        </pc:picChg>
         <pc:picChg chg="add del mod ord">
           <ac:chgData name="Willy-Peter Schaub" userId="707b42e47e16ca84" providerId="LiveId" clId="{BCAB1FCD-C6E0-4904-9922-531ED0D800C6}" dt="2018-07-11T16:30:53.742" v="293" actId="478"/>
           <ac:picMkLst>
@@ -447,6 +615,14 @@
             <ac:picMk id="16" creationId="{7DD304C5-0163-4F83-AF0C-F9FF6A99F834}"/>
           </ac:picMkLst>
         </pc:picChg>
+        <pc:picChg chg="add mod ord">
+          <ac:chgData name="Willy-Peter Schaub" userId="707b42e47e16ca84" providerId="LiveId" clId="{BCAB1FCD-C6E0-4904-9922-531ED0D800C6}" dt="2018-07-13T17:18:40.240" v="426" actId="166"/>
+          <ac:picMkLst>
+            <pc:docMk/>
+            <pc:sldMk cId="1004767918" sldId="258"/>
+            <ac:picMk id="17" creationId="{148169F0-3D2D-4F32-8BB2-637A583D16E0}"/>
+          </ac:picMkLst>
+        </pc:picChg>
         <pc:picChg chg="add del mod">
           <ac:chgData name="Willy-Peter Schaub" userId="707b42e47e16ca84" providerId="LiveId" clId="{BCAB1FCD-C6E0-4904-9922-531ED0D800C6}" dt="2018-07-11T16:31:37.093" v="304" actId="478"/>
           <ac:picMkLst>
@@ -461,6 +637,14 @@
             <pc:docMk/>
             <pc:sldMk cId="1004767918" sldId="258"/>
             <ac:picMk id="18" creationId="{DDB01B90-FC77-4354-BA36-0B960F38157A}"/>
+          </ac:picMkLst>
+        </pc:picChg>
+        <pc:picChg chg="add mod ord">
+          <ac:chgData name="Willy-Peter Schaub" userId="707b42e47e16ca84" providerId="LiveId" clId="{BCAB1FCD-C6E0-4904-9922-531ED0D800C6}" dt="2018-07-13T17:18:40.240" v="426" actId="166"/>
+          <ac:picMkLst>
+            <pc:docMk/>
+            <pc:sldMk cId="1004767918" sldId="258"/>
+            <ac:picMk id="18" creationId="{875197FA-1B3E-4364-9DF7-ABBF22D92697}"/>
           </ac:picMkLst>
         </pc:picChg>
         <pc:picChg chg="add del">
@@ -479,6 +663,29 @@
             <ac:picMk id="20" creationId="{3E86917C-7C99-4C6F-B76E-555AC84E05D8}"/>
           </ac:picMkLst>
         </pc:picChg>
+      </pc:sldChg>
+      <pc:sldChg chg="addSp modSp add del">
+        <pc:chgData name="Willy-Peter Schaub" userId="707b42e47e16ca84" providerId="LiveId" clId="{BCAB1FCD-C6E0-4904-9922-531ED0D800C6}" dt="2018-07-13T16:42:06.547" v="333" actId="2696"/>
+        <pc:sldMkLst>
+          <pc:docMk/>
+          <pc:sldMk cId="422116786" sldId="259"/>
+        </pc:sldMkLst>
+        <pc:spChg chg="add mod">
+          <ac:chgData name="Willy-Peter Schaub" userId="707b42e47e16ca84" providerId="LiveId" clId="{BCAB1FCD-C6E0-4904-9922-531ED0D800C6}" dt="2018-07-13T16:41:52.830" v="330" actId="1076"/>
+          <ac:spMkLst>
+            <pc:docMk/>
+            <pc:sldMk cId="422116786" sldId="259"/>
+            <ac:spMk id="2" creationId="{C91F0BB5-DF17-4EDF-A974-9AF813A12DF3}"/>
+          </ac:spMkLst>
+        </pc:spChg>
+        <pc:spChg chg="add mod">
+          <ac:chgData name="Willy-Peter Schaub" userId="707b42e47e16ca84" providerId="LiveId" clId="{BCAB1FCD-C6E0-4904-9922-531ED0D800C6}" dt="2018-07-13T16:41:58.940" v="332" actId="1076"/>
+          <ac:spMkLst>
+            <pc:docMk/>
+            <pc:sldMk cId="422116786" sldId="259"/>
+            <ac:spMk id="3" creationId="{1C5D38ED-972B-47A3-8CEE-A25923A66297}"/>
+          </ac:spMkLst>
+        </pc:spChg>
       </pc:sldChg>
     </pc:docChg>
   </pc:docChgLst>
@@ -634,7 +841,7 @@
           <a:p>
             <a:fld id="{CC509A15-3992-46FA-B277-442CE81F42DA}" type="datetimeFigureOut">
               <a:rPr lang="en-CA" smtClean="0"/>
-              <a:t>2018-07-11</a:t>
+              <a:t>2018-07-13</a:t>
             </a:fld>
             <a:endParaRPr lang="en-CA"/>
           </a:p>
@@ -834,7 +1041,7 @@
           <a:p>
             <a:fld id="{CC509A15-3992-46FA-B277-442CE81F42DA}" type="datetimeFigureOut">
               <a:rPr lang="en-CA" smtClean="0"/>
-              <a:t>2018-07-11</a:t>
+              <a:t>2018-07-13</a:t>
             </a:fld>
             <a:endParaRPr lang="en-CA"/>
           </a:p>
@@ -1044,7 +1251,7 @@
           <a:p>
             <a:fld id="{CC509A15-3992-46FA-B277-442CE81F42DA}" type="datetimeFigureOut">
               <a:rPr lang="en-CA" smtClean="0"/>
-              <a:t>2018-07-11</a:t>
+              <a:t>2018-07-13</a:t>
             </a:fld>
             <a:endParaRPr lang="en-CA"/>
           </a:p>
@@ -1244,7 +1451,7 @@
           <a:p>
             <a:fld id="{CC509A15-3992-46FA-B277-442CE81F42DA}" type="datetimeFigureOut">
               <a:rPr lang="en-CA" smtClean="0"/>
-              <a:t>2018-07-11</a:t>
+              <a:t>2018-07-13</a:t>
             </a:fld>
             <a:endParaRPr lang="en-CA"/>
           </a:p>
@@ -1520,7 +1727,7 @@
           <a:p>
             <a:fld id="{CC509A15-3992-46FA-B277-442CE81F42DA}" type="datetimeFigureOut">
               <a:rPr lang="en-CA" smtClean="0"/>
-              <a:t>2018-07-11</a:t>
+              <a:t>2018-07-13</a:t>
             </a:fld>
             <a:endParaRPr lang="en-CA"/>
           </a:p>
@@ -1788,7 +1995,7 @@
           <a:p>
             <a:fld id="{CC509A15-3992-46FA-B277-442CE81F42DA}" type="datetimeFigureOut">
               <a:rPr lang="en-CA" smtClean="0"/>
-              <a:t>2018-07-11</a:t>
+              <a:t>2018-07-13</a:t>
             </a:fld>
             <a:endParaRPr lang="en-CA"/>
           </a:p>
@@ -2203,7 +2410,7 @@
           <a:p>
             <a:fld id="{CC509A15-3992-46FA-B277-442CE81F42DA}" type="datetimeFigureOut">
               <a:rPr lang="en-CA" smtClean="0"/>
-              <a:t>2018-07-11</a:t>
+              <a:t>2018-07-13</a:t>
             </a:fld>
             <a:endParaRPr lang="en-CA"/>
           </a:p>
@@ -2345,7 +2552,7 @@
           <a:p>
             <a:fld id="{CC509A15-3992-46FA-B277-442CE81F42DA}" type="datetimeFigureOut">
               <a:rPr lang="en-CA" smtClean="0"/>
-              <a:t>2018-07-11</a:t>
+              <a:t>2018-07-13</a:t>
             </a:fld>
             <a:endParaRPr lang="en-CA"/>
           </a:p>
@@ -2458,7 +2665,7 @@
           <a:p>
             <a:fld id="{CC509A15-3992-46FA-B277-442CE81F42DA}" type="datetimeFigureOut">
               <a:rPr lang="en-CA" smtClean="0"/>
-              <a:t>2018-07-11</a:t>
+              <a:t>2018-07-13</a:t>
             </a:fld>
             <a:endParaRPr lang="en-CA"/>
           </a:p>
@@ -2771,7 +2978,7 @@
           <a:p>
             <a:fld id="{CC509A15-3992-46FA-B277-442CE81F42DA}" type="datetimeFigureOut">
               <a:rPr lang="en-CA" smtClean="0"/>
-              <a:t>2018-07-11</a:t>
+              <a:t>2018-07-13</a:t>
             </a:fld>
             <a:endParaRPr lang="en-CA"/>
           </a:p>
@@ -3060,7 +3267,7 @@
           <a:p>
             <a:fld id="{CC509A15-3992-46FA-B277-442CE81F42DA}" type="datetimeFigureOut">
               <a:rPr lang="en-CA" smtClean="0"/>
-              <a:t>2018-07-11</a:t>
+              <a:t>2018-07-13</a:t>
             </a:fld>
             <a:endParaRPr lang="en-CA"/>
           </a:p>
@@ -3303,7 +3510,7 @@
           <a:p>
             <a:fld id="{CC509A15-3992-46FA-B277-442CE81F42DA}" type="datetimeFigureOut">
               <a:rPr lang="en-CA" smtClean="0"/>
-              <a:t>2018-07-11</a:t>
+              <a:t>2018-07-13</a:t>
             </a:fld>
             <a:endParaRPr lang="en-CA"/>
           </a:p>
@@ -5216,6 +5423,230 @@
           <a:chExt cx="0" cy="0"/>
         </a:xfrm>
       </p:grpSpPr>
+      <p:sp>
+        <p:nvSpPr>
+          <p:cNvPr id="30" name="Rectangle: Rounded Corners 29">
+            <a:extLst>
+              <a:ext uri="{FF2B5EF4-FFF2-40B4-BE49-F238E27FC236}">
+                <a16:creationId xmlns:a16="http://schemas.microsoft.com/office/drawing/2014/main" id="{64403DCA-A631-415A-BDFD-D0C7D9DE37CF}"/>
+              </a:ext>
+            </a:extLst>
+          </p:cNvPr>
+          <p:cNvSpPr/>
+          <p:nvPr/>
+        </p:nvSpPr>
+        <p:spPr>
+          <a:xfrm>
+            <a:off x="8178306" y="1913831"/>
+            <a:ext cx="559545" cy="1307623"/>
+          </a:xfrm>
+          <a:prstGeom prst="roundRect">
+            <a:avLst>
+              <a:gd name="adj" fmla="val 10906"/>
+            </a:avLst>
+          </a:prstGeom>
+          <a:solidFill>
+            <a:schemeClr val="bg1"/>
+          </a:solidFill>
+          <a:ln>
+            <a:solidFill>
+              <a:srgbClr val="0070C0"/>
+            </a:solidFill>
+          </a:ln>
+        </p:spPr>
+        <p:style>
+          <a:lnRef idx="2">
+            <a:schemeClr val="accent1">
+              <a:shade val="50000"/>
+            </a:schemeClr>
+          </a:lnRef>
+          <a:fillRef idx="1">
+            <a:schemeClr val="accent1"/>
+          </a:fillRef>
+          <a:effectRef idx="0">
+            <a:schemeClr val="accent1"/>
+          </a:effectRef>
+          <a:fontRef idx="minor">
+            <a:schemeClr val="lt1"/>
+          </a:fontRef>
+        </p:style>
+        <p:txBody>
+          <a:bodyPr rtlCol="0" anchor="ctr"/>
+          <a:lstStyle/>
+          <a:p>
+            <a:pPr algn="ctr"/>
+            <a:endParaRPr lang="en-CA"/>
+          </a:p>
+        </p:txBody>
+      </p:sp>
+      <p:sp>
+        <p:nvSpPr>
+          <p:cNvPr id="31" name="Rectangle: Rounded Corners 30">
+            <a:extLst>
+              <a:ext uri="{FF2B5EF4-FFF2-40B4-BE49-F238E27FC236}">
+                <a16:creationId xmlns:a16="http://schemas.microsoft.com/office/drawing/2014/main" id="{3835CF37-40DA-42B5-96B9-AC7DCD7A7542}"/>
+              </a:ext>
+            </a:extLst>
+          </p:cNvPr>
+          <p:cNvSpPr/>
+          <p:nvPr/>
+        </p:nvSpPr>
+        <p:spPr>
+          <a:xfrm>
+            <a:off x="8033817" y="2017626"/>
+            <a:ext cx="559545" cy="1307623"/>
+          </a:xfrm>
+          <a:prstGeom prst="roundRect">
+            <a:avLst>
+              <a:gd name="adj" fmla="val 10906"/>
+            </a:avLst>
+          </a:prstGeom>
+          <a:solidFill>
+            <a:schemeClr val="bg1"/>
+          </a:solidFill>
+          <a:ln>
+            <a:solidFill>
+              <a:srgbClr val="0070C0"/>
+            </a:solidFill>
+          </a:ln>
+        </p:spPr>
+        <p:style>
+          <a:lnRef idx="2">
+            <a:schemeClr val="accent1">
+              <a:shade val="50000"/>
+            </a:schemeClr>
+          </a:lnRef>
+          <a:fillRef idx="1">
+            <a:schemeClr val="accent1"/>
+          </a:fillRef>
+          <a:effectRef idx="0">
+            <a:schemeClr val="accent1"/>
+          </a:effectRef>
+          <a:fontRef idx="minor">
+            <a:schemeClr val="lt1"/>
+          </a:fontRef>
+        </p:style>
+        <p:txBody>
+          <a:bodyPr rtlCol="0" anchor="ctr"/>
+          <a:lstStyle/>
+          <a:p>
+            <a:pPr algn="ctr"/>
+            <a:endParaRPr lang="en-CA"/>
+          </a:p>
+        </p:txBody>
+      </p:sp>
+      <p:sp>
+        <p:nvSpPr>
+          <p:cNvPr id="29" name="Rectangle: Rounded Corners 28">
+            <a:extLst>
+              <a:ext uri="{FF2B5EF4-FFF2-40B4-BE49-F238E27FC236}">
+                <a16:creationId xmlns:a16="http://schemas.microsoft.com/office/drawing/2014/main" id="{C1E5DD80-9DDB-49BC-AC06-45F7862D1E9A}"/>
+              </a:ext>
+            </a:extLst>
+          </p:cNvPr>
+          <p:cNvSpPr/>
+          <p:nvPr/>
+        </p:nvSpPr>
+        <p:spPr>
+          <a:xfrm>
+            <a:off x="7443940" y="1918188"/>
+            <a:ext cx="559545" cy="1307623"/>
+          </a:xfrm>
+          <a:prstGeom prst="roundRect">
+            <a:avLst>
+              <a:gd name="adj" fmla="val 10906"/>
+            </a:avLst>
+          </a:prstGeom>
+          <a:solidFill>
+            <a:schemeClr val="bg1"/>
+          </a:solidFill>
+          <a:ln>
+            <a:solidFill>
+              <a:srgbClr val="0070C0"/>
+            </a:solidFill>
+          </a:ln>
+        </p:spPr>
+        <p:style>
+          <a:lnRef idx="2">
+            <a:schemeClr val="accent1">
+              <a:shade val="50000"/>
+            </a:schemeClr>
+          </a:lnRef>
+          <a:fillRef idx="1">
+            <a:schemeClr val="accent1"/>
+          </a:fillRef>
+          <a:effectRef idx="0">
+            <a:schemeClr val="accent1"/>
+          </a:effectRef>
+          <a:fontRef idx="minor">
+            <a:schemeClr val="lt1"/>
+          </a:fontRef>
+        </p:style>
+        <p:txBody>
+          <a:bodyPr rtlCol="0" anchor="ctr"/>
+          <a:lstStyle/>
+          <a:p>
+            <a:pPr algn="ctr"/>
+            <a:endParaRPr lang="en-CA"/>
+          </a:p>
+        </p:txBody>
+      </p:sp>
+      <p:sp>
+        <p:nvSpPr>
+          <p:cNvPr id="28" name="Rectangle: Rounded Corners 27">
+            <a:extLst>
+              <a:ext uri="{FF2B5EF4-FFF2-40B4-BE49-F238E27FC236}">
+                <a16:creationId xmlns:a16="http://schemas.microsoft.com/office/drawing/2014/main" id="{F46C9C2E-03AB-4609-AC7C-E311F5360658}"/>
+              </a:ext>
+            </a:extLst>
+          </p:cNvPr>
+          <p:cNvSpPr/>
+          <p:nvPr/>
+        </p:nvSpPr>
+        <p:spPr>
+          <a:xfrm>
+            <a:off x="7299451" y="2021983"/>
+            <a:ext cx="559545" cy="1307623"/>
+          </a:xfrm>
+          <a:prstGeom prst="roundRect">
+            <a:avLst>
+              <a:gd name="adj" fmla="val 10906"/>
+            </a:avLst>
+          </a:prstGeom>
+          <a:solidFill>
+            <a:schemeClr val="bg1"/>
+          </a:solidFill>
+          <a:ln>
+            <a:solidFill>
+              <a:srgbClr val="0070C0"/>
+            </a:solidFill>
+          </a:ln>
+        </p:spPr>
+        <p:style>
+          <a:lnRef idx="2">
+            <a:schemeClr val="accent1">
+              <a:shade val="50000"/>
+            </a:schemeClr>
+          </a:lnRef>
+          <a:fillRef idx="1">
+            <a:schemeClr val="accent1"/>
+          </a:fillRef>
+          <a:effectRef idx="0">
+            <a:schemeClr val="accent1"/>
+          </a:effectRef>
+          <a:fontRef idx="minor">
+            <a:schemeClr val="lt1"/>
+          </a:fontRef>
+        </p:style>
+        <p:txBody>
+          <a:bodyPr rtlCol="0" anchor="ctr"/>
+          <a:lstStyle/>
+          <a:p>
+            <a:pPr algn="ctr"/>
+            <a:endParaRPr lang="en-CA"/>
+          </a:p>
+        </p:txBody>
+      </p:sp>
       <p:pic>
         <p:nvPicPr>
           <p:cNvPr id="2" name="Graphic 1" descr="Remote control">
@@ -5402,8 +5833,8 @@
         </p:nvSpPr>
         <p:spPr>
           <a:xfrm>
-            <a:off x="4444469" y="3582640"/>
-            <a:ext cx="1496948" cy="646331"/>
+            <a:off x="4494963" y="3582640"/>
+            <a:ext cx="1395960" cy="646331"/>
           </a:xfrm>
           <a:prstGeom prst="rect">
             <a:avLst/>
@@ -5438,7 +5869,7 @@
                 <a:latin typeface="Segoe UI Semibold" panose="020B0702040204020203" pitchFamily="34" charset="0"/>
                 <a:cs typeface="Segoe UI Semibold" panose="020B0702040204020203" pitchFamily="34" charset="0"/>
               </a:rPr>
-              <a:t>Multi-Server</a:t>
+              <a:t>Dual Server</a:t>
             </a:r>
           </a:p>
         </p:txBody>
@@ -5533,10 +5964,65 @@
       </p:sp>
       <p:sp>
         <p:nvSpPr>
-          <p:cNvPr id="21" name="Arrow: Down 20">
-            <a:extLst>
-              <a:ext uri="{FF2B5EF4-FFF2-40B4-BE49-F238E27FC236}">
-                <a16:creationId xmlns:a16="http://schemas.microsoft.com/office/drawing/2014/main" id="{A988BB02-25DF-47BA-A3EB-212DD3DBAAA6}"/>
+          <p:cNvPr id="19" name="TextBox 18">
+            <a:extLst>
+              <a:ext uri="{FF2B5EF4-FFF2-40B4-BE49-F238E27FC236}">
+                <a16:creationId xmlns:a16="http://schemas.microsoft.com/office/drawing/2014/main" id="{661D991E-A8E3-4BF6-B922-072FFF817D58}"/>
+              </a:ext>
+            </a:extLst>
+          </p:cNvPr>
+          <p:cNvSpPr txBox="1"/>
+          <p:nvPr/>
+        </p:nvSpPr>
+        <p:spPr>
+          <a:xfrm>
+            <a:off x="6945178" y="3582640"/>
+            <a:ext cx="1496948" cy="646331"/>
+          </a:xfrm>
+          <a:prstGeom prst="rect">
+            <a:avLst/>
+          </a:prstGeom>
+          <a:noFill/>
+        </p:spPr>
+        <p:txBody>
+          <a:bodyPr wrap="none" rtlCol="0">
+            <a:spAutoFit/>
+          </a:bodyPr>
+          <a:lstStyle/>
+          <a:p>
+            <a:pPr algn="ctr"/>
+            <a:r>
+              <a:rPr lang="en-CA" dirty="0">
+                <a:solidFill>
+                  <a:srgbClr val="0070C0"/>
+                </a:solidFill>
+                <a:latin typeface="Segoe UI Semibold" panose="020B0702040204020203" pitchFamily="34" charset="0"/>
+                <a:cs typeface="Segoe UI Semibold" panose="020B0702040204020203" pitchFamily="34" charset="0"/>
+              </a:rPr>
+              <a:t>AT   +   DT</a:t>
+            </a:r>
+          </a:p>
+          <a:p>
+            <a:pPr algn="ctr"/>
+            <a:r>
+              <a:rPr lang="en-CA" dirty="0">
+                <a:solidFill>
+                  <a:srgbClr val="0070C0"/>
+                </a:solidFill>
+                <a:latin typeface="Segoe UI Semibold" panose="020B0702040204020203" pitchFamily="34" charset="0"/>
+                <a:cs typeface="Segoe UI Semibold" panose="020B0702040204020203" pitchFamily="34" charset="0"/>
+              </a:rPr>
+              <a:t>Multi-Server</a:t>
+            </a:r>
+          </a:p>
+        </p:txBody>
+      </p:sp>
+      <p:sp>
+        <p:nvSpPr>
+          <p:cNvPr id="24" name="Arrow: Down 23">
+            <a:extLst>
+              <a:ext uri="{FF2B5EF4-FFF2-40B4-BE49-F238E27FC236}">
+                <a16:creationId xmlns:a16="http://schemas.microsoft.com/office/drawing/2014/main" id="{86313812-FD22-48FF-A13C-D499E79E8BDD}"/>
               </a:ext>
             </a:extLst>
           </p:cNvPr>
@@ -5545,7 +6031,7 @@
         </p:nvSpPr>
         <p:spPr>
           <a:xfrm rot="16200000">
-            <a:off x="5757620" y="2711710"/>
+            <a:off x="8664266" y="2692809"/>
             <a:ext cx="767256" cy="294290"/>
           </a:xfrm>
           <a:prstGeom prst="downArrow">
@@ -5579,10 +6065,10 @@
       </p:sp>
       <p:sp>
         <p:nvSpPr>
-          <p:cNvPr id="22" name="TextBox 21">
-            <a:extLst>
-              <a:ext uri="{FF2B5EF4-FFF2-40B4-BE49-F238E27FC236}">
-                <a16:creationId xmlns:a16="http://schemas.microsoft.com/office/drawing/2014/main" id="{2668471B-1D2A-487C-A7F6-18D22DD7745C}"/>
+          <p:cNvPr id="25" name="TextBox 24">
+            <a:extLst>
+              <a:ext uri="{FF2B5EF4-FFF2-40B4-BE49-F238E27FC236}">
+                <a16:creationId xmlns:a16="http://schemas.microsoft.com/office/drawing/2014/main" id="{7DA156EE-C2E7-4676-B84C-B1897B6EE61A}"/>
               </a:ext>
             </a:extLst>
           </p:cNvPr>
@@ -5591,7 +6077,7 @@
         </p:nvSpPr>
         <p:spPr>
           <a:xfrm>
-            <a:off x="6288393" y="2674188"/>
+            <a:off x="9195039" y="2655287"/>
             <a:ext cx="1180131" cy="369332"/>
           </a:xfrm>
           <a:prstGeom prst="rect">
@@ -5619,6 +6105,304 @@
           </a:p>
         </p:txBody>
       </p:sp>
+      <p:sp>
+        <p:nvSpPr>
+          <p:cNvPr id="9" name="Rectangle: Rounded Corners 8">
+            <a:extLst>
+              <a:ext uri="{FF2B5EF4-FFF2-40B4-BE49-F238E27FC236}">
+                <a16:creationId xmlns:a16="http://schemas.microsoft.com/office/drawing/2014/main" id="{45FE0AEE-21E3-46F3-9237-DED8682EF883}"/>
+              </a:ext>
+            </a:extLst>
+          </p:cNvPr>
+          <p:cNvSpPr/>
+          <p:nvPr/>
+        </p:nvSpPr>
+        <p:spPr>
+          <a:xfrm>
+            <a:off x="7187027" y="2121377"/>
+            <a:ext cx="559545" cy="1307623"/>
+          </a:xfrm>
+          <a:prstGeom prst="roundRect">
+            <a:avLst>
+              <a:gd name="adj" fmla="val 10906"/>
+            </a:avLst>
+          </a:prstGeom>
+          <a:solidFill>
+            <a:schemeClr val="bg1"/>
+          </a:solidFill>
+          <a:ln>
+            <a:solidFill>
+              <a:srgbClr val="0070C0"/>
+            </a:solidFill>
+          </a:ln>
+        </p:spPr>
+        <p:style>
+          <a:lnRef idx="2">
+            <a:schemeClr val="accent1">
+              <a:shade val="50000"/>
+            </a:schemeClr>
+          </a:lnRef>
+          <a:fillRef idx="1">
+            <a:schemeClr val="accent1"/>
+          </a:fillRef>
+          <a:effectRef idx="0">
+            <a:schemeClr val="accent1"/>
+          </a:effectRef>
+          <a:fontRef idx="minor">
+            <a:schemeClr val="lt1"/>
+          </a:fontRef>
+        </p:style>
+        <p:txBody>
+          <a:bodyPr rtlCol="0" anchor="ctr"/>
+          <a:lstStyle/>
+          <a:p>
+            <a:pPr algn="ctr"/>
+            <a:endParaRPr lang="en-CA"/>
+          </a:p>
+        </p:txBody>
+      </p:sp>
+      <p:sp>
+        <p:nvSpPr>
+          <p:cNvPr id="32" name="Rectangle: Rounded Corners 31">
+            <a:extLst>
+              <a:ext uri="{FF2B5EF4-FFF2-40B4-BE49-F238E27FC236}">
+                <a16:creationId xmlns:a16="http://schemas.microsoft.com/office/drawing/2014/main" id="{C7A697F2-9467-499B-8F9A-7086888540A0}"/>
+              </a:ext>
+            </a:extLst>
+          </p:cNvPr>
+          <p:cNvSpPr/>
+          <p:nvPr/>
+        </p:nvSpPr>
+        <p:spPr>
+          <a:xfrm>
+            <a:off x="7921393" y="2117020"/>
+            <a:ext cx="559545" cy="1307623"/>
+          </a:xfrm>
+          <a:prstGeom prst="roundRect">
+            <a:avLst>
+              <a:gd name="adj" fmla="val 10906"/>
+            </a:avLst>
+          </a:prstGeom>
+          <a:solidFill>
+            <a:schemeClr val="bg1"/>
+          </a:solidFill>
+          <a:ln>
+            <a:solidFill>
+              <a:srgbClr val="0070C0"/>
+            </a:solidFill>
+          </a:ln>
+        </p:spPr>
+        <p:style>
+          <a:lnRef idx="2">
+            <a:schemeClr val="accent1">
+              <a:shade val="50000"/>
+            </a:schemeClr>
+          </a:lnRef>
+          <a:fillRef idx="1">
+            <a:schemeClr val="accent1"/>
+          </a:fillRef>
+          <a:effectRef idx="0">
+            <a:schemeClr val="accent1"/>
+          </a:effectRef>
+          <a:fontRef idx="minor">
+            <a:schemeClr val="lt1"/>
+          </a:fontRef>
+        </p:style>
+        <p:txBody>
+          <a:bodyPr rtlCol="0" anchor="ctr"/>
+          <a:lstStyle/>
+          <a:p>
+            <a:pPr algn="ctr"/>
+            <a:endParaRPr lang="en-CA"/>
+          </a:p>
+        </p:txBody>
+      </p:sp>
+      <p:sp>
+        <p:nvSpPr>
+          <p:cNvPr id="10" name="Rectangle 9">
+            <a:extLst>
+              <a:ext uri="{FF2B5EF4-FFF2-40B4-BE49-F238E27FC236}">
+                <a16:creationId xmlns:a16="http://schemas.microsoft.com/office/drawing/2014/main" id="{53646253-7167-44B1-B2F1-D30A4BBE4AEF}"/>
+              </a:ext>
+            </a:extLst>
+          </p:cNvPr>
+          <p:cNvSpPr/>
+          <p:nvPr/>
+        </p:nvSpPr>
+        <p:spPr>
+          <a:xfrm>
+            <a:off x="7119273" y="2412435"/>
+            <a:ext cx="441732" cy="485704"/>
+          </a:xfrm>
+          <a:prstGeom prst="rect">
+            <a:avLst/>
+          </a:prstGeom>
+          <a:solidFill>
+            <a:schemeClr val="bg1"/>
+          </a:solidFill>
+          <a:ln>
+            <a:solidFill>
+              <a:schemeClr val="bg1"/>
+            </a:solidFill>
+          </a:ln>
+        </p:spPr>
+        <p:style>
+          <a:lnRef idx="2">
+            <a:schemeClr val="accent1">
+              <a:shade val="50000"/>
+            </a:schemeClr>
+          </a:lnRef>
+          <a:fillRef idx="1">
+            <a:schemeClr val="accent1"/>
+          </a:fillRef>
+          <a:effectRef idx="0">
+            <a:schemeClr val="accent1"/>
+          </a:effectRef>
+          <a:fontRef idx="minor">
+            <a:schemeClr val="lt1"/>
+          </a:fontRef>
+        </p:style>
+        <p:txBody>
+          <a:bodyPr rtlCol="0" anchor="ctr"/>
+          <a:lstStyle/>
+          <a:p>
+            <a:pPr algn="ctr"/>
+            <a:endParaRPr lang="en-CA"/>
+          </a:p>
+        </p:txBody>
+      </p:sp>
+      <p:sp>
+        <p:nvSpPr>
+          <p:cNvPr id="33" name="Rectangle 32">
+            <a:extLst>
+              <a:ext uri="{FF2B5EF4-FFF2-40B4-BE49-F238E27FC236}">
+                <a16:creationId xmlns:a16="http://schemas.microsoft.com/office/drawing/2014/main" id="{11C97EDE-6312-4B03-99CE-D834205F461F}"/>
+              </a:ext>
+            </a:extLst>
+          </p:cNvPr>
+          <p:cNvSpPr/>
+          <p:nvPr/>
+        </p:nvSpPr>
+        <p:spPr>
+          <a:xfrm>
+            <a:off x="7879765" y="2412435"/>
+            <a:ext cx="441732" cy="485704"/>
+          </a:xfrm>
+          <a:prstGeom prst="rect">
+            <a:avLst/>
+          </a:prstGeom>
+          <a:solidFill>
+            <a:schemeClr val="bg1"/>
+          </a:solidFill>
+          <a:ln>
+            <a:solidFill>
+              <a:schemeClr val="bg1"/>
+            </a:solidFill>
+          </a:ln>
+        </p:spPr>
+        <p:style>
+          <a:lnRef idx="2">
+            <a:schemeClr val="accent1">
+              <a:shade val="50000"/>
+            </a:schemeClr>
+          </a:lnRef>
+          <a:fillRef idx="1">
+            <a:schemeClr val="accent1"/>
+          </a:fillRef>
+          <a:effectRef idx="0">
+            <a:schemeClr val="accent1"/>
+          </a:effectRef>
+          <a:fontRef idx="minor">
+            <a:schemeClr val="lt1"/>
+          </a:fontRef>
+        </p:style>
+        <p:txBody>
+          <a:bodyPr rtlCol="0" anchor="ctr"/>
+          <a:lstStyle/>
+          <a:p>
+            <a:pPr algn="ctr"/>
+            <a:endParaRPr lang="en-CA"/>
+          </a:p>
+        </p:txBody>
+      </p:sp>
+      <p:pic>
+        <p:nvPicPr>
+          <p:cNvPr id="17" name="Graphic 16" descr="Remote control">
+            <a:extLst>
+              <a:ext uri="{FF2B5EF4-FFF2-40B4-BE49-F238E27FC236}">
+                <a16:creationId xmlns:a16="http://schemas.microsoft.com/office/drawing/2014/main" id="{148169F0-3D2D-4F32-8BB2-637A583D16E0}"/>
+              </a:ext>
+            </a:extLst>
+          </p:cNvPr>
+          <p:cNvPicPr>
+            <a:picLocks noChangeAspect="1"/>
+          </p:cNvPicPr>
+          <p:nvPr/>
+        </p:nvPicPr>
+        <p:blipFill>
+          <a:blip r:embed="rId2">
+            <a:extLst>
+              <a:ext uri="{28A0092B-C50C-407E-A947-70E740481C1C}">
+                <a14:useLocalDpi xmlns:a14="http://schemas.microsoft.com/office/drawing/2010/main" val="0"/>
+              </a:ext>
+              <a:ext uri="{96DAC541-7B7A-43D3-8B79-37D633B846F1}">
+                <asvg:svgBlip xmlns:asvg="http://schemas.microsoft.com/office/drawing/2016/SVG/main" r:embed="rId3"/>
+              </a:ext>
+            </a:extLst>
+          </a:blip>
+          <a:stretch>
+            <a:fillRect/>
+          </a:stretch>
+        </p:blipFill>
+        <p:spPr>
+          <a:xfrm>
+            <a:off x="6629432" y="2138855"/>
+            <a:ext cx="1440000" cy="1440000"/>
+          </a:xfrm>
+          <a:prstGeom prst="rect">
+            <a:avLst/>
+          </a:prstGeom>
+        </p:spPr>
+      </p:pic>
+      <p:pic>
+        <p:nvPicPr>
+          <p:cNvPr id="18" name="Graphic 17" descr="Remote control">
+            <a:extLst>
+              <a:ext uri="{FF2B5EF4-FFF2-40B4-BE49-F238E27FC236}">
+                <a16:creationId xmlns:a16="http://schemas.microsoft.com/office/drawing/2014/main" id="{875197FA-1B3E-4364-9DF7-ABBF22D92697}"/>
+              </a:ext>
+            </a:extLst>
+          </p:cNvPr>
+          <p:cNvPicPr>
+            <a:picLocks noChangeAspect="1"/>
+          </p:cNvPicPr>
+          <p:nvPr/>
+        </p:nvPicPr>
+        <p:blipFill>
+          <a:blip r:embed="rId2">
+            <a:extLst>
+              <a:ext uri="{28A0092B-C50C-407E-A947-70E740481C1C}">
+                <a14:useLocalDpi xmlns:a14="http://schemas.microsoft.com/office/drawing/2010/main" val="0"/>
+              </a:ext>
+              <a:ext uri="{96DAC541-7B7A-43D3-8B79-37D633B846F1}">
+                <asvg:svgBlip xmlns:asvg="http://schemas.microsoft.com/office/drawing/2016/SVG/main" r:embed="rId3"/>
+              </a:ext>
+            </a:extLst>
+          </a:blip>
+          <a:stretch>
+            <a:fillRect/>
+          </a:stretch>
+        </p:blipFill>
+        <p:spPr>
+          <a:xfrm>
+            <a:off x="7386910" y="2141870"/>
+            <a:ext cx="1440000" cy="1440000"/>
+          </a:xfrm>
+          <a:prstGeom prst="rect">
+            <a:avLst/>
+          </a:prstGeom>
+        </p:spPr>
+      </p:pic>
     </p:spTree>
     <p:extLst>
       <p:ext uri="{BB962C8B-B14F-4D97-AF65-F5344CB8AC3E}">

</xml_diff>

<commit_message>
Consolidate DRAFT 1 and submit to Rangers for review.
</commit_message>
<xml_diff>
--- a/src/Planning/Illustrations.pptx
+++ b/src/Planning/Illustrations.pptx
@@ -8,6 +8,7 @@
     <p:sldId id="256" r:id="rId2"/>
     <p:sldId id="257" r:id="rId3"/>
     <p:sldId id="258" r:id="rId4"/>
+    <p:sldId id="259" r:id="rId5"/>
   </p:sldIdLst>
   <p:sldSz cx="12192000" cy="6858000"/>
   <p:notesSz cx="6858000" cy="9144000"/>
@@ -117,7 +118,7 @@
 <file path=ppt/revisionInfo.xml><?xml version="1.0" encoding="utf-8"?>
 <p1510:revInfo xmlns:a="http://schemas.openxmlformats.org/drawingml/2006/main" xmlns:r="http://schemas.openxmlformats.org/officeDocument/2006/relationships" xmlns:p1510="http://schemas.microsoft.com/office/powerpoint/2015/10/main">
   <p1510:revLst>
-    <p1510:client id="{BCAB1FCD-C6E0-4904-9922-531ED0D800C6}" v="427" dt="2018-07-13T17:18:40.240"/>
+    <p1510:client id="{BCAB1FCD-C6E0-4904-9922-531ED0D800C6}" v="1543" dt="2018-07-19T18:25:53.442"/>
   </p1510:revLst>
 </p1510:revInfo>
 </file>
@@ -127,7 +128,7 @@
   <pc:docChgLst>
     <pc:chgData name="Willy-Peter Schaub" userId="707b42e47e16ca84" providerId="LiveId" clId="{BCAB1FCD-C6E0-4904-9922-531ED0D800C6}"/>
     <pc:docChg chg="undo custSel addSld delSld modSld">
-      <pc:chgData name="Willy-Peter Schaub" userId="707b42e47e16ca84" providerId="LiveId" clId="{BCAB1FCD-C6E0-4904-9922-531ED0D800C6}" dt="2018-07-13T17:18:40.240" v="426" actId="166"/>
+      <pc:chgData name="Willy-Peter Schaub" userId="707b42e47e16ca84" providerId="LiveId" clId="{BCAB1FCD-C6E0-4904-9922-531ED0D800C6}" dt="2018-07-19T18:25:53.442" v="1521" actId="14100"/>
       <pc:docMkLst>
         <pc:docMk/>
       </pc:docMkLst>
@@ -631,14 +632,6 @@
             <ac:picMk id="17" creationId="{3FFBEE36-02D8-4226-A593-B6D70E8F7BA8}"/>
           </ac:picMkLst>
         </pc:picChg>
-        <pc:picChg chg="add del">
-          <ac:chgData name="Willy-Peter Schaub" userId="707b42e47e16ca84" providerId="LiveId" clId="{BCAB1FCD-C6E0-4904-9922-531ED0D800C6}" dt="2018-07-11T16:31:37.093" v="304" actId="478"/>
-          <ac:picMkLst>
-            <pc:docMk/>
-            <pc:sldMk cId="1004767918" sldId="258"/>
-            <ac:picMk id="18" creationId="{DDB01B90-FC77-4354-BA36-0B960F38157A}"/>
-          </ac:picMkLst>
-        </pc:picChg>
         <pc:picChg chg="add mod ord">
           <ac:chgData name="Willy-Peter Schaub" userId="707b42e47e16ca84" providerId="LiveId" clId="{BCAB1FCD-C6E0-4904-9922-531ED0D800C6}" dt="2018-07-13T17:18:40.240" v="426" actId="166"/>
           <ac:picMkLst>
@@ -652,6 +645,14 @@
           <ac:picMkLst>
             <pc:docMk/>
             <pc:sldMk cId="1004767918" sldId="258"/>
+            <ac:picMk id="18" creationId="{DDB01B90-FC77-4354-BA36-0B960F38157A}"/>
+          </ac:picMkLst>
+        </pc:picChg>
+        <pc:picChg chg="add del">
+          <ac:chgData name="Willy-Peter Schaub" userId="707b42e47e16ca84" providerId="LiveId" clId="{BCAB1FCD-C6E0-4904-9922-531ED0D800C6}" dt="2018-07-11T16:31:37.093" v="304" actId="478"/>
+          <ac:picMkLst>
+            <pc:docMk/>
+            <pc:sldMk cId="1004767918" sldId="258"/>
             <ac:picMk id="19" creationId="{F841DE78-3A1D-453B-B8CF-19514A19A587}"/>
           </ac:picMkLst>
         </pc:picChg>
@@ -664,28 +665,732 @@
           </ac:picMkLst>
         </pc:picChg>
       </pc:sldChg>
-      <pc:sldChg chg="addSp modSp add del">
-        <pc:chgData name="Willy-Peter Schaub" userId="707b42e47e16ca84" providerId="LiveId" clId="{BCAB1FCD-C6E0-4904-9922-531ED0D800C6}" dt="2018-07-13T16:42:06.547" v="333" actId="2696"/>
+      <pc:sldChg chg="addSp delSp modSp add">
+        <pc:chgData name="Willy-Peter Schaub" userId="707b42e47e16ca84" providerId="LiveId" clId="{BCAB1FCD-C6E0-4904-9922-531ED0D800C6}" dt="2018-07-19T18:25:53.442" v="1521" actId="14100"/>
         <pc:sldMkLst>
           <pc:docMk/>
-          <pc:sldMk cId="422116786" sldId="259"/>
+          <pc:sldMk cId="556094072" sldId="259"/>
         </pc:sldMkLst>
         <pc:spChg chg="add mod">
-          <ac:chgData name="Willy-Peter Schaub" userId="707b42e47e16ca84" providerId="LiveId" clId="{BCAB1FCD-C6E0-4904-9922-531ED0D800C6}" dt="2018-07-13T16:41:52.830" v="330" actId="1076"/>
+          <ac:chgData name="Willy-Peter Schaub" userId="707b42e47e16ca84" providerId="LiveId" clId="{BCAB1FCD-C6E0-4904-9922-531ED0D800C6}" dt="2018-07-19T18:23:47.256" v="1479" actId="403"/>
           <ac:spMkLst>
             <pc:docMk/>
-            <pc:sldMk cId="422116786" sldId="259"/>
-            <ac:spMk id="2" creationId="{C91F0BB5-DF17-4EDF-A974-9AF813A12DF3}"/>
+            <pc:sldMk cId="556094072" sldId="259"/>
+            <ac:spMk id="2" creationId="{3C43FB5C-4BFE-40E8-80E3-2B97592FDE12}"/>
           </ac:spMkLst>
         </pc:spChg>
         <pc:spChg chg="add mod">
-          <ac:chgData name="Willy-Peter Schaub" userId="707b42e47e16ca84" providerId="LiveId" clId="{BCAB1FCD-C6E0-4904-9922-531ED0D800C6}" dt="2018-07-13T16:41:58.940" v="332" actId="1076"/>
+          <ac:chgData name="Willy-Peter Schaub" userId="707b42e47e16ca84" providerId="LiveId" clId="{BCAB1FCD-C6E0-4904-9922-531ED0D800C6}" dt="2018-07-19T18:23:47.256" v="1479" actId="403"/>
           <ac:spMkLst>
             <pc:docMk/>
-            <pc:sldMk cId="422116786" sldId="259"/>
-            <ac:spMk id="3" creationId="{1C5D38ED-972B-47A3-8CEE-A25923A66297}"/>
+            <pc:sldMk cId="556094072" sldId="259"/>
+            <ac:spMk id="3" creationId="{325D024E-AA16-480D-BE98-CD2DFC135D39}"/>
           </ac:spMkLst>
         </pc:spChg>
+        <pc:spChg chg="add mod">
+          <ac:chgData name="Willy-Peter Schaub" userId="707b42e47e16ca84" providerId="LiveId" clId="{BCAB1FCD-C6E0-4904-9922-531ED0D800C6}" dt="2018-07-19T18:23:47.256" v="1479" actId="403"/>
+          <ac:spMkLst>
+            <pc:docMk/>
+            <pc:sldMk cId="556094072" sldId="259"/>
+            <ac:spMk id="4" creationId="{1CCAAE3C-4AA8-4654-8CF7-EFB4F0601C90}"/>
+          </ac:spMkLst>
+        </pc:spChg>
+        <pc:spChg chg="add mod">
+          <ac:chgData name="Willy-Peter Schaub" userId="707b42e47e16ca84" providerId="LiveId" clId="{BCAB1FCD-C6E0-4904-9922-531ED0D800C6}" dt="2018-07-19T18:23:47.256" v="1479" actId="403"/>
+          <ac:spMkLst>
+            <pc:docMk/>
+            <pc:sldMk cId="556094072" sldId="259"/>
+            <ac:spMk id="5" creationId="{320F45C4-3AC8-4ABF-824D-AEEE6B605A3D}"/>
+          </ac:spMkLst>
+        </pc:spChg>
+        <pc:spChg chg="add mod">
+          <ac:chgData name="Willy-Peter Schaub" userId="707b42e47e16ca84" providerId="LiveId" clId="{BCAB1FCD-C6E0-4904-9922-531ED0D800C6}" dt="2018-07-19T18:23:47.256" v="1479" actId="403"/>
+          <ac:spMkLst>
+            <pc:docMk/>
+            <pc:sldMk cId="556094072" sldId="259"/>
+            <ac:spMk id="6" creationId="{4276B958-2557-478D-8C01-4245DBEE5BF5}"/>
+          </ac:spMkLst>
+        </pc:spChg>
+        <pc:spChg chg="add mod">
+          <ac:chgData name="Willy-Peter Schaub" userId="707b42e47e16ca84" providerId="LiveId" clId="{BCAB1FCD-C6E0-4904-9922-531ED0D800C6}" dt="2018-07-19T18:23:47.256" v="1479" actId="403"/>
+          <ac:spMkLst>
+            <pc:docMk/>
+            <pc:sldMk cId="556094072" sldId="259"/>
+            <ac:spMk id="7" creationId="{92C6B7A8-6496-470B-8367-9E755AAA1CD8}"/>
+          </ac:spMkLst>
+        </pc:spChg>
+        <pc:spChg chg="add mod">
+          <ac:chgData name="Willy-Peter Schaub" userId="707b42e47e16ca84" providerId="LiveId" clId="{BCAB1FCD-C6E0-4904-9922-531ED0D800C6}" dt="2018-07-19T18:23:53.958" v="1480" actId="6549"/>
+          <ac:spMkLst>
+            <pc:docMk/>
+            <pc:sldMk cId="556094072" sldId="259"/>
+            <ac:spMk id="8" creationId="{A0CB3A8D-409A-4664-BFFF-22C703363A1E}"/>
+          </ac:spMkLst>
+        </pc:spChg>
+        <pc:spChg chg="add mod">
+          <ac:chgData name="Willy-Peter Schaub" userId="707b42e47e16ca84" providerId="LiveId" clId="{BCAB1FCD-C6E0-4904-9922-531ED0D800C6}" dt="2018-07-19T18:23:47.256" v="1479" actId="403"/>
+          <ac:spMkLst>
+            <pc:docMk/>
+            <pc:sldMk cId="556094072" sldId="259"/>
+            <ac:spMk id="9" creationId="{5425E45C-9DFB-4424-BF0E-731207FE09A1}"/>
+          </ac:spMkLst>
+        </pc:spChg>
+        <pc:spChg chg="add mod">
+          <ac:chgData name="Willy-Peter Schaub" userId="707b42e47e16ca84" providerId="LiveId" clId="{BCAB1FCD-C6E0-4904-9922-531ED0D800C6}" dt="2018-07-19T18:10:11.093" v="1402" actId="12788"/>
+          <ac:spMkLst>
+            <pc:docMk/>
+            <pc:sldMk cId="556094072" sldId="259"/>
+            <ac:spMk id="10" creationId="{5FE4A2AD-2B8C-49A0-BD36-A997F904C422}"/>
+          </ac:spMkLst>
+        </pc:spChg>
+        <pc:spChg chg="add mod">
+          <ac:chgData name="Willy-Peter Schaub" userId="707b42e47e16ca84" providerId="LiveId" clId="{BCAB1FCD-C6E0-4904-9922-531ED0D800C6}" dt="2018-07-19T18:10:11.093" v="1402" actId="12788"/>
+          <ac:spMkLst>
+            <pc:docMk/>
+            <pc:sldMk cId="556094072" sldId="259"/>
+            <ac:spMk id="11" creationId="{04479A0C-6794-4524-B8F7-3EEC30B5A68A}"/>
+          </ac:spMkLst>
+        </pc:spChg>
+        <pc:spChg chg="add mod">
+          <ac:chgData name="Willy-Peter Schaub" userId="707b42e47e16ca84" providerId="LiveId" clId="{BCAB1FCD-C6E0-4904-9922-531ED0D800C6}" dt="2018-07-19T18:10:11.093" v="1402" actId="12788"/>
+          <ac:spMkLst>
+            <pc:docMk/>
+            <pc:sldMk cId="556094072" sldId="259"/>
+            <ac:spMk id="12" creationId="{5903C7DD-6B7C-4B83-87E5-5152234617D2}"/>
+          </ac:spMkLst>
+        </pc:spChg>
+        <pc:spChg chg="add mod">
+          <ac:chgData name="Willy-Peter Schaub" userId="707b42e47e16ca84" providerId="LiveId" clId="{BCAB1FCD-C6E0-4904-9922-531ED0D800C6}" dt="2018-07-19T18:10:11.093" v="1402" actId="12788"/>
+          <ac:spMkLst>
+            <pc:docMk/>
+            <pc:sldMk cId="556094072" sldId="259"/>
+            <ac:spMk id="13" creationId="{62470D09-5959-43F6-A485-79D6EF88F0AB}"/>
+          </ac:spMkLst>
+        </pc:spChg>
+        <pc:spChg chg="add mod">
+          <ac:chgData name="Willy-Peter Schaub" userId="707b42e47e16ca84" providerId="LiveId" clId="{BCAB1FCD-C6E0-4904-9922-531ED0D800C6}" dt="2018-07-19T18:10:11.093" v="1402" actId="12788"/>
+          <ac:spMkLst>
+            <pc:docMk/>
+            <pc:sldMk cId="556094072" sldId="259"/>
+            <ac:spMk id="14" creationId="{6403546B-7216-4435-BD3C-7E59A1231AA7}"/>
+          </ac:spMkLst>
+        </pc:spChg>
+        <pc:spChg chg="add mod">
+          <ac:chgData name="Willy-Peter Schaub" userId="707b42e47e16ca84" providerId="LiveId" clId="{BCAB1FCD-C6E0-4904-9922-531ED0D800C6}" dt="2018-07-19T18:10:11.093" v="1402" actId="12788"/>
+          <ac:spMkLst>
+            <pc:docMk/>
+            <pc:sldMk cId="556094072" sldId="259"/>
+            <ac:spMk id="15" creationId="{8FAD26E0-E097-4193-A678-C95C946D650E}"/>
+          </ac:spMkLst>
+        </pc:spChg>
+        <pc:spChg chg="add mod">
+          <ac:chgData name="Willy-Peter Schaub" userId="707b42e47e16ca84" providerId="LiveId" clId="{BCAB1FCD-C6E0-4904-9922-531ED0D800C6}" dt="2018-07-19T18:10:11.093" v="1402" actId="12788"/>
+          <ac:spMkLst>
+            <pc:docMk/>
+            <pc:sldMk cId="556094072" sldId="259"/>
+            <ac:spMk id="16" creationId="{40425BB6-F5B4-4EEB-9F00-CFB8846CCCE6}"/>
+          </ac:spMkLst>
+        </pc:spChg>
+        <pc:spChg chg="add mod">
+          <ac:chgData name="Willy-Peter Schaub" userId="707b42e47e16ca84" providerId="LiveId" clId="{BCAB1FCD-C6E0-4904-9922-531ED0D800C6}" dt="2018-07-19T18:10:11.093" v="1402" actId="12788"/>
+          <ac:spMkLst>
+            <pc:docMk/>
+            <pc:sldMk cId="556094072" sldId="259"/>
+            <ac:spMk id="17" creationId="{0A37915C-3DD9-4AB7-AF87-3F29A00C2903}"/>
+          </ac:spMkLst>
+        </pc:spChg>
+        <pc:spChg chg="add del mod">
+          <ac:chgData name="Willy-Peter Schaub" userId="707b42e47e16ca84" providerId="LiveId" clId="{BCAB1FCD-C6E0-4904-9922-531ED0D800C6}" dt="2018-07-19T17:54:49.879" v="1058" actId="478"/>
+          <ac:spMkLst>
+            <pc:docMk/>
+            <pc:sldMk cId="556094072" sldId="259"/>
+            <ac:spMk id="18" creationId="{CAB7CE80-9273-42B7-96B1-13772C805F97}"/>
+          </ac:spMkLst>
+        </pc:spChg>
+        <pc:spChg chg="add del mod">
+          <ac:chgData name="Willy-Peter Schaub" userId="707b42e47e16ca84" providerId="LiveId" clId="{BCAB1FCD-C6E0-4904-9922-531ED0D800C6}" dt="2018-07-19T17:54:49.879" v="1058" actId="478"/>
+          <ac:spMkLst>
+            <pc:docMk/>
+            <pc:sldMk cId="556094072" sldId="259"/>
+            <ac:spMk id="19" creationId="{857011FF-2879-4156-AF23-C2C6AC28F8EC}"/>
+          </ac:spMkLst>
+        </pc:spChg>
+        <pc:spChg chg="add del mod">
+          <ac:chgData name="Willy-Peter Schaub" userId="707b42e47e16ca84" providerId="LiveId" clId="{BCAB1FCD-C6E0-4904-9922-531ED0D800C6}" dt="2018-07-19T17:58:59.483" v="1146" actId="478"/>
+          <ac:spMkLst>
+            <pc:docMk/>
+            <pc:sldMk cId="556094072" sldId="259"/>
+            <ac:spMk id="24" creationId="{1A077186-5B05-47EC-9922-8BCCC7CEAA52}"/>
+          </ac:spMkLst>
+        </pc:spChg>
+        <pc:spChg chg="add del mod">
+          <ac:chgData name="Willy-Peter Schaub" userId="707b42e47e16ca84" providerId="LiveId" clId="{BCAB1FCD-C6E0-4904-9922-531ED0D800C6}" dt="2018-07-19T17:58:59.483" v="1146" actId="478"/>
+          <ac:spMkLst>
+            <pc:docMk/>
+            <pc:sldMk cId="556094072" sldId="259"/>
+            <ac:spMk id="25" creationId="{8BEC3990-E2E9-4B49-B31E-1794BE32FB43}"/>
+          </ac:spMkLst>
+        </pc:spChg>
+        <pc:spChg chg="add del mod">
+          <ac:chgData name="Willy-Peter Schaub" userId="707b42e47e16ca84" providerId="LiveId" clId="{BCAB1FCD-C6E0-4904-9922-531ED0D800C6}" dt="2018-07-19T17:58:59.483" v="1146" actId="478"/>
+          <ac:spMkLst>
+            <pc:docMk/>
+            <pc:sldMk cId="556094072" sldId="259"/>
+            <ac:spMk id="26" creationId="{1B9404DF-85C0-4067-A8A9-1634758D3D1C}"/>
+          </ac:spMkLst>
+        </pc:spChg>
+        <pc:spChg chg="add del mod">
+          <ac:chgData name="Willy-Peter Schaub" userId="707b42e47e16ca84" providerId="LiveId" clId="{BCAB1FCD-C6E0-4904-9922-531ED0D800C6}" dt="2018-07-19T17:58:59.483" v="1146" actId="478"/>
+          <ac:spMkLst>
+            <pc:docMk/>
+            <pc:sldMk cId="556094072" sldId="259"/>
+            <ac:spMk id="27" creationId="{3C016919-1880-4702-9700-7EF3E4DB4FF0}"/>
+          </ac:spMkLst>
+        </pc:spChg>
+        <pc:spChg chg="add mod">
+          <ac:chgData name="Willy-Peter Schaub" userId="707b42e47e16ca84" providerId="LiveId" clId="{BCAB1FCD-C6E0-4904-9922-531ED0D800C6}" dt="2018-07-19T18:25:46.363" v="1519" actId="1035"/>
+          <ac:spMkLst>
+            <pc:docMk/>
+            <pc:sldMk cId="556094072" sldId="259"/>
+            <ac:spMk id="31" creationId="{6A773C66-7295-44F3-A5C8-318E2A7CA63A}"/>
+          </ac:spMkLst>
+        </pc:spChg>
+        <pc:spChg chg="add mod">
+          <ac:chgData name="Willy-Peter Schaub" userId="707b42e47e16ca84" providerId="LiveId" clId="{BCAB1FCD-C6E0-4904-9922-531ED0D800C6}" dt="2018-07-19T18:20:34.886" v="1429" actId="113"/>
+          <ac:spMkLst>
+            <pc:docMk/>
+            <pc:sldMk cId="556094072" sldId="259"/>
+            <ac:spMk id="32" creationId="{46E12690-F490-4F84-A70A-B2E43436D582}"/>
+          </ac:spMkLst>
+        </pc:spChg>
+        <pc:spChg chg="add del mod">
+          <ac:chgData name="Willy-Peter Schaub" userId="707b42e47e16ca84" providerId="LiveId" clId="{BCAB1FCD-C6E0-4904-9922-531ED0D800C6}" dt="2018-07-19T17:58:59.483" v="1146" actId="478"/>
+          <ac:spMkLst>
+            <pc:docMk/>
+            <pc:sldMk cId="556094072" sldId="259"/>
+            <ac:spMk id="33" creationId="{C7F29F28-BF18-4795-85F8-405B0FA18CBD}"/>
+          </ac:spMkLst>
+        </pc:spChg>
+        <pc:spChg chg="add del mod">
+          <ac:chgData name="Willy-Peter Schaub" userId="707b42e47e16ca84" providerId="LiveId" clId="{BCAB1FCD-C6E0-4904-9922-531ED0D800C6}" dt="2018-07-19T17:58:59.483" v="1146" actId="478"/>
+          <ac:spMkLst>
+            <pc:docMk/>
+            <pc:sldMk cId="556094072" sldId="259"/>
+            <ac:spMk id="34" creationId="{9C66F412-B258-45FF-84B1-344CBC9D6DD9}"/>
+          </ac:spMkLst>
+        </pc:spChg>
+        <pc:spChg chg="add del mod">
+          <ac:chgData name="Willy-Peter Schaub" userId="707b42e47e16ca84" providerId="LiveId" clId="{BCAB1FCD-C6E0-4904-9922-531ED0D800C6}" dt="2018-07-19T17:58:59.483" v="1146" actId="478"/>
+          <ac:spMkLst>
+            <pc:docMk/>
+            <pc:sldMk cId="556094072" sldId="259"/>
+            <ac:spMk id="35" creationId="{AF2437B9-2B22-488A-B550-5A505AAE614E}"/>
+          </ac:spMkLst>
+        </pc:spChg>
+        <pc:spChg chg="add del mod">
+          <ac:chgData name="Willy-Peter Schaub" userId="707b42e47e16ca84" providerId="LiveId" clId="{BCAB1FCD-C6E0-4904-9922-531ED0D800C6}" dt="2018-07-19T17:58:59.483" v="1146" actId="478"/>
+          <ac:spMkLst>
+            <pc:docMk/>
+            <pc:sldMk cId="556094072" sldId="259"/>
+            <ac:spMk id="36" creationId="{5C788249-5F88-4186-A6CF-C72C08DDC4E4}"/>
+          </ac:spMkLst>
+        </pc:spChg>
+        <pc:spChg chg="add del mod">
+          <ac:chgData name="Willy-Peter Schaub" userId="707b42e47e16ca84" providerId="LiveId" clId="{BCAB1FCD-C6E0-4904-9922-531ED0D800C6}" dt="2018-07-19T17:59:03.081" v="1148" actId="478"/>
+          <ac:spMkLst>
+            <pc:docMk/>
+            <pc:sldMk cId="556094072" sldId="259"/>
+            <ac:spMk id="37" creationId="{455D5182-A88A-4ED2-BF45-63FADDD0B4CD}"/>
+          </ac:spMkLst>
+        </pc:spChg>
+        <pc:spChg chg="add del mod">
+          <ac:chgData name="Willy-Peter Schaub" userId="707b42e47e16ca84" providerId="LiveId" clId="{BCAB1FCD-C6E0-4904-9922-531ED0D800C6}" dt="2018-07-19T17:58:59.483" v="1146" actId="478"/>
+          <ac:spMkLst>
+            <pc:docMk/>
+            <pc:sldMk cId="556094072" sldId="259"/>
+            <ac:spMk id="38" creationId="{611A6720-84D6-4090-9904-B37235FBFC60}"/>
+          </ac:spMkLst>
+        </pc:spChg>
+        <pc:spChg chg="add del mod">
+          <ac:chgData name="Willy-Peter Schaub" userId="707b42e47e16ca84" providerId="LiveId" clId="{BCAB1FCD-C6E0-4904-9922-531ED0D800C6}" dt="2018-07-19T17:58:59.483" v="1146" actId="478"/>
+          <ac:spMkLst>
+            <pc:docMk/>
+            <pc:sldMk cId="556094072" sldId="259"/>
+            <ac:spMk id="39" creationId="{FD1C7603-2E84-4A82-AB1A-C24BBDE6A23D}"/>
+          </ac:spMkLst>
+        </pc:spChg>
+        <pc:spChg chg="add del mod">
+          <ac:chgData name="Willy-Peter Schaub" userId="707b42e47e16ca84" providerId="LiveId" clId="{BCAB1FCD-C6E0-4904-9922-531ED0D800C6}" dt="2018-07-19T17:58:59.483" v="1146" actId="478"/>
+          <ac:spMkLst>
+            <pc:docMk/>
+            <pc:sldMk cId="556094072" sldId="259"/>
+            <ac:spMk id="40" creationId="{03BE99C3-71DF-44D0-B964-9592887F627E}"/>
+          </ac:spMkLst>
+        </pc:spChg>
+        <pc:spChg chg="add del mod">
+          <ac:chgData name="Willy-Peter Schaub" userId="707b42e47e16ca84" providerId="LiveId" clId="{BCAB1FCD-C6E0-4904-9922-531ED0D800C6}" dt="2018-07-19T17:58:59.483" v="1146" actId="478"/>
+          <ac:spMkLst>
+            <pc:docMk/>
+            <pc:sldMk cId="556094072" sldId="259"/>
+            <ac:spMk id="41" creationId="{DEA47356-8EEF-4531-8F11-3DBA4F254FAF}"/>
+          </ac:spMkLst>
+        </pc:spChg>
+        <pc:spChg chg="add del mod">
+          <ac:chgData name="Willy-Peter Schaub" userId="707b42e47e16ca84" providerId="LiveId" clId="{BCAB1FCD-C6E0-4904-9922-531ED0D800C6}" dt="2018-07-19T17:57:16.315" v="1091" actId="478"/>
+          <ac:spMkLst>
+            <pc:docMk/>
+            <pc:sldMk cId="556094072" sldId="259"/>
+            <ac:spMk id="46" creationId="{48BB6CFA-49F2-4940-832F-BEE08C0C1C1D}"/>
+          </ac:spMkLst>
+        </pc:spChg>
+        <pc:spChg chg="add mod">
+          <ac:chgData name="Willy-Peter Schaub" userId="707b42e47e16ca84" providerId="LiveId" clId="{BCAB1FCD-C6E0-4904-9922-531ED0D800C6}" dt="2018-07-19T18:20:34.886" v="1429" actId="113"/>
+          <ac:spMkLst>
+            <pc:docMk/>
+            <pc:sldMk cId="556094072" sldId="259"/>
+            <ac:spMk id="47" creationId="{97704393-243E-4A38-A773-E573C1FF9490}"/>
+          </ac:spMkLst>
+        </pc:spChg>
+        <pc:spChg chg="add mod">
+          <ac:chgData name="Willy-Peter Schaub" userId="707b42e47e16ca84" providerId="LiveId" clId="{BCAB1FCD-C6E0-4904-9922-531ED0D800C6}" dt="2018-07-19T18:20:34.886" v="1429" actId="113"/>
+          <ac:spMkLst>
+            <pc:docMk/>
+            <pc:sldMk cId="556094072" sldId="259"/>
+            <ac:spMk id="50" creationId="{4FA5112B-99DA-48AB-A1AA-99EB08FDD832}"/>
+          </ac:spMkLst>
+        </pc:spChg>
+        <pc:spChg chg="add del mod">
+          <ac:chgData name="Willy-Peter Schaub" userId="707b42e47e16ca84" providerId="LiveId" clId="{BCAB1FCD-C6E0-4904-9922-531ED0D800C6}" dt="2018-07-19T18:22:58.087" v="1445" actId="478"/>
+          <ac:spMkLst>
+            <pc:docMk/>
+            <pc:sldMk cId="556094072" sldId="259"/>
+            <ac:spMk id="69" creationId="{BB562614-FA94-435D-AE77-123FB2D6D6A0}"/>
+          </ac:spMkLst>
+        </pc:spChg>
+        <pc:spChg chg="add mod">
+          <ac:chgData name="Willy-Peter Schaub" userId="707b42e47e16ca84" providerId="LiveId" clId="{BCAB1FCD-C6E0-4904-9922-531ED0D800C6}" dt="2018-07-19T18:23:47.256" v="1479" actId="403"/>
+          <ac:spMkLst>
+            <pc:docMk/>
+            <pc:sldMk cId="556094072" sldId="259"/>
+            <ac:spMk id="83" creationId="{FC131873-A574-4BD7-BD23-14AD2C950241}"/>
+          </ac:spMkLst>
+        </pc:spChg>
+        <pc:spChg chg="add mod">
+          <ac:chgData name="Willy-Peter Schaub" userId="707b42e47e16ca84" providerId="LiveId" clId="{BCAB1FCD-C6E0-4904-9922-531ED0D800C6}" dt="2018-07-19T18:23:47.256" v="1479" actId="403"/>
+          <ac:spMkLst>
+            <pc:docMk/>
+            <pc:sldMk cId="556094072" sldId="259"/>
+            <ac:spMk id="84" creationId="{650E1386-D9D1-4D49-9914-769BCE348192}"/>
+          </ac:spMkLst>
+        </pc:spChg>
+        <pc:spChg chg="add mod">
+          <ac:chgData name="Willy-Peter Schaub" userId="707b42e47e16ca84" providerId="LiveId" clId="{BCAB1FCD-C6E0-4904-9922-531ED0D800C6}" dt="2018-07-19T18:23:47.256" v="1479" actId="403"/>
+          <ac:spMkLst>
+            <pc:docMk/>
+            <pc:sldMk cId="556094072" sldId="259"/>
+            <ac:spMk id="87" creationId="{CED94FA3-9A2B-4671-94D0-7CA1C69F2EA1}"/>
+          </ac:spMkLst>
+        </pc:spChg>
+        <pc:spChg chg="add mod">
+          <ac:chgData name="Willy-Peter Schaub" userId="707b42e47e16ca84" providerId="LiveId" clId="{BCAB1FCD-C6E0-4904-9922-531ED0D800C6}" dt="2018-07-19T18:10:11.093" v="1402" actId="12788"/>
+          <ac:spMkLst>
+            <pc:docMk/>
+            <pc:sldMk cId="556094072" sldId="259"/>
+            <ac:spMk id="88" creationId="{54F961EE-446C-4D03-A53A-E3EC28F83F39}"/>
+          </ac:spMkLst>
+        </pc:spChg>
+        <pc:spChg chg="add mod">
+          <ac:chgData name="Willy-Peter Schaub" userId="707b42e47e16ca84" providerId="LiveId" clId="{BCAB1FCD-C6E0-4904-9922-531ED0D800C6}" dt="2018-07-19T18:20:34.886" v="1429" actId="113"/>
+          <ac:spMkLst>
+            <pc:docMk/>
+            <pc:sldMk cId="556094072" sldId="259"/>
+            <ac:spMk id="99" creationId="{B0081B56-A73C-4F91-A88E-2115F05CAF21}"/>
+          </ac:spMkLst>
+        </pc:spChg>
+        <pc:spChg chg="add mod ord">
+          <ac:chgData name="Willy-Peter Schaub" userId="707b42e47e16ca84" providerId="LiveId" clId="{BCAB1FCD-C6E0-4904-9922-531ED0D800C6}" dt="2018-07-19T18:20:34.886" v="1429" actId="113"/>
+          <ac:spMkLst>
+            <pc:docMk/>
+            <pc:sldMk cId="556094072" sldId="259"/>
+            <ac:spMk id="100" creationId="{F253D1C8-8A18-420C-9B83-DF8297FE0AAE}"/>
+          </ac:spMkLst>
+        </pc:spChg>
+        <pc:spChg chg="add mod">
+          <ac:chgData name="Willy-Peter Schaub" userId="707b42e47e16ca84" providerId="LiveId" clId="{BCAB1FCD-C6E0-4904-9922-531ED0D800C6}" dt="2018-07-19T18:20:34.886" v="1429" actId="113"/>
+          <ac:spMkLst>
+            <pc:docMk/>
+            <pc:sldMk cId="556094072" sldId="259"/>
+            <ac:spMk id="101" creationId="{A7103BC0-8E2F-410F-95BF-CDE0398D43EC}"/>
+          </ac:spMkLst>
+        </pc:spChg>
+        <pc:spChg chg="add mod">
+          <ac:chgData name="Willy-Peter Schaub" userId="707b42e47e16ca84" providerId="LiveId" clId="{BCAB1FCD-C6E0-4904-9922-531ED0D800C6}" dt="2018-07-19T18:20:34.886" v="1429" actId="113"/>
+          <ac:spMkLst>
+            <pc:docMk/>
+            <pc:sldMk cId="556094072" sldId="259"/>
+            <ac:spMk id="102" creationId="{12E7575F-E0AE-4E48-8190-4BC4450A57C9}"/>
+          </ac:spMkLst>
+        </pc:spChg>
+        <pc:spChg chg="add mod">
+          <ac:chgData name="Willy-Peter Schaub" userId="707b42e47e16ca84" providerId="LiveId" clId="{BCAB1FCD-C6E0-4904-9922-531ED0D800C6}" dt="2018-07-19T18:20:34.886" v="1429" actId="113"/>
+          <ac:spMkLst>
+            <pc:docMk/>
+            <pc:sldMk cId="556094072" sldId="259"/>
+            <ac:spMk id="103" creationId="{FAB6785B-BF40-482F-809A-9F62B8CACD1A}"/>
+          </ac:spMkLst>
+        </pc:spChg>
+        <pc:spChg chg="add mod">
+          <ac:chgData name="Willy-Peter Schaub" userId="707b42e47e16ca84" providerId="LiveId" clId="{BCAB1FCD-C6E0-4904-9922-531ED0D800C6}" dt="2018-07-19T18:20:34.886" v="1429" actId="113"/>
+          <ac:spMkLst>
+            <pc:docMk/>
+            <pc:sldMk cId="556094072" sldId="259"/>
+            <ac:spMk id="104" creationId="{FCEA1195-6B6B-4657-8BC6-35DAA084DBAF}"/>
+          </ac:spMkLst>
+        </pc:spChg>
+        <pc:spChg chg="add mod">
+          <ac:chgData name="Willy-Peter Schaub" userId="707b42e47e16ca84" providerId="LiveId" clId="{BCAB1FCD-C6E0-4904-9922-531ED0D800C6}" dt="2018-07-19T18:20:34.886" v="1429" actId="113"/>
+          <ac:spMkLst>
+            <pc:docMk/>
+            <pc:sldMk cId="556094072" sldId="259"/>
+            <ac:spMk id="105" creationId="{9FBB4387-5AAA-42AD-B49B-A8CE399081AE}"/>
+          </ac:spMkLst>
+        </pc:spChg>
+        <pc:spChg chg="add mod">
+          <ac:chgData name="Willy-Peter Schaub" userId="707b42e47e16ca84" providerId="LiveId" clId="{BCAB1FCD-C6E0-4904-9922-531ED0D800C6}" dt="2018-07-19T18:20:34.886" v="1429" actId="113"/>
+          <ac:spMkLst>
+            <pc:docMk/>
+            <pc:sldMk cId="556094072" sldId="259"/>
+            <ac:spMk id="106" creationId="{27EF71AD-578D-4868-A798-F923B130E349}"/>
+          </ac:spMkLst>
+        </pc:spChg>
+        <pc:spChg chg="add mod">
+          <ac:chgData name="Willy-Peter Schaub" userId="707b42e47e16ca84" providerId="LiveId" clId="{BCAB1FCD-C6E0-4904-9922-531ED0D800C6}" dt="2018-07-19T18:20:34.886" v="1429" actId="113"/>
+          <ac:spMkLst>
+            <pc:docMk/>
+            <pc:sldMk cId="556094072" sldId="259"/>
+            <ac:spMk id="107" creationId="{63846C72-F921-4863-9073-81C12C3CEAE4}"/>
+          </ac:spMkLst>
+        </pc:spChg>
+        <pc:spChg chg="add del mod">
+          <ac:chgData name="Willy-Peter Schaub" userId="707b42e47e16ca84" providerId="LiveId" clId="{BCAB1FCD-C6E0-4904-9922-531ED0D800C6}" dt="2018-07-19T18:07:42.099" v="1330" actId="478"/>
+          <ac:spMkLst>
+            <pc:docMk/>
+            <pc:sldMk cId="556094072" sldId="259"/>
+            <ac:spMk id="108" creationId="{8E2D01B9-6DBC-4362-A2CC-985E5066C77B}"/>
+          </ac:spMkLst>
+        </pc:spChg>
+        <pc:grpChg chg="add mod">
+          <ac:chgData name="Willy-Peter Schaub" userId="707b42e47e16ca84" providerId="LiveId" clId="{BCAB1FCD-C6E0-4904-9922-531ED0D800C6}" dt="2018-07-19T18:21:42.580" v="1433" actId="1076"/>
+          <ac:grpSpMkLst>
+            <pc:docMk/>
+            <pc:sldMk cId="556094072" sldId="259"/>
+            <ac:grpSpMk id="90" creationId="{A26D1EAA-ECE8-403C-9D52-1B2B6BBC1808}"/>
+          </ac:grpSpMkLst>
+        </pc:grpChg>
+        <pc:grpChg chg="add mod">
+          <ac:chgData name="Willy-Peter Schaub" userId="707b42e47e16ca84" providerId="LiveId" clId="{BCAB1FCD-C6E0-4904-9922-531ED0D800C6}" dt="2018-07-19T18:03:45.169" v="1268" actId="1036"/>
+          <ac:grpSpMkLst>
+            <pc:docMk/>
+            <pc:sldMk cId="556094072" sldId="259"/>
+            <ac:grpSpMk id="91" creationId="{B7A4BFA0-9EF9-49E8-A2B3-247A8C66DA2B}"/>
+          </ac:grpSpMkLst>
+        </pc:grpChg>
+        <pc:picChg chg="add mod">
+          <ac:chgData name="Willy-Peter Schaub" userId="707b42e47e16ca84" providerId="LiveId" clId="{BCAB1FCD-C6E0-4904-9922-531ED0D800C6}" dt="2018-07-19T18:10:37.809" v="1403" actId="1076"/>
+          <ac:picMkLst>
+            <pc:docMk/>
+            <pc:sldMk cId="556094072" sldId="259"/>
+            <ac:picMk id="20" creationId="{912175BC-720C-446D-A9B9-46E66865268B}"/>
+          </ac:picMkLst>
+        </pc:picChg>
+        <pc:picChg chg="add del mod">
+          <ac:chgData name="Willy-Peter Schaub" userId="707b42e47e16ca84" providerId="LiveId" clId="{BCAB1FCD-C6E0-4904-9922-531ED0D800C6}" dt="2018-07-19T17:55:39.668" v="1064" actId="478"/>
+          <ac:picMkLst>
+            <pc:docMk/>
+            <pc:sldMk cId="556094072" sldId="259"/>
+            <ac:picMk id="21" creationId="{3A2613FF-2C5D-4AFD-B6BE-63CBC72845D5}"/>
+          </ac:picMkLst>
+        </pc:picChg>
+        <pc:picChg chg="add mod">
+          <ac:chgData name="Willy-Peter Schaub" userId="707b42e47e16ca84" providerId="LiveId" clId="{BCAB1FCD-C6E0-4904-9922-531ED0D800C6}" dt="2018-07-19T18:10:37.809" v="1403" actId="1076"/>
+          <ac:picMkLst>
+            <pc:docMk/>
+            <pc:sldMk cId="556094072" sldId="259"/>
+            <ac:picMk id="23" creationId="{6096B1C1-AE4D-4DC4-9464-45EA49545516}"/>
+          </ac:picMkLst>
+        </pc:picChg>
+        <pc:picChg chg="add mod">
+          <ac:chgData name="Willy-Peter Schaub" userId="707b42e47e16ca84" providerId="LiveId" clId="{BCAB1FCD-C6E0-4904-9922-531ED0D800C6}" dt="2018-07-19T18:25:46.363" v="1519" actId="1035"/>
+          <ac:picMkLst>
+            <pc:docMk/>
+            <pc:sldMk cId="556094072" sldId="259"/>
+            <ac:picMk id="28" creationId="{F217EB96-5E0E-49E2-B41F-46CB9DFEC35C}"/>
+          </ac:picMkLst>
+        </pc:picChg>
+        <pc:picChg chg="add del mod">
+          <ac:chgData name="Willy-Peter Schaub" userId="707b42e47e16ca84" providerId="LiveId" clId="{BCAB1FCD-C6E0-4904-9922-531ED0D800C6}" dt="2018-07-19T17:59:01.021" v="1147" actId="478"/>
+          <ac:picMkLst>
+            <pc:docMk/>
+            <pc:sldMk cId="556094072" sldId="259"/>
+            <ac:picMk id="29" creationId="{FFFB3080-9E77-4796-B686-7FAD591470C5}"/>
+          </ac:picMkLst>
+        </pc:picChg>
+        <pc:picChg chg="add del mod">
+          <ac:chgData name="Willy-Peter Schaub" userId="707b42e47e16ca84" providerId="LiveId" clId="{BCAB1FCD-C6E0-4904-9922-531ED0D800C6}" dt="2018-07-19T17:58:59.483" v="1146" actId="478"/>
+          <ac:picMkLst>
+            <pc:docMk/>
+            <pc:sldMk cId="556094072" sldId="259"/>
+            <ac:picMk id="30" creationId="{F98A0870-3DFD-47FE-9A9A-4DF9CD962172}"/>
+          </ac:picMkLst>
+        </pc:picChg>
+        <pc:picChg chg="add del mod">
+          <ac:chgData name="Willy-Peter Schaub" userId="707b42e47e16ca84" providerId="LiveId" clId="{BCAB1FCD-C6E0-4904-9922-531ED0D800C6}" dt="2018-07-19T17:58:59.483" v="1146" actId="478"/>
+          <ac:picMkLst>
+            <pc:docMk/>
+            <pc:sldMk cId="556094072" sldId="259"/>
+            <ac:picMk id="42" creationId="{701CBB70-ACFD-4E78-B62C-6EEB912A53C3}"/>
+          </ac:picMkLst>
+        </pc:picChg>
+        <pc:picChg chg="add del mod">
+          <ac:chgData name="Willy-Peter Schaub" userId="707b42e47e16ca84" providerId="LiveId" clId="{BCAB1FCD-C6E0-4904-9922-531ED0D800C6}" dt="2018-07-19T17:58:59.483" v="1146" actId="478"/>
+          <ac:picMkLst>
+            <pc:docMk/>
+            <pc:sldMk cId="556094072" sldId="259"/>
+            <ac:picMk id="43" creationId="{EF055BB7-3DFA-45CE-BE4B-68C1FF23172A}"/>
+          </ac:picMkLst>
+        </pc:picChg>
+        <pc:picChg chg="add mod">
+          <ac:chgData name="Willy-Peter Schaub" userId="707b42e47e16ca84" providerId="LiveId" clId="{BCAB1FCD-C6E0-4904-9922-531ED0D800C6}" dt="2018-07-19T18:03:28.417" v="1259" actId="164"/>
+          <ac:picMkLst>
+            <pc:docMk/>
+            <pc:sldMk cId="556094072" sldId="259"/>
+            <ac:picMk id="44" creationId="{00AB93CB-C135-4182-A0F9-8478382FAB36}"/>
+          </ac:picMkLst>
+        </pc:picChg>
+        <pc:picChg chg="add mod">
+          <ac:chgData name="Willy-Peter Schaub" userId="707b42e47e16ca84" providerId="LiveId" clId="{BCAB1FCD-C6E0-4904-9922-531ED0D800C6}" dt="2018-07-19T18:03:28.417" v="1259" actId="164"/>
+          <ac:picMkLst>
+            <pc:docMk/>
+            <pc:sldMk cId="556094072" sldId="259"/>
+            <ac:picMk id="45" creationId="{ADF69656-8733-4CC0-A9BE-DFFF1F4CE015}"/>
+          </ac:picMkLst>
+        </pc:picChg>
+        <pc:picChg chg="add mod">
+          <ac:chgData name="Willy-Peter Schaub" userId="707b42e47e16ca84" providerId="LiveId" clId="{BCAB1FCD-C6E0-4904-9922-531ED0D800C6}" dt="2018-07-19T18:02:55.133" v="1256" actId="164"/>
+          <ac:picMkLst>
+            <pc:docMk/>
+            <pc:sldMk cId="556094072" sldId="259"/>
+            <ac:picMk id="48" creationId="{5E7B6EB3-0C9C-4549-A87A-0CAB1C4411E4}"/>
+          </ac:picMkLst>
+        </pc:picChg>
+        <pc:picChg chg="add mod">
+          <ac:chgData name="Willy-Peter Schaub" userId="707b42e47e16ca84" providerId="LiveId" clId="{BCAB1FCD-C6E0-4904-9922-531ED0D800C6}" dt="2018-07-19T18:02:55.133" v="1256" actId="164"/>
+          <ac:picMkLst>
+            <pc:docMk/>
+            <pc:sldMk cId="556094072" sldId="259"/>
+            <ac:picMk id="49" creationId="{30EE586D-CADB-4AF2-A802-84FA754DE9FB}"/>
+          </ac:picMkLst>
+        </pc:picChg>
+        <pc:cxnChg chg="add del mod">
+          <ac:chgData name="Willy-Peter Schaub" userId="707b42e47e16ca84" providerId="LiveId" clId="{BCAB1FCD-C6E0-4904-9922-531ED0D800C6}" dt="2018-07-19T18:12:50.457" v="1420" actId="478"/>
+          <ac:cxnSpMkLst>
+            <pc:docMk/>
+            <pc:sldMk cId="556094072" sldId="259"/>
+            <ac:cxnSpMk id="52" creationId="{5A652A5E-0DCC-46D5-B97F-7AAA8CFA72E1}"/>
+          </ac:cxnSpMkLst>
+        </pc:cxnChg>
+        <pc:cxnChg chg="add del mod">
+          <ac:chgData name="Willy-Peter Schaub" userId="707b42e47e16ca84" providerId="LiveId" clId="{BCAB1FCD-C6E0-4904-9922-531ED0D800C6}" dt="2018-07-19T18:12:52.937" v="1421" actId="478"/>
+          <ac:cxnSpMkLst>
+            <pc:docMk/>
+            <pc:sldMk cId="556094072" sldId="259"/>
+            <ac:cxnSpMk id="53" creationId="{23C382FF-FF7B-47A5-B126-9798AE9A4775}"/>
+          </ac:cxnSpMkLst>
+        </pc:cxnChg>
+        <pc:cxnChg chg="add del mod">
+          <ac:chgData name="Willy-Peter Schaub" userId="707b42e47e16ca84" providerId="LiveId" clId="{BCAB1FCD-C6E0-4904-9922-531ED0D800C6}" dt="2018-07-19T18:12:47.307" v="1418" actId="478"/>
+          <ac:cxnSpMkLst>
+            <pc:docMk/>
+            <pc:sldMk cId="556094072" sldId="259"/>
+            <ac:cxnSpMk id="56" creationId="{A2EE9A62-A67C-468E-932E-D1AF162CFA55}"/>
+          </ac:cxnSpMkLst>
+        </pc:cxnChg>
+        <pc:cxnChg chg="add del mod">
+          <ac:chgData name="Willy-Peter Schaub" userId="707b42e47e16ca84" providerId="LiveId" clId="{BCAB1FCD-C6E0-4904-9922-531ED0D800C6}" dt="2018-07-19T18:12:43.922" v="1416" actId="478"/>
+          <ac:cxnSpMkLst>
+            <pc:docMk/>
+            <pc:sldMk cId="556094072" sldId="259"/>
+            <ac:cxnSpMk id="59" creationId="{53A01454-6378-4E54-84A2-A5826F64C486}"/>
+          </ac:cxnSpMkLst>
+        </pc:cxnChg>
+        <pc:cxnChg chg="add del mod">
+          <ac:chgData name="Willy-Peter Schaub" userId="707b42e47e16ca84" providerId="LiveId" clId="{BCAB1FCD-C6E0-4904-9922-531ED0D800C6}" dt="2018-07-19T18:12:37.871" v="1414" actId="478"/>
+          <ac:cxnSpMkLst>
+            <pc:docMk/>
+            <pc:sldMk cId="556094072" sldId="259"/>
+            <ac:cxnSpMk id="62" creationId="{583319C1-C157-45B1-8DCB-2AD2703BB4DD}"/>
+          </ac:cxnSpMkLst>
+        </pc:cxnChg>
+        <pc:cxnChg chg="add del mod">
+          <ac:chgData name="Willy-Peter Schaub" userId="707b42e47e16ca84" providerId="LiveId" clId="{BCAB1FCD-C6E0-4904-9922-531ED0D800C6}" dt="2018-07-19T18:22:57.015" v="1444" actId="478"/>
+          <ac:cxnSpMkLst>
+            <pc:docMk/>
+            <pc:sldMk cId="556094072" sldId="259"/>
+            <ac:cxnSpMk id="63" creationId="{205958BB-A855-4683-8AA2-DD3D0F4AC8B2}"/>
+          </ac:cxnSpMkLst>
+        </pc:cxnChg>
+        <pc:cxnChg chg="add del mod">
+          <ac:chgData name="Willy-Peter Schaub" userId="707b42e47e16ca84" providerId="LiveId" clId="{BCAB1FCD-C6E0-4904-9922-531ED0D800C6}" dt="2018-07-19T18:12:32.239" v="1412" actId="478"/>
+          <ac:cxnSpMkLst>
+            <pc:docMk/>
+            <pc:sldMk cId="556094072" sldId="259"/>
+            <ac:cxnSpMk id="65" creationId="{5E7D57C4-7910-49A6-A9DD-2D6B5F071CE1}"/>
+          </ac:cxnSpMkLst>
+        </pc:cxnChg>
+        <pc:cxnChg chg="add mod">
+          <ac:chgData name="Willy-Peter Schaub" userId="707b42e47e16ca84" providerId="LiveId" clId="{BCAB1FCD-C6E0-4904-9922-531ED0D800C6}" dt="2018-07-19T18:25:53.442" v="1521" actId="14100"/>
+          <ac:cxnSpMkLst>
+            <pc:docMk/>
+            <pc:sldMk cId="556094072" sldId="259"/>
+            <ac:cxnSpMk id="68" creationId="{6BCB2922-9D9F-4072-998A-3DA7668F73BF}"/>
+          </ac:cxnSpMkLst>
+        </pc:cxnChg>
+        <pc:cxnChg chg="add mod">
+          <ac:chgData name="Willy-Peter Schaub" userId="707b42e47e16ca84" providerId="LiveId" clId="{BCAB1FCD-C6E0-4904-9922-531ED0D800C6}" dt="2018-07-19T18:22:23.420" v="1443" actId="14100"/>
+          <ac:cxnSpMkLst>
+            <pc:docMk/>
+            <pc:sldMk cId="556094072" sldId="259"/>
+            <ac:cxnSpMk id="71" creationId="{DB35B8E3-2639-4460-86BE-67EE826D563A}"/>
+          </ac:cxnSpMkLst>
+        </pc:cxnChg>
+        <pc:cxnChg chg="add mod">
+          <ac:chgData name="Willy-Peter Schaub" userId="707b42e47e16ca84" providerId="LiveId" clId="{BCAB1FCD-C6E0-4904-9922-531ED0D800C6}" dt="2018-07-19T18:24:29.121" v="1485" actId="14100"/>
+          <ac:cxnSpMkLst>
+            <pc:docMk/>
+            <pc:sldMk cId="556094072" sldId="259"/>
+            <ac:cxnSpMk id="72" creationId="{21E8D17C-DEB6-4167-8715-C482260072ED}"/>
+          </ac:cxnSpMkLst>
+        </pc:cxnChg>
+        <pc:cxnChg chg="add mod">
+          <ac:chgData name="Willy-Peter Schaub" userId="707b42e47e16ca84" providerId="LiveId" clId="{BCAB1FCD-C6E0-4904-9922-531ED0D800C6}" dt="2018-07-19T18:21:42.580" v="1433" actId="1076"/>
+          <ac:cxnSpMkLst>
+            <pc:docMk/>
+            <pc:sldMk cId="556094072" sldId="259"/>
+            <ac:cxnSpMk id="75" creationId="{FE109AF0-05B7-4676-A368-D5EEED99764E}"/>
+          </ac:cxnSpMkLst>
+        </pc:cxnChg>
+        <pc:cxnChg chg="add mod">
+          <ac:chgData name="Willy-Peter Schaub" userId="707b42e47e16ca84" providerId="LiveId" clId="{BCAB1FCD-C6E0-4904-9922-531ED0D800C6}" dt="2018-07-19T18:25:50.857" v="1520" actId="14100"/>
+          <ac:cxnSpMkLst>
+            <pc:docMk/>
+            <pc:sldMk cId="556094072" sldId="259"/>
+            <ac:cxnSpMk id="94" creationId="{A7DA876C-71B2-4B13-A6FF-03676DE371E3}"/>
+          </ac:cxnSpMkLst>
+        </pc:cxnChg>
+        <pc:cxnChg chg="add del mod">
+          <ac:chgData name="Willy-Peter Schaub" userId="707b42e47e16ca84" providerId="LiveId" clId="{BCAB1FCD-C6E0-4904-9922-531ED0D800C6}" dt="2018-07-19T18:08:39.978" v="1348" actId="478"/>
+          <ac:cxnSpMkLst>
+            <pc:docMk/>
+            <pc:sldMk cId="556094072" sldId="259"/>
+            <ac:cxnSpMk id="109" creationId="{7EA27A68-CB9D-4144-A5A9-E298AE9BA3C9}"/>
+          </ac:cxnSpMkLst>
+        </pc:cxnChg>
+        <pc:cxnChg chg="add del mod">
+          <ac:chgData name="Willy-Peter Schaub" userId="707b42e47e16ca84" providerId="LiveId" clId="{BCAB1FCD-C6E0-4904-9922-531ED0D800C6}" dt="2018-07-19T18:08:39.078" v="1347" actId="478"/>
+          <ac:cxnSpMkLst>
+            <pc:docMk/>
+            <pc:sldMk cId="556094072" sldId="259"/>
+            <ac:cxnSpMk id="112" creationId="{91AB3A21-EA7A-4BFE-AD72-A2F240ADC324}"/>
+          </ac:cxnSpMkLst>
+        </pc:cxnChg>
+        <pc:cxnChg chg="add del mod">
+          <ac:chgData name="Willy-Peter Schaub" userId="707b42e47e16ca84" providerId="LiveId" clId="{BCAB1FCD-C6E0-4904-9922-531ED0D800C6}" dt="2018-07-19T18:08:38.662" v="1346" actId="478"/>
+          <ac:cxnSpMkLst>
+            <pc:docMk/>
+            <pc:sldMk cId="556094072" sldId="259"/>
+            <ac:cxnSpMk id="115" creationId="{663A225A-BAD0-4FDC-B434-80BAF1C22A54}"/>
+          </ac:cxnSpMkLst>
+        </pc:cxnChg>
+        <pc:cxnChg chg="add del mod">
+          <ac:chgData name="Willy-Peter Schaub" userId="707b42e47e16ca84" providerId="LiveId" clId="{BCAB1FCD-C6E0-4904-9922-531ED0D800C6}" dt="2018-07-19T18:08:36.897" v="1345" actId="478"/>
+          <ac:cxnSpMkLst>
+            <pc:docMk/>
+            <pc:sldMk cId="556094072" sldId="259"/>
+            <ac:cxnSpMk id="118" creationId="{3F65CEE1-5A1C-47D6-8346-409ABE32E4F4}"/>
+          </ac:cxnSpMkLst>
+        </pc:cxnChg>
+        <pc:cxnChg chg="add mod">
+          <ac:chgData name="Willy-Peter Schaub" userId="707b42e47e16ca84" providerId="LiveId" clId="{BCAB1FCD-C6E0-4904-9922-531ED0D800C6}" dt="2018-07-19T18:10:11.093" v="1402" actId="12788"/>
+          <ac:cxnSpMkLst>
+            <pc:docMk/>
+            <pc:sldMk cId="556094072" sldId="259"/>
+            <ac:cxnSpMk id="123" creationId="{722695FF-DB0A-4BD1-8F3C-B4D9AE83C671}"/>
+          </ac:cxnSpMkLst>
+        </pc:cxnChg>
+        <pc:cxnChg chg="add mod">
+          <ac:chgData name="Willy-Peter Schaub" userId="707b42e47e16ca84" providerId="LiveId" clId="{BCAB1FCD-C6E0-4904-9922-531ED0D800C6}" dt="2018-07-19T18:10:11.093" v="1402" actId="12788"/>
+          <ac:cxnSpMkLst>
+            <pc:docMk/>
+            <pc:sldMk cId="556094072" sldId="259"/>
+            <ac:cxnSpMk id="124" creationId="{AB9A135F-54AE-4FFD-A18C-633C3FCF919D}"/>
+          </ac:cxnSpMkLst>
+        </pc:cxnChg>
+        <pc:cxnChg chg="add mod">
+          <ac:chgData name="Willy-Peter Schaub" userId="707b42e47e16ca84" providerId="LiveId" clId="{BCAB1FCD-C6E0-4904-9922-531ED0D800C6}" dt="2018-07-19T18:10:11.093" v="1402" actId="12788"/>
+          <ac:cxnSpMkLst>
+            <pc:docMk/>
+            <pc:sldMk cId="556094072" sldId="259"/>
+            <ac:cxnSpMk id="127" creationId="{BD44C4E1-FEB2-4165-8C28-E756F14486AF}"/>
+          </ac:cxnSpMkLst>
+        </pc:cxnChg>
+        <pc:cxnChg chg="add mod">
+          <ac:chgData name="Willy-Peter Schaub" userId="707b42e47e16ca84" providerId="LiveId" clId="{BCAB1FCD-C6E0-4904-9922-531ED0D800C6}" dt="2018-07-19T18:10:11.093" v="1402" actId="12788"/>
+          <ac:cxnSpMkLst>
+            <pc:docMk/>
+            <pc:sldMk cId="556094072" sldId="259"/>
+            <ac:cxnSpMk id="130" creationId="{D3F13F2F-30E8-4882-AA5C-BC8711B9CDD8}"/>
+          </ac:cxnSpMkLst>
+        </pc:cxnChg>
+        <pc:cxnChg chg="add mod">
+          <ac:chgData name="Willy-Peter Schaub" userId="707b42e47e16ca84" providerId="LiveId" clId="{BCAB1FCD-C6E0-4904-9922-531ED0D800C6}" dt="2018-07-19T18:10:11.093" v="1402" actId="12788"/>
+          <ac:cxnSpMkLst>
+            <pc:docMk/>
+            <pc:sldMk cId="556094072" sldId="259"/>
+            <ac:cxnSpMk id="133" creationId="{57DE662A-4A15-4FC6-A09F-062CAA56A7C6}"/>
+          </ac:cxnSpMkLst>
+        </pc:cxnChg>
+        <pc:cxnChg chg="add mod">
+          <ac:chgData name="Willy-Peter Schaub" userId="707b42e47e16ca84" providerId="LiveId" clId="{BCAB1FCD-C6E0-4904-9922-531ED0D800C6}" dt="2018-07-19T18:10:11.093" v="1402" actId="12788"/>
+          <ac:cxnSpMkLst>
+            <pc:docMk/>
+            <pc:sldMk cId="556094072" sldId="259"/>
+            <ac:cxnSpMk id="136" creationId="{76F8C607-D9B3-4E4B-874D-D43664C7F8A7}"/>
+          </ac:cxnSpMkLst>
+        </pc:cxnChg>
+        <pc:cxnChg chg="add mod">
+          <ac:chgData name="Willy-Peter Schaub" userId="707b42e47e16ca84" providerId="LiveId" clId="{BCAB1FCD-C6E0-4904-9922-531ED0D800C6}" dt="2018-07-19T18:10:11.093" v="1402" actId="12788"/>
+          <ac:cxnSpMkLst>
+            <pc:docMk/>
+            <pc:sldMk cId="556094072" sldId="259"/>
+            <ac:cxnSpMk id="139" creationId="{1FABCA5A-90D9-48CA-BEB7-9494B078697C}"/>
+          </ac:cxnSpMkLst>
+        </pc:cxnChg>
+        <pc:cxnChg chg="add mod">
+          <ac:chgData name="Willy-Peter Schaub" userId="707b42e47e16ca84" providerId="LiveId" clId="{BCAB1FCD-C6E0-4904-9922-531ED0D800C6}" dt="2018-07-19T18:10:11.093" v="1402" actId="12788"/>
+          <ac:cxnSpMkLst>
+            <pc:docMk/>
+            <pc:sldMk cId="556094072" sldId="259"/>
+            <ac:cxnSpMk id="142" creationId="{86C0FD01-989D-4110-9492-3EE0B249988F}"/>
+          </ac:cxnSpMkLst>
+        </pc:cxnChg>
+        <pc:cxnChg chg="add mod">
+          <ac:chgData name="Willy-Peter Schaub" userId="707b42e47e16ca84" providerId="LiveId" clId="{BCAB1FCD-C6E0-4904-9922-531ED0D800C6}" dt="2018-07-19T18:13:15.894" v="1425" actId="692"/>
+          <ac:cxnSpMkLst>
+            <pc:docMk/>
+            <pc:sldMk cId="556094072" sldId="259"/>
+            <ac:cxnSpMk id="156" creationId="{5E13D01A-D69F-48D2-9E2C-668C7E261C14}"/>
+          </ac:cxnSpMkLst>
+        </pc:cxnChg>
       </pc:sldChg>
     </pc:docChg>
   </pc:docChgLst>
@@ -841,7 +1546,7 @@
           <a:p>
             <a:fld id="{CC509A15-3992-46FA-B277-442CE81F42DA}" type="datetimeFigureOut">
               <a:rPr lang="en-CA" smtClean="0"/>
-              <a:t>2018-07-13</a:t>
+              <a:t>2018-07-19</a:t>
             </a:fld>
             <a:endParaRPr lang="en-CA"/>
           </a:p>
@@ -1041,7 +1746,7 @@
           <a:p>
             <a:fld id="{CC509A15-3992-46FA-B277-442CE81F42DA}" type="datetimeFigureOut">
               <a:rPr lang="en-CA" smtClean="0"/>
-              <a:t>2018-07-13</a:t>
+              <a:t>2018-07-19</a:t>
             </a:fld>
             <a:endParaRPr lang="en-CA"/>
           </a:p>
@@ -1251,7 +1956,7 @@
           <a:p>
             <a:fld id="{CC509A15-3992-46FA-B277-442CE81F42DA}" type="datetimeFigureOut">
               <a:rPr lang="en-CA" smtClean="0"/>
-              <a:t>2018-07-13</a:t>
+              <a:t>2018-07-19</a:t>
             </a:fld>
             <a:endParaRPr lang="en-CA"/>
           </a:p>
@@ -1451,7 +2156,7 @@
           <a:p>
             <a:fld id="{CC509A15-3992-46FA-B277-442CE81F42DA}" type="datetimeFigureOut">
               <a:rPr lang="en-CA" smtClean="0"/>
-              <a:t>2018-07-13</a:t>
+              <a:t>2018-07-19</a:t>
             </a:fld>
             <a:endParaRPr lang="en-CA"/>
           </a:p>
@@ -1727,7 +2432,7 @@
           <a:p>
             <a:fld id="{CC509A15-3992-46FA-B277-442CE81F42DA}" type="datetimeFigureOut">
               <a:rPr lang="en-CA" smtClean="0"/>
-              <a:t>2018-07-13</a:t>
+              <a:t>2018-07-19</a:t>
             </a:fld>
             <a:endParaRPr lang="en-CA"/>
           </a:p>
@@ -1995,7 +2700,7 @@
           <a:p>
             <a:fld id="{CC509A15-3992-46FA-B277-442CE81F42DA}" type="datetimeFigureOut">
               <a:rPr lang="en-CA" smtClean="0"/>
-              <a:t>2018-07-13</a:t>
+              <a:t>2018-07-19</a:t>
             </a:fld>
             <a:endParaRPr lang="en-CA"/>
           </a:p>
@@ -2410,7 +3115,7 @@
           <a:p>
             <a:fld id="{CC509A15-3992-46FA-B277-442CE81F42DA}" type="datetimeFigureOut">
               <a:rPr lang="en-CA" smtClean="0"/>
-              <a:t>2018-07-13</a:t>
+              <a:t>2018-07-19</a:t>
             </a:fld>
             <a:endParaRPr lang="en-CA"/>
           </a:p>
@@ -2552,7 +3257,7 @@
           <a:p>
             <a:fld id="{CC509A15-3992-46FA-B277-442CE81F42DA}" type="datetimeFigureOut">
               <a:rPr lang="en-CA" smtClean="0"/>
-              <a:t>2018-07-13</a:t>
+              <a:t>2018-07-19</a:t>
             </a:fld>
             <a:endParaRPr lang="en-CA"/>
           </a:p>
@@ -2665,7 +3370,7 @@
           <a:p>
             <a:fld id="{CC509A15-3992-46FA-B277-442CE81F42DA}" type="datetimeFigureOut">
               <a:rPr lang="en-CA" smtClean="0"/>
-              <a:t>2018-07-13</a:t>
+              <a:t>2018-07-19</a:t>
             </a:fld>
             <a:endParaRPr lang="en-CA"/>
           </a:p>
@@ -2978,7 +3683,7 @@
           <a:p>
             <a:fld id="{CC509A15-3992-46FA-B277-442CE81F42DA}" type="datetimeFigureOut">
               <a:rPr lang="en-CA" smtClean="0"/>
-              <a:t>2018-07-13</a:t>
+              <a:t>2018-07-19</a:t>
             </a:fld>
             <a:endParaRPr lang="en-CA"/>
           </a:p>
@@ -3267,7 +3972,7 @@
           <a:p>
             <a:fld id="{CC509A15-3992-46FA-B277-442CE81F42DA}" type="datetimeFigureOut">
               <a:rPr lang="en-CA" smtClean="0"/>
-              <a:t>2018-07-13</a:t>
+              <a:t>2018-07-19</a:t>
             </a:fld>
             <a:endParaRPr lang="en-CA"/>
           </a:p>
@@ -3510,7 +4215,7 @@
           <a:p>
             <a:fld id="{CC509A15-3992-46FA-B277-442CE81F42DA}" type="datetimeFigureOut">
               <a:rPr lang="en-CA" smtClean="0"/>
-              <a:t>2018-07-13</a:t>
+              <a:t>2018-07-19</a:t>
             </a:fld>
             <a:endParaRPr lang="en-CA"/>
           </a:p>
@@ -6416,6 +7121,2705 @@
 </p:sld>
 </file>
 
+<file path=ppt/slides/slide4.xml><?xml version="1.0" encoding="utf-8"?>
+<p:sld xmlns:a="http://schemas.openxmlformats.org/drawingml/2006/main" xmlns:r="http://schemas.openxmlformats.org/officeDocument/2006/relationships" xmlns:p="http://schemas.openxmlformats.org/presentationml/2006/main">
+  <p:cSld>
+    <p:spTree>
+      <p:nvGrpSpPr>
+        <p:cNvPr id="1" name=""/>
+        <p:cNvGrpSpPr/>
+        <p:nvPr/>
+      </p:nvGrpSpPr>
+      <p:grpSpPr>
+        <a:xfrm>
+          <a:off x="0" y="0"/>
+          <a:ext cx="0" cy="0"/>
+          <a:chOff x="0" y="0"/>
+          <a:chExt cx="0" cy="0"/>
+        </a:xfrm>
+      </p:grpSpPr>
+      <p:sp>
+        <p:nvSpPr>
+          <p:cNvPr id="2" name="Rectangle: Rounded Corners 1">
+            <a:extLst>
+              <a:ext uri="{FF2B5EF4-FFF2-40B4-BE49-F238E27FC236}">
+                <a16:creationId xmlns:a16="http://schemas.microsoft.com/office/drawing/2014/main" id="{3C43FB5C-4BFE-40E8-80E3-2B97592FDE12}"/>
+              </a:ext>
+            </a:extLst>
+          </p:cNvPr>
+          <p:cNvSpPr/>
+          <p:nvPr/>
+        </p:nvSpPr>
+        <p:spPr>
+          <a:xfrm>
+            <a:off x="420914" y="348341"/>
+            <a:ext cx="6008912" cy="304801"/>
+          </a:xfrm>
+          <a:prstGeom prst="roundRect">
+            <a:avLst/>
+          </a:prstGeom>
+        </p:spPr>
+        <p:style>
+          <a:lnRef idx="2">
+            <a:schemeClr val="accent1"/>
+          </a:lnRef>
+          <a:fillRef idx="1">
+            <a:schemeClr val="lt1"/>
+          </a:fillRef>
+          <a:effectRef idx="0">
+            <a:schemeClr val="accent1"/>
+          </a:effectRef>
+          <a:fontRef idx="minor">
+            <a:schemeClr val="dk1"/>
+          </a:fontRef>
+        </p:style>
+        <p:txBody>
+          <a:bodyPr lIns="36000" tIns="36000" rIns="36000" bIns="36000" rtlCol="0" anchor="ctr"/>
+          <a:lstStyle/>
+          <a:p>
+            <a:pPr algn="r"/>
+            <a:r>
+              <a:rPr lang="en-CA" sz="1600" dirty="0">
+                <a:solidFill>
+                  <a:srgbClr val="0070C0"/>
+                </a:solidFill>
+                <a:cs typeface="Segoe UI Light" panose="020B0502040204020203" pitchFamily="34" charset="0"/>
+              </a:rPr>
+              <a:t>Do you want to manage servers and infrastructure?</a:t>
+            </a:r>
+          </a:p>
+        </p:txBody>
+      </p:sp>
+      <p:sp>
+        <p:nvSpPr>
+          <p:cNvPr id="3" name="Rectangle: Rounded Corners 2">
+            <a:extLst>
+              <a:ext uri="{FF2B5EF4-FFF2-40B4-BE49-F238E27FC236}">
+                <a16:creationId xmlns:a16="http://schemas.microsoft.com/office/drawing/2014/main" id="{325D024E-AA16-480D-BE98-CD2DFC135D39}"/>
+              </a:ext>
+            </a:extLst>
+          </p:cNvPr>
+          <p:cNvSpPr/>
+          <p:nvPr/>
+        </p:nvSpPr>
+        <p:spPr>
+          <a:xfrm>
+            <a:off x="420914" y="1036660"/>
+            <a:ext cx="6008912" cy="297540"/>
+          </a:xfrm>
+          <a:prstGeom prst="roundRect">
+            <a:avLst/>
+          </a:prstGeom>
+        </p:spPr>
+        <p:style>
+          <a:lnRef idx="2">
+            <a:schemeClr val="accent1"/>
+          </a:lnRef>
+          <a:fillRef idx="1">
+            <a:schemeClr val="lt1"/>
+          </a:fillRef>
+          <a:effectRef idx="0">
+            <a:schemeClr val="accent1"/>
+          </a:effectRef>
+          <a:fontRef idx="minor">
+            <a:schemeClr val="dk1"/>
+          </a:fontRef>
+        </p:style>
+        <p:txBody>
+          <a:bodyPr lIns="36000" tIns="36000" rIns="36000" bIns="36000" rtlCol="0" anchor="ctr"/>
+          <a:lstStyle/>
+          <a:p>
+            <a:pPr algn="r"/>
+            <a:r>
+              <a:rPr lang="en-CA" sz="1600" dirty="0">
+                <a:solidFill>
+                  <a:srgbClr val="0070C0"/>
+                </a:solidFill>
+                <a:cs typeface="Segoe UI Light" panose="020B0502040204020203" pitchFamily="34" charset="0"/>
+              </a:rPr>
+              <a:t>Do you want to manage security and data privacy?</a:t>
+            </a:r>
+          </a:p>
+        </p:txBody>
+      </p:sp>
+      <p:sp>
+        <p:nvSpPr>
+          <p:cNvPr id="4" name="Rectangle: Rounded Corners 3">
+            <a:extLst>
+              <a:ext uri="{FF2B5EF4-FFF2-40B4-BE49-F238E27FC236}">
+                <a16:creationId xmlns:a16="http://schemas.microsoft.com/office/drawing/2014/main" id="{1CCAAE3C-4AA8-4654-8CF7-EFB4F0601C90}"/>
+              </a:ext>
+            </a:extLst>
+          </p:cNvPr>
+          <p:cNvSpPr/>
+          <p:nvPr/>
+        </p:nvSpPr>
+        <p:spPr>
+          <a:xfrm>
+            <a:off x="420914" y="1698170"/>
+            <a:ext cx="6008912" cy="304800"/>
+          </a:xfrm>
+          <a:prstGeom prst="roundRect">
+            <a:avLst/>
+          </a:prstGeom>
+        </p:spPr>
+        <p:style>
+          <a:lnRef idx="2">
+            <a:schemeClr val="accent1"/>
+          </a:lnRef>
+          <a:fillRef idx="1">
+            <a:schemeClr val="lt1"/>
+          </a:fillRef>
+          <a:effectRef idx="0">
+            <a:schemeClr val="accent1"/>
+          </a:effectRef>
+          <a:fontRef idx="minor">
+            <a:schemeClr val="dk1"/>
+          </a:fontRef>
+        </p:style>
+        <p:txBody>
+          <a:bodyPr lIns="36000" tIns="36000" rIns="36000" bIns="36000" rtlCol="0" anchor="ctr"/>
+          <a:lstStyle/>
+          <a:p>
+            <a:pPr algn="r"/>
+            <a:r>
+              <a:rPr lang="en-CA" sz="1600" dirty="0">
+                <a:solidFill>
+                  <a:srgbClr val="0070C0"/>
+                </a:solidFill>
+                <a:cs typeface="Segoe UI Light" panose="020B0502040204020203" pitchFamily="34" charset="0"/>
+              </a:rPr>
+              <a:t>Do you want to manage data and service availability?</a:t>
+            </a:r>
+          </a:p>
+        </p:txBody>
+      </p:sp>
+      <p:sp>
+        <p:nvSpPr>
+          <p:cNvPr id="5" name="Rectangle: Rounded Corners 4">
+            <a:extLst>
+              <a:ext uri="{FF2B5EF4-FFF2-40B4-BE49-F238E27FC236}">
+                <a16:creationId xmlns:a16="http://schemas.microsoft.com/office/drawing/2014/main" id="{320F45C4-3AC8-4ABF-824D-AEEE6B605A3D}"/>
+              </a:ext>
+            </a:extLst>
+          </p:cNvPr>
+          <p:cNvSpPr/>
+          <p:nvPr/>
+        </p:nvSpPr>
+        <p:spPr>
+          <a:xfrm>
+            <a:off x="420913" y="2373084"/>
+            <a:ext cx="6008913" cy="297540"/>
+          </a:xfrm>
+          <a:prstGeom prst="roundRect">
+            <a:avLst/>
+          </a:prstGeom>
+        </p:spPr>
+        <p:style>
+          <a:lnRef idx="2">
+            <a:schemeClr val="accent1"/>
+          </a:lnRef>
+          <a:fillRef idx="1">
+            <a:schemeClr val="lt1"/>
+          </a:fillRef>
+          <a:effectRef idx="0">
+            <a:schemeClr val="accent1"/>
+          </a:effectRef>
+          <a:fontRef idx="minor">
+            <a:schemeClr val="dk1"/>
+          </a:fontRef>
+        </p:style>
+        <p:txBody>
+          <a:bodyPr lIns="36000" tIns="36000" rIns="36000" bIns="36000" rtlCol="0" anchor="ctr"/>
+          <a:lstStyle/>
+          <a:p>
+            <a:pPr algn="r"/>
+            <a:r>
+              <a:rPr lang="en-CA" sz="1600" dirty="0">
+                <a:solidFill>
+                  <a:srgbClr val="0070C0"/>
+                </a:solidFill>
+                <a:cs typeface="Segoe UI Light" panose="020B0502040204020203" pitchFamily="34" charset="0"/>
+              </a:rPr>
+              <a:t>Do you want to manage resilience and quality assurance?</a:t>
+            </a:r>
+          </a:p>
+        </p:txBody>
+      </p:sp>
+      <p:sp>
+        <p:nvSpPr>
+          <p:cNvPr id="6" name="Rectangle: Rounded Corners 5">
+            <a:extLst>
+              <a:ext uri="{FF2B5EF4-FFF2-40B4-BE49-F238E27FC236}">
+                <a16:creationId xmlns:a16="http://schemas.microsoft.com/office/drawing/2014/main" id="{4276B958-2557-478D-8C01-4245DBEE5BF5}"/>
+              </a:ext>
+            </a:extLst>
+          </p:cNvPr>
+          <p:cNvSpPr/>
+          <p:nvPr/>
+        </p:nvSpPr>
+        <p:spPr>
+          <a:xfrm>
+            <a:off x="420914" y="3047998"/>
+            <a:ext cx="6008914" cy="304800"/>
+          </a:xfrm>
+          <a:prstGeom prst="roundRect">
+            <a:avLst/>
+          </a:prstGeom>
+        </p:spPr>
+        <p:style>
+          <a:lnRef idx="2">
+            <a:schemeClr val="accent1"/>
+          </a:lnRef>
+          <a:fillRef idx="1">
+            <a:schemeClr val="lt1"/>
+          </a:fillRef>
+          <a:effectRef idx="0">
+            <a:schemeClr val="accent1"/>
+          </a:effectRef>
+          <a:fontRef idx="minor">
+            <a:schemeClr val="dk1"/>
+          </a:fontRef>
+        </p:style>
+        <p:txBody>
+          <a:bodyPr lIns="36000" tIns="36000" rIns="36000" bIns="36000" rtlCol="0" anchor="ctr"/>
+          <a:lstStyle/>
+          <a:p>
+            <a:pPr algn="r"/>
+            <a:r>
+              <a:rPr lang="en-CA" sz="1600" dirty="0">
+                <a:solidFill>
+                  <a:srgbClr val="0070C0"/>
+                </a:solidFill>
+                <a:cs typeface="Segoe UI Light" panose="020B0502040204020203" pitchFamily="34" charset="0"/>
+              </a:rPr>
+              <a:t>Do you always want the latest version of the services?</a:t>
+            </a:r>
+          </a:p>
+        </p:txBody>
+      </p:sp>
+      <p:sp>
+        <p:nvSpPr>
+          <p:cNvPr id="7" name="Rectangle: Rounded Corners 6">
+            <a:extLst>
+              <a:ext uri="{FF2B5EF4-FFF2-40B4-BE49-F238E27FC236}">
+                <a16:creationId xmlns:a16="http://schemas.microsoft.com/office/drawing/2014/main" id="{92C6B7A8-6496-470B-8367-9E755AAA1CD8}"/>
+              </a:ext>
+            </a:extLst>
+          </p:cNvPr>
+          <p:cNvSpPr/>
+          <p:nvPr/>
+        </p:nvSpPr>
+        <p:spPr>
+          <a:xfrm>
+            <a:off x="420913" y="3730172"/>
+            <a:ext cx="6008915" cy="304800"/>
+          </a:xfrm>
+          <a:prstGeom prst="roundRect">
+            <a:avLst/>
+          </a:prstGeom>
+        </p:spPr>
+        <p:style>
+          <a:lnRef idx="2">
+            <a:schemeClr val="accent1"/>
+          </a:lnRef>
+          <a:fillRef idx="1">
+            <a:schemeClr val="lt1"/>
+          </a:fillRef>
+          <a:effectRef idx="0">
+            <a:schemeClr val="accent1"/>
+          </a:effectRef>
+          <a:fontRef idx="minor">
+            <a:schemeClr val="dk1"/>
+          </a:fontRef>
+        </p:style>
+        <p:txBody>
+          <a:bodyPr lIns="36000" tIns="36000" rIns="36000" bIns="36000" rtlCol="0" anchor="ctr"/>
+          <a:lstStyle/>
+          <a:p>
+            <a:pPr algn="r"/>
+            <a:r>
+              <a:rPr lang="en-CA" sz="1600" dirty="0">
+                <a:solidFill>
+                  <a:srgbClr val="0070C0"/>
+                </a:solidFill>
+                <a:cs typeface="Segoe UI Light" panose="020B0502040204020203" pitchFamily="34" charset="0"/>
+              </a:rPr>
+              <a:t>Do you need a quick demo or experimental environment?</a:t>
+            </a:r>
+          </a:p>
+        </p:txBody>
+      </p:sp>
+      <p:sp>
+        <p:nvSpPr>
+          <p:cNvPr id="8" name="Rectangle: Rounded Corners 7">
+            <a:extLst>
+              <a:ext uri="{FF2B5EF4-FFF2-40B4-BE49-F238E27FC236}">
+                <a16:creationId xmlns:a16="http://schemas.microsoft.com/office/drawing/2014/main" id="{A0CB3A8D-409A-4664-BFFF-22C703363A1E}"/>
+              </a:ext>
+            </a:extLst>
+          </p:cNvPr>
+          <p:cNvSpPr/>
+          <p:nvPr/>
+        </p:nvSpPr>
+        <p:spPr>
+          <a:xfrm>
+            <a:off x="420914" y="4414668"/>
+            <a:ext cx="6008912" cy="304800"/>
+          </a:xfrm>
+          <a:prstGeom prst="roundRect">
+            <a:avLst/>
+          </a:prstGeom>
+        </p:spPr>
+        <p:style>
+          <a:lnRef idx="2">
+            <a:schemeClr val="accent1"/>
+          </a:lnRef>
+          <a:fillRef idx="1">
+            <a:schemeClr val="lt1"/>
+          </a:fillRef>
+          <a:effectRef idx="0">
+            <a:schemeClr val="accent1"/>
+          </a:effectRef>
+          <a:fontRef idx="minor">
+            <a:schemeClr val="dk1"/>
+          </a:fontRef>
+        </p:style>
+        <p:txBody>
+          <a:bodyPr lIns="36000" tIns="36000" rIns="36000" bIns="36000" rtlCol="0" anchor="ctr"/>
+          <a:lstStyle/>
+          <a:p>
+            <a:pPr algn="r"/>
+            <a:r>
+              <a:rPr lang="en-CA" sz="1600" dirty="0">
+                <a:solidFill>
+                  <a:srgbClr val="0070C0"/>
+                </a:solidFill>
+                <a:cs typeface="Segoe UI Light" panose="020B0502040204020203" pitchFamily="34" charset="0"/>
+              </a:rPr>
+              <a:t>Do you want to manage servers and to support less than 250 users?</a:t>
+            </a:r>
+          </a:p>
+        </p:txBody>
+      </p:sp>
+      <p:sp>
+        <p:nvSpPr>
+          <p:cNvPr id="9" name="Rectangle: Rounded Corners 8">
+            <a:extLst>
+              <a:ext uri="{FF2B5EF4-FFF2-40B4-BE49-F238E27FC236}">
+                <a16:creationId xmlns:a16="http://schemas.microsoft.com/office/drawing/2014/main" id="{5425E45C-9DFB-4424-BF0E-731207FE09A1}"/>
+              </a:ext>
+            </a:extLst>
+          </p:cNvPr>
+          <p:cNvSpPr/>
+          <p:nvPr/>
+        </p:nvSpPr>
+        <p:spPr>
+          <a:xfrm>
+            <a:off x="420914" y="5094520"/>
+            <a:ext cx="6008912" cy="304800"/>
+          </a:xfrm>
+          <a:prstGeom prst="roundRect">
+            <a:avLst/>
+          </a:prstGeom>
+        </p:spPr>
+        <p:style>
+          <a:lnRef idx="2">
+            <a:schemeClr val="accent1"/>
+          </a:lnRef>
+          <a:fillRef idx="1">
+            <a:schemeClr val="lt1"/>
+          </a:fillRef>
+          <a:effectRef idx="0">
+            <a:schemeClr val="accent1"/>
+          </a:effectRef>
+          <a:fontRef idx="minor">
+            <a:schemeClr val="dk1"/>
+          </a:fontRef>
+        </p:style>
+        <p:txBody>
+          <a:bodyPr lIns="36000" tIns="36000" rIns="36000" bIns="36000" rtlCol="0" anchor="ctr"/>
+          <a:lstStyle/>
+          <a:p>
+            <a:pPr algn="r"/>
+            <a:r>
+              <a:rPr lang="en-CA" sz="1600" dirty="0">
+                <a:solidFill>
+                  <a:srgbClr val="0070C0"/>
+                </a:solidFill>
+                <a:cs typeface="Segoe UI Light" panose="020B0502040204020203" pitchFamily="34" charset="0"/>
+              </a:rPr>
+              <a:t>Do you want to manage servers and support less than 3000 users?</a:t>
+            </a:r>
+          </a:p>
+        </p:txBody>
+      </p:sp>
+      <p:sp>
+        <p:nvSpPr>
+          <p:cNvPr id="10" name="TextBox 9">
+            <a:extLst>
+              <a:ext uri="{FF2B5EF4-FFF2-40B4-BE49-F238E27FC236}">
+                <a16:creationId xmlns:a16="http://schemas.microsoft.com/office/drawing/2014/main" id="{5FE4A2AD-2B8C-49A0-BD36-A997F904C422}"/>
+              </a:ext>
+            </a:extLst>
+          </p:cNvPr>
+          <p:cNvSpPr txBox="1"/>
+          <p:nvPr/>
+        </p:nvSpPr>
+        <p:spPr>
+          <a:xfrm>
+            <a:off x="83240" y="371970"/>
+            <a:ext cx="306174" cy="276999"/>
+          </a:xfrm>
+          <a:prstGeom prst="rect">
+            <a:avLst/>
+          </a:prstGeom>
+          <a:noFill/>
+        </p:spPr>
+        <p:txBody>
+          <a:bodyPr wrap="none" lIns="0" tIns="0" rIns="0" bIns="0" rtlCol="0">
+            <a:spAutoFit/>
+          </a:bodyPr>
+          <a:lstStyle/>
+          <a:p>
+            <a:r>
+              <a:rPr lang="en-CA" dirty="0">
+                <a:solidFill>
+                  <a:srgbClr val="0070C0"/>
+                </a:solidFill>
+              </a:rPr>
+              <a:t>❶</a:t>
+            </a:r>
+          </a:p>
+        </p:txBody>
+      </p:sp>
+      <p:sp>
+        <p:nvSpPr>
+          <p:cNvPr id="11" name="TextBox 10">
+            <a:extLst>
+              <a:ext uri="{FF2B5EF4-FFF2-40B4-BE49-F238E27FC236}">
+                <a16:creationId xmlns:a16="http://schemas.microsoft.com/office/drawing/2014/main" id="{04479A0C-6794-4524-B8F7-3EEC30B5A68A}"/>
+              </a:ext>
+            </a:extLst>
+          </p:cNvPr>
+          <p:cNvSpPr txBox="1"/>
+          <p:nvPr/>
+        </p:nvSpPr>
+        <p:spPr>
+          <a:xfrm>
+            <a:off x="83240" y="1056659"/>
+            <a:ext cx="306174" cy="276999"/>
+          </a:xfrm>
+          <a:prstGeom prst="rect">
+            <a:avLst/>
+          </a:prstGeom>
+          <a:noFill/>
+        </p:spPr>
+        <p:txBody>
+          <a:bodyPr wrap="none" lIns="0" tIns="0" rIns="0" bIns="0" rtlCol="0">
+            <a:spAutoFit/>
+          </a:bodyPr>
+          <a:lstStyle/>
+          <a:p>
+            <a:r>
+              <a:rPr lang="en-CA" dirty="0">
+                <a:solidFill>
+                  <a:srgbClr val="0070C0"/>
+                </a:solidFill>
+              </a:rPr>
+              <a:t>❷</a:t>
+            </a:r>
+          </a:p>
+        </p:txBody>
+      </p:sp>
+      <p:sp>
+        <p:nvSpPr>
+          <p:cNvPr id="12" name="TextBox 11">
+            <a:extLst>
+              <a:ext uri="{FF2B5EF4-FFF2-40B4-BE49-F238E27FC236}">
+                <a16:creationId xmlns:a16="http://schemas.microsoft.com/office/drawing/2014/main" id="{5903C7DD-6B7C-4B83-87E5-5152234617D2}"/>
+              </a:ext>
+            </a:extLst>
+          </p:cNvPr>
+          <p:cNvSpPr txBox="1"/>
+          <p:nvPr/>
+        </p:nvSpPr>
+        <p:spPr>
+          <a:xfrm>
+            <a:off x="83240" y="1724079"/>
+            <a:ext cx="306174" cy="276999"/>
+          </a:xfrm>
+          <a:prstGeom prst="rect">
+            <a:avLst/>
+          </a:prstGeom>
+          <a:noFill/>
+        </p:spPr>
+        <p:txBody>
+          <a:bodyPr wrap="none" lIns="0" tIns="0" rIns="0" bIns="0" rtlCol="0">
+            <a:spAutoFit/>
+          </a:bodyPr>
+          <a:lstStyle/>
+          <a:p>
+            <a:r>
+              <a:rPr lang="en-CA" dirty="0">
+                <a:solidFill>
+                  <a:srgbClr val="0070C0"/>
+                </a:solidFill>
+              </a:rPr>
+              <a:t>❸</a:t>
+            </a:r>
+          </a:p>
+        </p:txBody>
+      </p:sp>
+      <p:sp>
+        <p:nvSpPr>
+          <p:cNvPr id="13" name="TextBox 12">
+            <a:extLst>
+              <a:ext uri="{FF2B5EF4-FFF2-40B4-BE49-F238E27FC236}">
+                <a16:creationId xmlns:a16="http://schemas.microsoft.com/office/drawing/2014/main" id="{62470D09-5959-43F6-A485-79D6EF88F0AB}"/>
+              </a:ext>
+            </a:extLst>
+          </p:cNvPr>
+          <p:cNvSpPr txBox="1"/>
+          <p:nvPr/>
+        </p:nvSpPr>
+        <p:spPr>
+          <a:xfrm>
+            <a:off x="83240" y="2389453"/>
+            <a:ext cx="306174" cy="276999"/>
+          </a:xfrm>
+          <a:prstGeom prst="rect">
+            <a:avLst/>
+          </a:prstGeom>
+          <a:noFill/>
+        </p:spPr>
+        <p:txBody>
+          <a:bodyPr wrap="none" lIns="0" tIns="0" rIns="0" bIns="0" rtlCol="0">
+            <a:spAutoFit/>
+          </a:bodyPr>
+          <a:lstStyle/>
+          <a:p>
+            <a:r>
+              <a:rPr lang="en-CA" dirty="0">
+                <a:solidFill>
+                  <a:srgbClr val="0070C0"/>
+                </a:solidFill>
+              </a:rPr>
+              <a:t>❹</a:t>
+            </a:r>
+          </a:p>
+        </p:txBody>
+      </p:sp>
+      <p:sp>
+        <p:nvSpPr>
+          <p:cNvPr id="14" name="TextBox 13">
+            <a:extLst>
+              <a:ext uri="{FF2B5EF4-FFF2-40B4-BE49-F238E27FC236}">
+                <a16:creationId xmlns:a16="http://schemas.microsoft.com/office/drawing/2014/main" id="{6403546B-7216-4435-BD3C-7E59A1231AA7}"/>
+              </a:ext>
+            </a:extLst>
+          </p:cNvPr>
+          <p:cNvSpPr txBox="1"/>
+          <p:nvPr/>
+        </p:nvSpPr>
+        <p:spPr>
+          <a:xfrm>
+            <a:off x="83240" y="3080807"/>
+            <a:ext cx="306174" cy="276999"/>
+          </a:xfrm>
+          <a:prstGeom prst="rect">
+            <a:avLst/>
+          </a:prstGeom>
+          <a:noFill/>
+        </p:spPr>
+        <p:txBody>
+          <a:bodyPr wrap="none" lIns="0" tIns="0" rIns="0" bIns="0" rtlCol="0">
+            <a:spAutoFit/>
+          </a:bodyPr>
+          <a:lstStyle/>
+          <a:p>
+            <a:r>
+              <a:rPr lang="en-CA" dirty="0">
+                <a:solidFill>
+                  <a:srgbClr val="0070C0"/>
+                </a:solidFill>
+              </a:rPr>
+              <a:t>❺</a:t>
+            </a:r>
+          </a:p>
+        </p:txBody>
+      </p:sp>
+      <p:sp>
+        <p:nvSpPr>
+          <p:cNvPr id="15" name="TextBox 14">
+            <a:extLst>
+              <a:ext uri="{FF2B5EF4-FFF2-40B4-BE49-F238E27FC236}">
+                <a16:creationId xmlns:a16="http://schemas.microsoft.com/office/drawing/2014/main" id="{8FAD26E0-E097-4193-A678-C95C946D650E}"/>
+              </a:ext>
+            </a:extLst>
+          </p:cNvPr>
+          <p:cNvSpPr txBox="1"/>
+          <p:nvPr/>
+        </p:nvSpPr>
+        <p:spPr>
+          <a:xfrm>
+            <a:off x="83240" y="3767701"/>
+            <a:ext cx="306174" cy="276999"/>
+          </a:xfrm>
+          <a:prstGeom prst="rect">
+            <a:avLst/>
+          </a:prstGeom>
+          <a:noFill/>
+        </p:spPr>
+        <p:txBody>
+          <a:bodyPr wrap="none" lIns="0" tIns="0" rIns="0" bIns="0" rtlCol="0">
+            <a:spAutoFit/>
+          </a:bodyPr>
+          <a:lstStyle/>
+          <a:p>
+            <a:r>
+              <a:rPr lang="en-CA" dirty="0">
+                <a:solidFill>
+                  <a:srgbClr val="0070C0"/>
+                </a:solidFill>
+              </a:rPr>
+              <a:t>❻</a:t>
+            </a:r>
+          </a:p>
+        </p:txBody>
+      </p:sp>
+      <p:sp>
+        <p:nvSpPr>
+          <p:cNvPr id="16" name="TextBox 15">
+            <a:extLst>
+              <a:ext uri="{FF2B5EF4-FFF2-40B4-BE49-F238E27FC236}">
+                <a16:creationId xmlns:a16="http://schemas.microsoft.com/office/drawing/2014/main" id="{40425BB6-F5B4-4EEB-9F00-CFB8846CCCE6}"/>
+              </a:ext>
+            </a:extLst>
+          </p:cNvPr>
+          <p:cNvSpPr txBox="1"/>
+          <p:nvPr/>
+        </p:nvSpPr>
+        <p:spPr>
+          <a:xfrm>
+            <a:off x="83240" y="4438297"/>
+            <a:ext cx="306174" cy="276999"/>
+          </a:xfrm>
+          <a:prstGeom prst="rect">
+            <a:avLst/>
+          </a:prstGeom>
+          <a:noFill/>
+        </p:spPr>
+        <p:txBody>
+          <a:bodyPr wrap="none" lIns="0" tIns="0" rIns="0" bIns="0" rtlCol="0">
+            <a:spAutoFit/>
+          </a:bodyPr>
+          <a:lstStyle/>
+          <a:p>
+            <a:r>
+              <a:rPr lang="en-CA" dirty="0">
+                <a:solidFill>
+                  <a:srgbClr val="0070C0"/>
+                </a:solidFill>
+              </a:rPr>
+              <a:t>❼</a:t>
+            </a:r>
+          </a:p>
+        </p:txBody>
+      </p:sp>
+      <p:sp>
+        <p:nvSpPr>
+          <p:cNvPr id="17" name="TextBox 16">
+            <a:extLst>
+              <a:ext uri="{FF2B5EF4-FFF2-40B4-BE49-F238E27FC236}">
+                <a16:creationId xmlns:a16="http://schemas.microsoft.com/office/drawing/2014/main" id="{0A37915C-3DD9-4AB7-AF87-3F29A00C2903}"/>
+              </a:ext>
+            </a:extLst>
+          </p:cNvPr>
+          <p:cNvSpPr txBox="1"/>
+          <p:nvPr/>
+        </p:nvSpPr>
+        <p:spPr>
+          <a:xfrm>
+            <a:off x="83240" y="5132049"/>
+            <a:ext cx="306174" cy="276999"/>
+          </a:xfrm>
+          <a:prstGeom prst="rect">
+            <a:avLst/>
+          </a:prstGeom>
+          <a:noFill/>
+        </p:spPr>
+        <p:txBody>
+          <a:bodyPr wrap="none" lIns="0" tIns="0" rIns="0" bIns="0" rtlCol="0">
+            <a:spAutoFit/>
+          </a:bodyPr>
+          <a:lstStyle/>
+          <a:p>
+            <a:r>
+              <a:rPr lang="en-CA" dirty="0">
+                <a:solidFill>
+                  <a:srgbClr val="0070C0"/>
+                </a:solidFill>
+              </a:rPr>
+              <a:t>❽</a:t>
+            </a:r>
+          </a:p>
+        </p:txBody>
+      </p:sp>
+      <p:pic>
+        <p:nvPicPr>
+          <p:cNvPr id="20" name="Graphic 19" descr="Cloud">
+            <a:extLst>
+              <a:ext uri="{FF2B5EF4-FFF2-40B4-BE49-F238E27FC236}">
+                <a16:creationId xmlns:a16="http://schemas.microsoft.com/office/drawing/2014/main" id="{912175BC-720C-446D-A9B9-46E66865268B}"/>
+              </a:ext>
+            </a:extLst>
+          </p:cNvPr>
+          <p:cNvPicPr>
+            <a:picLocks noChangeAspect="1"/>
+          </p:cNvPicPr>
+          <p:nvPr/>
+        </p:nvPicPr>
+        <p:blipFill>
+          <a:blip r:embed="rId2">
+            <a:extLst>
+              <a:ext uri="{28A0092B-C50C-407E-A947-70E740481C1C}">
+                <a14:useLocalDpi xmlns:a14="http://schemas.microsoft.com/office/drawing/2010/main" val="0"/>
+              </a:ext>
+              <a:ext uri="{96DAC541-7B7A-43D3-8B79-37D633B846F1}">
+                <asvg:svgBlip xmlns:asvg="http://schemas.microsoft.com/office/drawing/2016/SVG/main" r:embed="rId3"/>
+              </a:ext>
+            </a:extLst>
+          </a:blip>
+          <a:stretch>
+            <a:fillRect/>
+          </a:stretch>
+        </p:blipFill>
+        <p:spPr>
+          <a:xfrm>
+            <a:off x="9143765" y="465430"/>
+            <a:ext cx="1440000" cy="1440000"/>
+          </a:xfrm>
+          <a:prstGeom prst="rect">
+            <a:avLst/>
+          </a:prstGeom>
+        </p:spPr>
+      </p:pic>
+      <p:pic>
+        <p:nvPicPr>
+          <p:cNvPr id="23" name="Picture 22">
+            <a:extLst>
+              <a:ext uri="{FF2B5EF4-FFF2-40B4-BE49-F238E27FC236}">
+                <a16:creationId xmlns:a16="http://schemas.microsoft.com/office/drawing/2014/main" id="{6096B1C1-AE4D-4DC4-9464-45EA49545516}"/>
+              </a:ext>
+            </a:extLst>
+          </p:cNvPr>
+          <p:cNvPicPr>
+            <a:picLocks noChangeAspect="1"/>
+          </p:cNvPicPr>
+          <p:nvPr/>
+        </p:nvPicPr>
+        <p:blipFill>
+          <a:blip r:embed="rId4">
+            <a:biLevel thresh="25000"/>
+            <a:extLst>
+              <a:ext uri="{28A0092B-C50C-407E-A947-70E740481C1C}">
+                <a14:useLocalDpi xmlns:a14="http://schemas.microsoft.com/office/drawing/2010/main" val="0"/>
+              </a:ext>
+            </a:extLst>
+          </a:blip>
+          <a:stretch>
+            <a:fillRect/>
+          </a:stretch>
+        </p:blipFill>
+        <p:spPr>
+          <a:xfrm>
+            <a:off x="9596676" y="1059876"/>
+            <a:ext cx="469487" cy="473679"/>
+          </a:xfrm>
+          <a:prstGeom prst="rect">
+            <a:avLst/>
+          </a:prstGeom>
+        </p:spPr>
+      </p:pic>
+      <p:pic>
+        <p:nvPicPr>
+          <p:cNvPr id="28" name="Graphic 27" descr="Remote control">
+            <a:extLst>
+              <a:ext uri="{FF2B5EF4-FFF2-40B4-BE49-F238E27FC236}">
+                <a16:creationId xmlns:a16="http://schemas.microsoft.com/office/drawing/2014/main" id="{F217EB96-5E0E-49E2-B41F-46CB9DFEC35C}"/>
+              </a:ext>
+            </a:extLst>
+          </p:cNvPr>
+          <p:cNvPicPr>
+            <a:picLocks noChangeAspect="1"/>
+          </p:cNvPicPr>
+          <p:nvPr/>
+        </p:nvPicPr>
+        <p:blipFill>
+          <a:blip r:embed="rId5">
+            <a:extLst>
+              <a:ext uri="{28A0092B-C50C-407E-A947-70E740481C1C}">
+                <a14:useLocalDpi xmlns:a14="http://schemas.microsoft.com/office/drawing/2010/main" val="0"/>
+              </a:ext>
+              <a:ext uri="{96DAC541-7B7A-43D3-8B79-37D633B846F1}">
+                <asvg:svgBlip xmlns:asvg="http://schemas.microsoft.com/office/drawing/2016/SVG/main" r:embed="rId6"/>
+              </a:ext>
+            </a:extLst>
+          </a:blip>
+          <a:stretch>
+            <a:fillRect/>
+          </a:stretch>
+        </p:blipFill>
+        <p:spPr>
+          <a:xfrm>
+            <a:off x="9290439" y="2772438"/>
+            <a:ext cx="1042726" cy="1042726"/>
+          </a:xfrm>
+          <a:prstGeom prst="rect">
+            <a:avLst/>
+          </a:prstGeom>
+        </p:spPr>
+      </p:pic>
+      <p:sp>
+        <p:nvSpPr>
+          <p:cNvPr id="31" name="TextBox 30">
+            <a:extLst>
+              <a:ext uri="{FF2B5EF4-FFF2-40B4-BE49-F238E27FC236}">
+                <a16:creationId xmlns:a16="http://schemas.microsoft.com/office/drawing/2014/main" id="{6A773C66-7295-44F3-A5C8-318E2A7CA63A}"/>
+              </a:ext>
+            </a:extLst>
+          </p:cNvPr>
+          <p:cNvSpPr txBox="1"/>
+          <p:nvPr/>
+        </p:nvSpPr>
+        <p:spPr>
+          <a:xfrm>
+            <a:off x="10134430" y="2798314"/>
+            <a:ext cx="1450717" cy="923330"/>
+          </a:xfrm>
+          <a:prstGeom prst="rect">
+            <a:avLst/>
+          </a:prstGeom>
+          <a:noFill/>
+        </p:spPr>
+        <p:txBody>
+          <a:bodyPr wrap="none" rtlCol="0">
+            <a:spAutoFit/>
+          </a:bodyPr>
+          <a:lstStyle/>
+          <a:p>
+            <a:pPr algn="ctr"/>
+            <a:r>
+              <a:rPr lang="en-CA" dirty="0">
+                <a:solidFill>
+                  <a:srgbClr val="0070C0"/>
+                </a:solidFill>
+                <a:cs typeface="Segoe UI Light" panose="020B0502040204020203" pitchFamily="34" charset="0"/>
+              </a:rPr>
+              <a:t>TFS</a:t>
+            </a:r>
+          </a:p>
+          <a:p>
+            <a:pPr algn="ctr"/>
+            <a:r>
+              <a:rPr lang="en-CA" dirty="0">
+                <a:solidFill>
+                  <a:srgbClr val="0070C0"/>
+                </a:solidFill>
+                <a:cs typeface="Segoe UI Light" panose="020B0502040204020203" pitchFamily="34" charset="0"/>
+              </a:rPr>
+              <a:t>AT+DT</a:t>
+            </a:r>
+          </a:p>
+          <a:p>
+            <a:pPr algn="ctr"/>
+            <a:r>
+              <a:rPr lang="en-CA" dirty="0">
+                <a:solidFill>
+                  <a:srgbClr val="0070C0"/>
+                </a:solidFill>
+                <a:cs typeface="Segoe UI Light" panose="020B0502040204020203" pitchFamily="34" charset="0"/>
+              </a:rPr>
+              <a:t>Single Server</a:t>
+            </a:r>
+          </a:p>
+        </p:txBody>
+      </p:sp>
+      <p:grpSp>
+        <p:nvGrpSpPr>
+          <p:cNvPr id="91" name="Group 90">
+            <a:extLst>
+              <a:ext uri="{FF2B5EF4-FFF2-40B4-BE49-F238E27FC236}">
+                <a16:creationId xmlns:a16="http://schemas.microsoft.com/office/drawing/2014/main" id="{B7A4BFA0-9EF9-49E8-A2B3-247A8C66DA2B}"/>
+              </a:ext>
+            </a:extLst>
+          </p:cNvPr>
+          <p:cNvGrpSpPr/>
+          <p:nvPr/>
+        </p:nvGrpSpPr>
+        <p:grpSpPr>
+          <a:xfrm>
+            <a:off x="8716122" y="4045705"/>
+            <a:ext cx="2789196" cy="1042726"/>
+            <a:chOff x="8725418" y="3430723"/>
+            <a:chExt cx="2789196" cy="1042726"/>
+          </a:xfrm>
+        </p:grpSpPr>
+        <p:sp>
+          <p:nvSpPr>
+            <p:cNvPr id="32" name="TextBox 31">
+              <a:extLst>
+                <a:ext uri="{FF2B5EF4-FFF2-40B4-BE49-F238E27FC236}">
+                  <a16:creationId xmlns:a16="http://schemas.microsoft.com/office/drawing/2014/main" id="{46E12690-F490-4F84-A70A-B2E43436D582}"/>
+                </a:ext>
+              </a:extLst>
+            </p:cNvPr>
+            <p:cNvSpPr txBox="1"/>
+            <p:nvPr/>
+          </p:nvSpPr>
+          <p:spPr>
+            <a:xfrm>
+              <a:off x="10204961" y="3490421"/>
+              <a:ext cx="1309653" cy="923330"/>
+            </a:xfrm>
+            <a:prstGeom prst="rect">
+              <a:avLst/>
+            </a:prstGeom>
+            <a:noFill/>
+          </p:spPr>
+          <p:txBody>
+            <a:bodyPr wrap="none" rtlCol="0">
+              <a:spAutoFit/>
+            </a:bodyPr>
+            <a:lstStyle/>
+            <a:p>
+              <a:pPr algn="ctr"/>
+              <a:r>
+                <a:rPr lang="en-CA" dirty="0">
+                  <a:solidFill>
+                    <a:srgbClr val="0070C0"/>
+                  </a:solidFill>
+                  <a:cs typeface="Segoe UI Light" panose="020B0502040204020203" pitchFamily="34" charset="0"/>
+                </a:rPr>
+                <a:t>TFS</a:t>
+              </a:r>
+            </a:p>
+            <a:p>
+              <a:pPr algn="ctr"/>
+              <a:r>
+                <a:rPr lang="en-CA" dirty="0">
+                  <a:solidFill>
+                    <a:srgbClr val="0070C0"/>
+                  </a:solidFill>
+                  <a:cs typeface="Segoe UI Light" panose="020B0502040204020203" pitchFamily="34" charset="0"/>
+                </a:rPr>
+                <a:t>AT + DT</a:t>
+              </a:r>
+            </a:p>
+            <a:p>
+              <a:pPr algn="ctr"/>
+              <a:r>
+                <a:rPr lang="en-CA" dirty="0">
+                  <a:solidFill>
+                    <a:srgbClr val="0070C0"/>
+                  </a:solidFill>
+                  <a:cs typeface="Segoe UI Light" panose="020B0502040204020203" pitchFamily="34" charset="0"/>
+                </a:rPr>
+                <a:t>Dual Server</a:t>
+              </a:r>
+            </a:p>
+          </p:txBody>
+        </p:sp>
+        <p:pic>
+          <p:nvPicPr>
+            <p:cNvPr id="44" name="Graphic 43" descr="Remote control">
+              <a:extLst>
+                <a:ext uri="{FF2B5EF4-FFF2-40B4-BE49-F238E27FC236}">
+                  <a16:creationId xmlns:a16="http://schemas.microsoft.com/office/drawing/2014/main" id="{00AB93CB-C135-4182-A0F9-8478382FAB36}"/>
+                </a:ext>
+              </a:extLst>
+            </p:cNvPr>
+            <p:cNvPicPr>
+              <a:picLocks noChangeAspect="1"/>
+            </p:cNvPicPr>
+            <p:nvPr/>
+          </p:nvPicPr>
+          <p:blipFill>
+            <a:blip r:embed="rId5">
+              <a:extLst>
+                <a:ext uri="{28A0092B-C50C-407E-A947-70E740481C1C}">
+                  <a14:useLocalDpi xmlns:a14="http://schemas.microsoft.com/office/drawing/2010/main" val="0"/>
+                </a:ext>
+                <a:ext uri="{96DAC541-7B7A-43D3-8B79-37D633B846F1}">
+                  <asvg:svgBlip xmlns:asvg="http://schemas.microsoft.com/office/drawing/2016/SVG/main" r:embed="rId6"/>
+                </a:ext>
+              </a:extLst>
+            </a:blip>
+            <a:stretch>
+              <a:fillRect/>
+            </a:stretch>
+          </p:blipFill>
+          <p:spPr>
+            <a:xfrm>
+              <a:off x="8725418" y="3430723"/>
+              <a:ext cx="1042726" cy="1042726"/>
+            </a:xfrm>
+            <a:prstGeom prst="rect">
+              <a:avLst/>
+            </a:prstGeom>
+          </p:spPr>
+        </p:pic>
+        <p:pic>
+          <p:nvPicPr>
+            <p:cNvPr id="45" name="Graphic 44" descr="Remote control">
+              <a:extLst>
+                <a:ext uri="{FF2B5EF4-FFF2-40B4-BE49-F238E27FC236}">
+                  <a16:creationId xmlns:a16="http://schemas.microsoft.com/office/drawing/2014/main" id="{ADF69656-8733-4CC0-A9BE-DFFF1F4CE015}"/>
+                </a:ext>
+              </a:extLst>
+            </p:cNvPr>
+            <p:cNvPicPr>
+              <a:picLocks noChangeAspect="1"/>
+            </p:cNvPicPr>
+            <p:nvPr/>
+          </p:nvPicPr>
+          <p:blipFill>
+            <a:blip r:embed="rId5">
+              <a:extLst>
+                <a:ext uri="{28A0092B-C50C-407E-A947-70E740481C1C}">
+                  <a14:useLocalDpi xmlns:a14="http://schemas.microsoft.com/office/drawing/2010/main" val="0"/>
+                </a:ext>
+                <a:ext uri="{96DAC541-7B7A-43D3-8B79-37D633B846F1}">
+                  <asvg:svgBlip xmlns:asvg="http://schemas.microsoft.com/office/drawing/2016/SVG/main" r:embed="rId6"/>
+                </a:ext>
+              </a:extLst>
+            </a:blip>
+            <a:stretch>
+              <a:fillRect/>
+            </a:stretch>
+          </p:blipFill>
+          <p:spPr>
+            <a:xfrm>
+              <a:off x="9290439" y="3430723"/>
+              <a:ext cx="1042726" cy="1042726"/>
+            </a:xfrm>
+            <a:prstGeom prst="rect">
+              <a:avLst/>
+            </a:prstGeom>
+          </p:spPr>
+        </p:pic>
+      </p:grpSp>
+      <p:grpSp>
+        <p:nvGrpSpPr>
+          <p:cNvPr id="90" name="Group 89">
+            <a:extLst>
+              <a:ext uri="{FF2B5EF4-FFF2-40B4-BE49-F238E27FC236}">
+                <a16:creationId xmlns:a16="http://schemas.microsoft.com/office/drawing/2014/main" id="{A26D1EAA-ECE8-403C-9D52-1B2B6BBC1808}"/>
+              </a:ext>
+            </a:extLst>
+          </p:cNvPr>
+          <p:cNvGrpSpPr/>
+          <p:nvPr/>
+        </p:nvGrpSpPr>
+        <p:grpSpPr>
+          <a:xfrm>
+            <a:off x="8725418" y="5307535"/>
+            <a:ext cx="2823661" cy="1046222"/>
+            <a:chOff x="8725418" y="5307535"/>
+            <a:chExt cx="2823661" cy="1046222"/>
+          </a:xfrm>
+        </p:grpSpPr>
+        <p:sp>
+          <p:nvSpPr>
+            <p:cNvPr id="47" name="TextBox 46">
+              <a:extLst>
+                <a:ext uri="{FF2B5EF4-FFF2-40B4-BE49-F238E27FC236}">
+                  <a16:creationId xmlns:a16="http://schemas.microsoft.com/office/drawing/2014/main" id="{97704393-243E-4A38-A773-E573C1FF9490}"/>
+                </a:ext>
+              </a:extLst>
+            </p:cNvPr>
+            <p:cNvSpPr txBox="1"/>
+            <p:nvPr/>
+          </p:nvSpPr>
+          <p:spPr>
+            <a:xfrm>
+              <a:off x="10170496" y="5397177"/>
+              <a:ext cx="1378583" cy="923330"/>
+            </a:xfrm>
+            <a:prstGeom prst="rect">
+              <a:avLst/>
+            </a:prstGeom>
+            <a:noFill/>
+          </p:spPr>
+          <p:txBody>
+            <a:bodyPr wrap="none" rtlCol="0">
+              <a:spAutoFit/>
+            </a:bodyPr>
+            <a:lstStyle/>
+            <a:p>
+              <a:pPr algn="ctr"/>
+              <a:r>
+                <a:rPr lang="en-CA" dirty="0">
+                  <a:solidFill>
+                    <a:srgbClr val="0070C0"/>
+                  </a:solidFill>
+                  <a:cs typeface="Segoe UI Light" panose="020B0502040204020203" pitchFamily="34" charset="0"/>
+                </a:rPr>
+                <a:t>TFS</a:t>
+              </a:r>
+            </a:p>
+            <a:p>
+              <a:pPr algn="ctr"/>
+              <a:r>
+                <a:rPr lang="en-CA" dirty="0">
+                  <a:solidFill>
+                    <a:srgbClr val="0070C0"/>
+                  </a:solidFill>
+                  <a:cs typeface="Segoe UI Light" panose="020B0502040204020203" pitchFamily="34" charset="0"/>
+                </a:rPr>
+                <a:t>AT + DT</a:t>
+              </a:r>
+            </a:p>
+            <a:p>
+              <a:pPr algn="ctr"/>
+              <a:r>
+                <a:rPr lang="en-CA" dirty="0">
+                  <a:solidFill>
+                    <a:srgbClr val="0070C0"/>
+                  </a:solidFill>
+                  <a:cs typeface="Segoe UI Light" panose="020B0502040204020203" pitchFamily="34" charset="0"/>
+                </a:rPr>
+                <a:t>Multi-Server</a:t>
+              </a:r>
+            </a:p>
+          </p:txBody>
+        </p:sp>
+        <p:pic>
+          <p:nvPicPr>
+            <p:cNvPr id="48" name="Graphic 47" descr="Remote control">
+              <a:extLst>
+                <a:ext uri="{FF2B5EF4-FFF2-40B4-BE49-F238E27FC236}">
+                  <a16:creationId xmlns:a16="http://schemas.microsoft.com/office/drawing/2014/main" id="{5E7B6EB3-0C9C-4549-A87A-0CAB1C4411E4}"/>
+                </a:ext>
+              </a:extLst>
+            </p:cNvPr>
+            <p:cNvPicPr>
+              <a:picLocks noChangeAspect="1"/>
+            </p:cNvPicPr>
+            <p:nvPr/>
+          </p:nvPicPr>
+          <p:blipFill>
+            <a:blip r:embed="rId5">
+              <a:extLst>
+                <a:ext uri="{28A0092B-C50C-407E-A947-70E740481C1C}">
+                  <a14:useLocalDpi xmlns:a14="http://schemas.microsoft.com/office/drawing/2010/main" val="0"/>
+                </a:ext>
+                <a:ext uri="{96DAC541-7B7A-43D3-8B79-37D633B846F1}">
+                  <asvg:svgBlip xmlns:asvg="http://schemas.microsoft.com/office/drawing/2016/SVG/main" r:embed="rId6"/>
+                </a:ext>
+              </a:extLst>
+            </a:blip>
+            <a:stretch>
+              <a:fillRect/>
+            </a:stretch>
+          </p:blipFill>
+          <p:spPr>
+            <a:xfrm>
+              <a:off x="8725418" y="5307535"/>
+              <a:ext cx="1042726" cy="1042726"/>
+            </a:xfrm>
+            <a:prstGeom prst="rect">
+              <a:avLst/>
+            </a:prstGeom>
+          </p:spPr>
+        </p:pic>
+        <p:pic>
+          <p:nvPicPr>
+            <p:cNvPr id="49" name="Graphic 48" descr="Remote control">
+              <a:extLst>
+                <a:ext uri="{FF2B5EF4-FFF2-40B4-BE49-F238E27FC236}">
+                  <a16:creationId xmlns:a16="http://schemas.microsoft.com/office/drawing/2014/main" id="{30EE586D-CADB-4AF2-A802-84FA754DE9FB}"/>
+                </a:ext>
+              </a:extLst>
+            </p:cNvPr>
+            <p:cNvPicPr>
+              <a:picLocks noChangeAspect="1"/>
+            </p:cNvPicPr>
+            <p:nvPr/>
+          </p:nvPicPr>
+          <p:blipFill>
+            <a:blip r:embed="rId5">
+              <a:extLst>
+                <a:ext uri="{28A0092B-C50C-407E-A947-70E740481C1C}">
+                  <a14:useLocalDpi xmlns:a14="http://schemas.microsoft.com/office/drawing/2010/main" val="0"/>
+                </a:ext>
+                <a:ext uri="{96DAC541-7B7A-43D3-8B79-37D633B846F1}">
+                  <asvg:svgBlip xmlns:asvg="http://schemas.microsoft.com/office/drawing/2016/SVG/main" r:embed="rId6"/>
+                </a:ext>
+              </a:extLst>
+            </a:blip>
+            <a:stretch>
+              <a:fillRect/>
+            </a:stretch>
+          </p:blipFill>
+          <p:spPr>
+            <a:xfrm>
+              <a:off x="9290439" y="5311031"/>
+              <a:ext cx="1042726" cy="1042726"/>
+            </a:xfrm>
+            <a:prstGeom prst="rect">
+              <a:avLst/>
+            </a:prstGeom>
+          </p:spPr>
+        </p:pic>
+      </p:grpSp>
+      <p:sp>
+        <p:nvSpPr>
+          <p:cNvPr id="50" name="TextBox 49">
+            <a:extLst>
+              <a:ext uri="{FF2B5EF4-FFF2-40B4-BE49-F238E27FC236}">
+                <a16:creationId xmlns:a16="http://schemas.microsoft.com/office/drawing/2014/main" id="{4FA5112B-99DA-48AB-A1AA-99EB08FDD832}"/>
+              </a:ext>
+            </a:extLst>
+          </p:cNvPr>
+          <p:cNvSpPr txBox="1"/>
+          <p:nvPr/>
+        </p:nvSpPr>
+        <p:spPr>
+          <a:xfrm>
+            <a:off x="10536013" y="1000764"/>
+            <a:ext cx="647550" cy="369332"/>
+          </a:xfrm>
+          <a:prstGeom prst="rect">
+            <a:avLst/>
+          </a:prstGeom>
+          <a:noFill/>
+        </p:spPr>
+        <p:txBody>
+          <a:bodyPr wrap="none" rtlCol="0">
+            <a:spAutoFit/>
+          </a:bodyPr>
+          <a:lstStyle/>
+          <a:p>
+            <a:pPr algn="ctr"/>
+            <a:r>
+              <a:rPr lang="en-CA" dirty="0">
+                <a:solidFill>
+                  <a:srgbClr val="0070C0"/>
+                </a:solidFill>
+                <a:cs typeface="Segoe UI Light" panose="020B0502040204020203" pitchFamily="34" charset="0"/>
+              </a:rPr>
+              <a:t>VSTS</a:t>
+            </a:r>
+          </a:p>
+        </p:txBody>
+      </p:sp>
+      <p:cxnSp>
+        <p:nvCxnSpPr>
+          <p:cNvPr id="52" name="Connector: Elbow 51">
+            <a:extLst>
+              <a:ext uri="{FF2B5EF4-FFF2-40B4-BE49-F238E27FC236}">
+                <a16:creationId xmlns:a16="http://schemas.microsoft.com/office/drawing/2014/main" id="{5A652A5E-0DCC-46D5-B97F-7AAA8CFA72E1}"/>
+              </a:ext>
+            </a:extLst>
+          </p:cNvPr>
+          <p:cNvCxnSpPr>
+            <a:cxnSpLocks/>
+            <a:stCxn id="2" idx="3"/>
+            <a:endCxn id="20" idx="1"/>
+          </p:cNvCxnSpPr>
+          <p:nvPr/>
+        </p:nvCxnSpPr>
+        <p:spPr>
+          <a:xfrm>
+            <a:off x="6429826" y="500742"/>
+            <a:ext cx="2713939" cy="684688"/>
+          </a:xfrm>
+          <a:prstGeom prst="bentConnector3">
+            <a:avLst/>
+          </a:prstGeom>
+          <a:ln w="12700">
+            <a:tailEnd type="triangle" w="lg" len="sm"/>
+          </a:ln>
+        </p:spPr>
+        <p:style>
+          <a:lnRef idx="1">
+            <a:schemeClr val="accent1"/>
+          </a:lnRef>
+          <a:fillRef idx="0">
+            <a:schemeClr val="accent1"/>
+          </a:fillRef>
+          <a:effectRef idx="0">
+            <a:schemeClr val="accent1"/>
+          </a:effectRef>
+          <a:fontRef idx="minor">
+            <a:schemeClr val="tx1"/>
+          </a:fontRef>
+        </p:style>
+      </p:cxnSp>
+      <p:cxnSp>
+        <p:nvCxnSpPr>
+          <p:cNvPr id="56" name="Connector: Elbow 55">
+            <a:extLst>
+              <a:ext uri="{FF2B5EF4-FFF2-40B4-BE49-F238E27FC236}">
+                <a16:creationId xmlns:a16="http://schemas.microsoft.com/office/drawing/2014/main" id="{A2EE9A62-A67C-468E-932E-D1AF162CFA55}"/>
+              </a:ext>
+            </a:extLst>
+          </p:cNvPr>
+          <p:cNvCxnSpPr>
+            <a:cxnSpLocks/>
+            <a:stCxn id="4" idx="3"/>
+            <a:endCxn id="20" idx="1"/>
+          </p:cNvCxnSpPr>
+          <p:nvPr/>
+        </p:nvCxnSpPr>
+        <p:spPr>
+          <a:xfrm flipV="1">
+            <a:off x="6429826" y="1185430"/>
+            <a:ext cx="2713939" cy="665140"/>
+          </a:xfrm>
+          <a:prstGeom prst="bentConnector3">
+            <a:avLst/>
+          </a:prstGeom>
+          <a:ln w="12700">
+            <a:tailEnd type="triangle" w="lg" len="sm"/>
+          </a:ln>
+        </p:spPr>
+        <p:style>
+          <a:lnRef idx="1">
+            <a:schemeClr val="accent1"/>
+          </a:lnRef>
+          <a:fillRef idx="0">
+            <a:schemeClr val="accent1"/>
+          </a:fillRef>
+          <a:effectRef idx="0">
+            <a:schemeClr val="accent1"/>
+          </a:effectRef>
+          <a:fontRef idx="minor">
+            <a:schemeClr val="tx1"/>
+          </a:fontRef>
+        </p:style>
+      </p:cxnSp>
+      <p:cxnSp>
+        <p:nvCxnSpPr>
+          <p:cNvPr id="59" name="Connector: Elbow 58">
+            <a:extLst>
+              <a:ext uri="{FF2B5EF4-FFF2-40B4-BE49-F238E27FC236}">
+                <a16:creationId xmlns:a16="http://schemas.microsoft.com/office/drawing/2014/main" id="{53A01454-6378-4E54-84A2-A5826F64C486}"/>
+              </a:ext>
+            </a:extLst>
+          </p:cNvPr>
+          <p:cNvCxnSpPr>
+            <a:cxnSpLocks/>
+            <a:stCxn id="5" idx="3"/>
+            <a:endCxn id="20" idx="1"/>
+          </p:cNvCxnSpPr>
+          <p:nvPr/>
+        </p:nvCxnSpPr>
+        <p:spPr>
+          <a:xfrm flipV="1">
+            <a:off x="6429826" y="1185430"/>
+            <a:ext cx="2713939" cy="1336424"/>
+          </a:xfrm>
+          <a:prstGeom prst="bentConnector3">
+            <a:avLst/>
+          </a:prstGeom>
+          <a:ln w="12700">
+            <a:tailEnd type="triangle" w="lg" len="sm"/>
+          </a:ln>
+        </p:spPr>
+        <p:style>
+          <a:lnRef idx="1">
+            <a:schemeClr val="accent1"/>
+          </a:lnRef>
+          <a:fillRef idx="0">
+            <a:schemeClr val="accent1"/>
+          </a:fillRef>
+          <a:effectRef idx="0">
+            <a:schemeClr val="accent1"/>
+          </a:effectRef>
+          <a:fontRef idx="minor">
+            <a:schemeClr val="tx1"/>
+          </a:fontRef>
+        </p:style>
+      </p:cxnSp>
+      <p:cxnSp>
+        <p:nvCxnSpPr>
+          <p:cNvPr id="62" name="Connector: Elbow 61">
+            <a:extLst>
+              <a:ext uri="{FF2B5EF4-FFF2-40B4-BE49-F238E27FC236}">
+                <a16:creationId xmlns:a16="http://schemas.microsoft.com/office/drawing/2014/main" id="{583319C1-C157-45B1-8DCB-2AD2703BB4DD}"/>
+              </a:ext>
+            </a:extLst>
+          </p:cNvPr>
+          <p:cNvCxnSpPr>
+            <a:cxnSpLocks/>
+            <a:stCxn id="6" idx="3"/>
+            <a:endCxn id="20" idx="1"/>
+          </p:cNvCxnSpPr>
+          <p:nvPr/>
+        </p:nvCxnSpPr>
+        <p:spPr>
+          <a:xfrm flipV="1">
+            <a:off x="6429828" y="1185430"/>
+            <a:ext cx="2713937" cy="2014968"/>
+          </a:xfrm>
+          <a:prstGeom prst="bentConnector3">
+            <a:avLst/>
+          </a:prstGeom>
+          <a:ln w="12700">
+            <a:tailEnd type="triangle" w="lg" len="sm"/>
+          </a:ln>
+        </p:spPr>
+        <p:style>
+          <a:lnRef idx="1">
+            <a:schemeClr val="accent1"/>
+          </a:lnRef>
+          <a:fillRef idx="0">
+            <a:schemeClr val="accent1"/>
+          </a:fillRef>
+          <a:effectRef idx="0">
+            <a:schemeClr val="accent1"/>
+          </a:effectRef>
+          <a:fontRef idx="minor">
+            <a:schemeClr val="tx1"/>
+          </a:fontRef>
+        </p:style>
+      </p:cxnSp>
+      <p:cxnSp>
+        <p:nvCxnSpPr>
+          <p:cNvPr id="65" name="Connector: Elbow 64">
+            <a:extLst>
+              <a:ext uri="{FF2B5EF4-FFF2-40B4-BE49-F238E27FC236}">
+                <a16:creationId xmlns:a16="http://schemas.microsoft.com/office/drawing/2014/main" id="{5E7D57C4-7910-49A6-A9DD-2D6B5F071CE1}"/>
+              </a:ext>
+            </a:extLst>
+          </p:cNvPr>
+          <p:cNvCxnSpPr>
+            <a:cxnSpLocks/>
+            <a:stCxn id="83" idx="6"/>
+            <a:endCxn id="20" idx="1"/>
+          </p:cNvCxnSpPr>
+          <p:nvPr/>
+        </p:nvCxnSpPr>
+        <p:spPr>
+          <a:xfrm flipV="1">
+            <a:off x="6429826" y="1185430"/>
+            <a:ext cx="2713939" cy="2612342"/>
+          </a:xfrm>
+          <a:prstGeom prst="bentConnector3">
+            <a:avLst>
+              <a:gd name="adj1" fmla="val 50000"/>
+            </a:avLst>
+          </a:prstGeom>
+          <a:ln w="12700">
+            <a:tailEnd type="triangle" w="lg" len="sm"/>
+          </a:ln>
+        </p:spPr>
+        <p:style>
+          <a:lnRef idx="1">
+            <a:schemeClr val="accent1"/>
+          </a:lnRef>
+          <a:fillRef idx="0">
+            <a:schemeClr val="accent1"/>
+          </a:fillRef>
+          <a:effectRef idx="0">
+            <a:schemeClr val="accent1"/>
+          </a:effectRef>
+          <a:fontRef idx="minor">
+            <a:schemeClr val="tx1"/>
+          </a:fontRef>
+        </p:style>
+      </p:cxnSp>
+      <p:cxnSp>
+        <p:nvCxnSpPr>
+          <p:cNvPr id="68" name="Connector: Elbow 67">
+            <a:extLst>
+              <a:ext uri="{FF2B5EF4-FFF2-40B4-BE49-F238E27FC236}">
+                <a16:creationId xmlns:a16="http://schemas.microsoft.com/office/drawing/2014/main" id="{6BCB2922-9D9F-4072-998A-3DA7668F73BF}"/>
+              </a:ext>
+            </a:extLst>
+          </p:cNvPr>
+          <p:cNvCxnSpPr>
+            <a:cxnSpLocks/>
+            <a:stCxn id="84" idx="6"/>
+            <a:endCxn id="28" idx="1"/>
+          </p:cNvCxnSpPr>
+          <p:nvPr/>
+        </p:nvCxnSpPr>
+        <p:spPr>
+          <a:xfrm flipV="1">
+            <a:off x="6431943" y="3293801"/>
+            <a:ext cx="2858496" cy="664971"/>
+          </a:xfrm>
+          <a:prstGeom prst="bentConnector3">
+            <a:avLst>
+              <a:gd name="adj1" fmla="val 53877"/>
+            </a:avLst>
+          </a:prstGeom>
+          <a:ln w="12700">
+            <a:prstDash val="dash"/>
+            <a:tailEnd type="triangle" w="lg" len="sm"/>
+          </a:ln>
+        </p:spPr>
+        <p:style>
+          <a:lnRef idx="1">
+            <a:schemeClr val="accent1"/>
+          </a:lnRef>
+          <a:fillRef idx="0">
+            <a:schemeClr val="accent1"/>
+          </a:fillRef>
+          <a:effectRef idx="0">
+            <a:schemeClr val="accent1"/>
+          </a:effectRef>
+          <a:fontRef idx="minor">
+            <a:schemeClr val="tx1"/>
+          </a:fontRef>
+        </p:style>
+      </p:cxnSp>
+      <p:cxnSp>
+        <p:nvCxnSpPr>
+          <p:cNvPr id="71" name="Connector: Elbow 70">
+            <a:extLst>
+              <a:ext uri="{FF2B5EF4-FFF2-40B4-BE49-F238E27FC236}">
+                <a16:creationId xmlns:a16="http://schemas.microsoft.com/office/drawing/2014/main" id="{DB35B8E3-2639-4460-86BE-67EE826D563A}"/>
+              </a:ext>
+            </a:extLst>
+          </p:cNvPr>
+          <p:cNvCxnSpPr>
+            <a:cxnSpLocks/>
+            <a:stCxn id="9" idx="3"/>
+            <a:endCxn id="44" idx="1"/>
+          </p:cNvCxnSpPr>
+          <p:nvPr/>
+        </p:nvCxnSpPr>
+        <p:spPr>
+          <a:xfrm flipV="1">
+            <a:off x="6429826" y="4567068"/>
+            <a:ext cx="2286296" cy="679852"/>
+          </a:xfrm>
+          <a:prstGeom prst="bentConnector3">
+            <a:avLst>
+              <a:gd name="adj1" fmla="val 81099"/>
+            </a:avLst>
+          </a:prstGeom>
+          <a:ln w="12700">
+            <a:tailEnd type="triangle" w="lg" len="sm"/>
+          </a:ln>
+        </p:spPr>
+        <p:style>
+          <a:lnRef idx="1">
+            <a:schemeClr val="accent1"/>
+          </a:lnRef>
+          <a:fillRef idx="0">
+            <a:schemeClr val="accent1"/>
+          </a:fillRef>
+          <a:effectRef idx="0">
+            <a:schemeClr val="accent1"/>
+          </a:effectRef>
+          <a:fontRef idx="minor">
+            <a:schemeClr val="tx1"/>
+          </a:fontRef>
+        </p:style>
+      </p:cxnSp>
+      <p:cxnSp>
+        <p:nvCxnSpPr>
+          <p:cNvPr id="75" name="Connector: Elbow 74">
+            <a:extLst>
+              <a:ext uri="{FF2B5EF4-FFF2-40B4-BE49-F238E27FC236}">
+                <a16:creationId xmlns:a16="http://schemas.microsoft.com/office/drawing/2014/main" id="{FE109AF0-05B7-4676-A368-D5EEED99764E}"/>
+              </a:ext>
+            </a:extLst>
+          </p:cNvPr>
+          <p:cNvCxnSpPr>
+            <a:cxnSpLocks/>
+            <a:stCxn id="87" idx="3"/>
+            <a:endCxn id="48" idx="1"/>
+          </p:cNvCxnSpPr>
+          <p:nvPr/>
+        </p:nvCxnSpPr>
+        <p:spPr>
+          <a:xfrm flipV="1">
+            <a:off x="6429825" y="5828898"/>
+            <a:ext cx="2295593" cy="1748"/>
+          </a:xfrm>
+          <a:prstGeom prst="bentConnector3">
+            <a:avLst>
+              <a:gd name="adj1" fmla="val 50000"/>
+            </a:avLst>
+          </a:prstGeom>
+          <a:ln w="12700">
+            <a:tailEnd type="triangle" w="lg" len="sm"/>
+          </a:ln>
+        </p:spPr>
+        <p:style>
+          <a:lnRef idx="1">
+            <a:schemeClr val="accent1"/>
+          </a:lnRef>
+          <a:fillRef idx="0">
+            <a:schemeClr val="accent1"/>
+          </a:fillRef>
+          <a:effectRef idx="0">
+            <a:schemeClr val="accent1"/>
+          </a:effectRef>
+          <a:fontRef idx="minor">
+            <a:schemeClr val="tx1"/>
+          </a:fontRef>
+        </p:style>
+      </p:cxnSp>
+      <p:sp>
+        <p:nvSpPr>
+          <p:cNvPr id="83" name="Oval 82">
+            <a:extLst>
+              <a:ext uri="{FF2B5EF4-FFF2-40B4-BE49-F238E27FC236}">
+                <a16:creationId xmlns:a16="http://schemas.microsoft.com/office/drawing/2014/main" id="{FC131873-A574-4BD7-BD23-14AD2C950241}"/>
+              </a:ext>
+            </a:extLst>
+          </p:cNvPr>
+          <p:cNvSpPr/>
+          <p:nvPr/>
+        </p:nvSpPr>
+        <p:spPr>
+          <a:xfrm>
+            <a:off x="6359313" y="3757973"/>
+            <a:ext cx="70513" cy="79597"/>
+          </a:xfrm>
+          <a:prstGeom prst="ellipse">
+            <a:avLst/>
+          </a:prstGeom>
+          <a:noFill/>
+          <a:ln>
+            <a:noFill/>
+          </a:ln>
+        </p:spPr>
+        <p:style>
+          <a:lnRef idx="2">
+            <a:schemeClr val="accent1">
+              <a:shade val="50000"/>
+            </a:schemeClr>
+          </a:lnRef>
+          <a:fillRef idx="1">
+            <a:schemeClr val="accent1"/>
+          </a:fillRef>
+          <a:effectRef idx="0">
+            <a:schemeClr val="accent1"/>
+          </a:effectRef>
+          <a:fontRef idx="minor">
+            <a:schemeClr val="lt1"/>
+          </a:fontRef>
+        </p:style>
+        <p:txBody>
+          <a:bodyPr rtlCol="0" anchor="ctr"/>
+          <a:lstStyle/>
+          <a:p>
+            <a:pPr algn="ctr"/>
+            <a:endParaRPr lang="en-CA" sz="2000">
+              <a:cs typeface="Segoe UI Light" panose="020B0502040204020203" pitchFamily="34" charset="0"/>
+            </a:endParaRPr>
+          </a:p>
+        </p:txBody>
+      </p:sp>
+      <p:sp>
+        <p:nvSpPr>
+          <p:cNvPr id="84" name="Oval 83">
+            <a:extLst>
+              <a:ext uri="{FF2B5EF4-FFF2-40B4-BE49-F238E27FC236}">
+                <a16:creationId xmlns:a16="http://schemas.microsoft.com/office/drawing/2014/main" id="{650E1386-D9D1-4D49-9914-769BCE348192}"/>
+              </a:ext>
+            </a:extLst>
+          </p:cNvPr>
+          <p:cNvSpPr/>
+          <p:nvPr/>
+        </p:nvSpPr>
+        <p:spPr>
+          <a:xfrm>
+            <a:off x="6361430" y="3918973"/>
+            <a:ext cx="70513" cy="79597"/>
+          </a:xfrm>
+          <a:prstGeom prst="ellipse">
+            <a:avLst/>
+          </a:prstGeom>
+          <a:noFill/>
+          <a:ln>
+            <a:noFill/>
+          </a:ln>
+        </p:spPr>
+        <p:style>
+          <a:lnRef idx="2">
+            <a:schemeClr val="accent1">
+              <a:shade val="50000"/>
+            </a:schemeClr>
+          </a:lnRef>
+          <a:fillRef idx="1">
+            <a:schemeClr val="accent1"/>
+          </a:fillRef>
+          <a:effectRef idx="0">
+            <a:schemeClr val="accent1"/>
+          </a:effectRef>
+          <a:fontRef idx="minor">
+            <a:schemeClr val="lt1"/>
+          </a:fontRef>
+        </p:style>
+        <p:txBody>
+          <a:bodyPr rtlCol="0" anchor="ctr"/>
+          <a:lstStyle/>
+          <a:p>
+            <a:pPr algn="ctr"/>
+            <a:endParaRPr lang="en-CA" sz="2000">
+              <a:cs typeface="Segoe UI Light" panose="020B0502040204020203" pitchFamily="34" charset="0"/>
+            </a:endParaRPr>
+          </a:p>
+        </p:txBody>
+      </p:sp>
+      <p:sp>
+        <p:nvSpPr>
+          <p:cNvPr id="87" name="Rectangle: Rounded Corners 86">
+            <a:extLst>
+              <a:ext uri="{FF2B5EF4-FFF2-40B4-BE49-F238E27FC236}">
+                <a16:creationId xmlns:a16="http://schemas.microsoft.com/office/drawing/2014/main" id="{CED94FA3-9A2B-4671-94D0-7CA1C69F2EA1}"/>
+              </a:ext>
+            </a:extLst>
+          </p:cNvPr>
+          <p:cNvSpPr/>
+          <p:nvPr/>
+        </p:nvSpPr>
+        <p:spPr>
+          <a:xfrm>
+            <a:off x="420913" y="5678246"/>
+            <a:ext cx="6008912" cy="304800"/>
+          </a:xfrm>
+          <a:prstGeom prst="roundRect">
+            <a:avLst/>
+          </a:prstGeom>
+        </p:spPr>
+        <p:style>
+          <a:lnRef idx="2">
+            <a:schemeClr val="accent1"/>
+          </a:lnRef>
+          <a:fillRef idx="1">
+            <a:schemeClr val="lt1"/>
+          </a:fillRef>
+          <a:effectRef idx="0">
+            <a:schemeClr val="accent1"/>
+          </a:effectRef>
+          <a:fontRef idx="minor">
+            <a:schemeClr val="dk1"/>
+          </a:fontRef>
+        </p:style>
+        <p:txBody>
+          <a:bodyPr lIns="36000" tIns="36000" rIns="36000" bIns="36000" rtlCol="0" anchor="ctr"/>
+          <a:lstStyle/>
+          <a:p>
+            <a:pPr algn="r"/>
+            <a:r>
+              <a:rPr lang="en-CA" sz="1600" dirty="0">
+                <a:solidFill>
+                  <a:srgbClr val="0070C0"/>
+                </a:solidFill>
+                <a:cs typeface="Segoe UI Light" panose="020B0502040204020203" pitchFamily="34" charset="0"/>
+              </a:rPr>
+              <a:t>Do you want to manage servers and support more than 3000 users?</a:t>
+            </a:r>
+          </a:p>
+        </p:txBody>
+      </p:sp>
+      <p:sp>
+        <p:nvSpPr>
+          <p:cNvPr id="88" name="TextBox 87">
+            <a:extLst>
+              <a:ext uri="{FF2B5EF4-FFF2-40B4-BE49-F238E27FC236}">
+                <a16:creationId xmlns:a16="http://schemas.microsoft.com/office/drawing/2014/main" id="{54F961EE-446C-4D03-A53A-E3EC28F83F39}"/>
+              </a:ext>
+            </a:extLst>
+          </p:cNvPr>
+          <p:cNvSpPr txBox="1"/>
+          <p:nvPr/>
+        </p:nvSpPr>
+        <p:spPr>
+          <a:xfrm>
+            <a:off x="83240" y="5701875"/>
+            <a:ext cx="306174" cy="276999"/>
+          </a:xfrm>
+          <a:prstGeom prst="rect">
+            <a:avLst/>
+          </a:prstGeom>
+          <a:noFill/>
+        </p:spPr>
+        <p:txBody>
+          <a:bodyPr wrap="none" lIns="0" tIns="0" rIns="0" bIns="0" rtlCol="0">
+            <a:spAutoFit/>
+          </a:bodyPr>
+          <a:lstStyle/>
+          <a:p>
+            <a:r>
+              <a:rPr lang="en-CA" dirty="0">
+                <a:solidFill>
+                  <a:srgbClr val="0070C0"/>
+                </a:solidFill>
+              </a:rPr>
+              <a:t>❾</a:t>
+            </a:r>
+          </a:p>
+        </p:txBody>
+      </p:sp>
+      <p:cxnSp>
+        <p:nvCxnSpPr>
+          <p:cNvPr id="94" name="Connector: Elbow 93">
+            <a:extLst>
+              <a:ext uri="{FF2B5EF4-FFF2-40B4-BE49-F238E27FC236}">
+                <a16:creationId xmlns:a16="http://schemas.microsoft.com/office/drawing/2014/main" id="{A7DA876C-71B2-4B13-A6FF-03676DE371E3}"/>
+              </a:ext>
+            </a:extLst>
+          </p:cNvPr>
+          <p:cNvCxnSpPr>
+            <a:cxnSpLocks/>
+            <a:stCxn id="8" idx="3"/>
+            <a:endCxn id="28" idx="1"/>
+          </p:cNvCxnSpPr>
+          <p:nvPr/>
+        </p:nvCxnSpPr>
+        <p:spPr>
+          <a:xfrm flipV="1">
+            <a:off x="6429826" y="3293801"/>
+            <a:ext cx="2860613" cy="1273267"/>
+          </a:xfrm>
+          <a:prstGeom prst="bentConnector3">
+            <a:avLst>
+              <a:gd name="adj1" fmla="val 58072"/>
+            </a:avLst>
+          </a:prstGeom>
+          <a:ln w="12700">
+            <a:tailEnd type="triangle" w="lg" len="sm"/>
+          </a:ln>
+        </p:spPr>
+        <p:style>
+          <a:lnRef idx="1">
+            <a:schemeClr val="accent1"/>
+          </a:lnRef>
+          <a:fillRef idx="0">
+            <a:schemeClr val="accent1"/>
+          </a:fillRef>
+          <a:effectRef idx="0">
+            <a:schemeClr val="accent1"/>
+          </a:effectRef>
+          <a:fontRef idx="minor">
+            <a:schemeClr val="tx1"/>
+          </a:fontRef>
+        </p:style>
+      </p:cxnSp>
+      <p:sp>
+        <p:nvSpPr>
+          <p:cNvPr id="99" name="TextBox 98">
+            <a:extLst>
+              <a:ext uri="{FF2B5EF4-FFF2-40B4-BE49-F238E27FC236}">
+                <a16:creationId xmlns:a16="http://schemas.microsoft.com/office/drawing/2014/main" id="{B0081B56-A73C-4F91-A88E-2115F05CAF21}"/>
+              </a:ext>
+            </a:extLst>
+          </p:cNvPr>
+          <p:cNvSpPr txBox="1"/>
+          <p:nvPr/>
+        </p:nvSpPr>
+        <p:spPr>
+          <a:xfrm>
+            <a:off x="6698704" y="292847"/>
+            <a:ext cx="380480" cy="349702"/>
+          </a:xfrm>
+          <a:prstGeom prst="rect">
+            <a:avLst/>
+          </a:prstGeom>
+          <a:solidFill>
+            <a:schemeClr val="bg1"/>
+          </a:solidFill>
+        </p:spPr>
+        <p:txBody>
+          <a:bodyPr wrap="none" lIns="36000" tIns="36000" rIns="36000" bIns="36000" rtlCol="0">
+            <a:spAutoFit/>
+          </a:bodyPr>
+          <a:lstStyle/>
+          <a:p>
+            <a:r>
+              <a:rPr lang="en-CA" dirty="0">
+                <a:solidFill>
+                  <a:srgbClr val="C00000"/>
+                </a:solidFill>
+              </a:rPr>
+              <a:t>NO</a:t>
+            </a:r>
+          </a:p>
+        </p:txBody>
+      </p:sp>
+      <p:sp>
+        <p:nvSpPr>
+          <p:cNvPr id="101" name="TextBox 100">
+            <a:extLst>
+              <a:ext uri="{FF2B5EF4-FFF2-40B4-BE49-F238E27FC236}">
+                <a16:creationId xmlns:a16="http://schemas.microsoft.com/office/drawing/2014/main" id="{A7103BC0-8E2F-410F-95BF-CDE0398D43EC}"/>
+              </a:ext>
+            </a:extLst>
+          </p:cNvPr>
+          <p:cNvSpPr txBox="1"/>
+          <p:nvPr/>
+        </p:nvSpPr>
+        <p:spPr>
+          <a:xfrm>
+            <a:off x="6698704" y="1670811"/>
+            <a:ext cx="374068" cy="349702"/>
+          </a:xfrm>
+          <a:prstGeom prst="rect">
+            <a:avLst/>
+          </a:prstGeom>
+          <a:solidFill>
+            <a:schemeClr val="bg1"/>
+          </a:solidFill>
+        </p:spPr>
+        <p:txBody>
+          <a:bodyPr wrap="square" lIns="36000" tIns="36000" rIns="36000" bIns="36000" rtlCol="0">
+            <a:spAutoFit/>
+          </a:bodyPr>
+          <a:lstStyle/>
+          <a:p>
+            <a:r>
+              <a:rPr lang="en-CA" dirty="0">
+                <a:solidFill>
+                  <a:srgbClr val="C00000"/>
+                </a:solidFill>
+              </a:rPr>
+              <a:t>NO</a:t>
+            </a:r>
+          </a:p>
+        </p:txBody>
+      </p:sp>
+      <p:sp>
+        <p:nvSpPr>
+          <p:cNvPr id="102" name="TextBox 101">
+            <a:extLst>
+              <a:ext uri="{FF2B5EF4-FFF2-40B4-BE49-F238E27FC236}">
+                <a16:creationId xmlns:a16="http://schemas.microsoft.com/office/drawing/2014/main" id="{12E7575F-E0AE-4E48-8190-4BC4450A57C9}"/>
+              </a:ext>
+            </a:extLst>
+          </p:cNvPr>
+          <p:cNvSpPr txBox="1"/>
+          <p:nvPr/>
+        </p:nvSpPr>
+        <p:spPr>
+          <a:xfrm>
+            <a:off x="6698704" y="2337188"/>
+            <a:ext cx="380480" cy="349702"/>
+          </a:xfrm>
+          <a:prstGeom prst="rect">
+            <a:avLst/>
+          </a:prstGeom>
+          <a:solidFill>
+            <a:schemeClr val="bg1"/>
+          </a:solidFill>
+        </p:spPr>
+        <p:txBody>
+          <a:bodyPr wrap="none" lIns="36000" tIns="36000" rIns="36000" bIns="36000" rtlCol="0">
+            <a:spAutoFit/>
+          </a:bodyPr>
+          <a:lstStyle/>
+          <a:p>
+            <a:r>
+              <a:rPr lang="en-CA" dirty="0">
+                <a:solidFill>
+                  <a:srgbClr val="C00000"/>
+                </a:solidFill>
+              </a:rPr>
+              <a:t>NO</a:t>
+            </a:r>
+          </a:p>
+        </p:txBody>
+      </p:sp>
+      <p:sp>
+        <p:nvSpPr>
+          <p:cNvPr id="103" name="TextBox 102">
+            <a:extLst>
+              <a:ext uri="{FF2B5EF4-FFF2-40B4-BE49-F238E27FC236}">
+                <a16:creationId xmlns:a16="http://schemas.microsoft.com/office/drawing/2014/main" id="{FAB6785B-BF40-482F-809A-9F62B8CACD1A}"/>
+              </a:ext>
+            </a:extLst>
+          </p:cNvPr>
+          <p:cNvSpPr txBox="1"/>
+          <p:nvPr/>
+        </p:nvSpPr>
+        <p:spPr>
+          <a:xfrm>
+            <a:off x="6685399" y="3024173"/>
+            <a:ext cx="400678" cy="349702"/>
+          </a:xfrm>
+          <a:prstGeom prst="rect">
+            <a:avLst/>
+          </a:prstGeom>
+          <a:solidFill>
+            <a:schemeClr val="bg1"/>
+          </a:solidFill>
+        </p:spPr>
+        <p:txBody>
+          <a:bodyPr wrap="square" lIns="36000" tIns="36000" rIns="36000" bIns="36000" rtlCol="0">
+            <a:spAutoFit/>
+          </a:bodyPr>
+          <a:lstStyle/>
+          <a:p>
+            <a:r>
+              <a:rPr lang="en-CA" dirty="0">
+                <a:solidFill>
+                  <a:srgbClr val="00B050"/>
+                </a:solidFill>
+              </a:rPr>
+              <a:t>YES</a:t>
+            </a:r>
+          </a:p>
+        </p:txBody>
+      </p:sp>
+      <p:sp>
+        <p:nvSpPr>
+          <p:cNvPr id="104" name="TextBox 103">
+            <a:extLst>
+              <a:ext uri="{FF2B5EF4-FFF2-40B4-BE49-F238E27FC236}">
+                <a16:creationId xmlns:a16="http://schemas.microsoft.com/office/drawing/2014/main" id="{FCEA1195-6B6B-4657-8BC6-35DAA084DBAF}"/>
+              </a:ext>
+            </a:extLst>
+          </p:cNvPr>
+          <p:cNvSpPr txBox="1"/>
+          <p:nvPr/>
+        </p:nvSpPr>
+        <p:spPr>
+          <a:xfrm>
+            <a:off x="6666304" y="3710347"/>
+            <a:ext cx="400678" cy="349702"/>
+          </a:xfrm>
+          <a:prstGeom prst="rect">
+            <a:avLst/>
+          </a:prstGeom>
+          <a:solidFill>
+            <a:schemeClr val="bg1"/>
+          </a:solidFill>
+        </p:spPr>
+        <p:txBody>
+          <a:bodyPr wrap="square" lIns="36000" tIns="36000" rIns="36000" bIns="36000" rtlCol="0">
+            <a:spAutoFit/>
+          </a:bodyPr>
+          <a:lstStyle/>
+          <a:p>
+            <a:r>
+              <a:rPr lang="en-CA" dirty="0">
+                <a:solidFill>
+                  <a:srgbClr val="00B050"/>
+                </a:solidFill>
+              </a:rPr>
+              <a:t>YES</a:t>
+            </a:r>
+          </a:p>
+        </p:txBody>
+      </p:sp>
+      <p:sp>
+        <p:nvSpPr>
+          <p:cNvPr id="105" name="TextBox 104">
+            <a:extLst>
+              <a:ext uri="{FF2B5EF4-FFF2-40B4-BE49-F238E27FC236}">
+                <a16:creationId xmlns:a16="http://schemas.microsoft.com/office/drawing/2014/main" id="{9FBB4387-5AAA-42AD-B49B-A8CE399081AE}"/>
+              </a:ext>
+            </a:extLst>
+          </p:cNvPr>
+          <p:cNvSpPr txBox="1"/>
+          <p:nvPr/>
+        </p:nvSpPr>
+        <p:spPr>
+          <a:xfrm>
+            <a:off x="6685399" y="4392217"/>
+            <a:ext cx="400678" cy="349702"/>
+          </a:xfrm>
+          <a:prstGeom prst="rect">
+            <a:avLst/>
+          </a:prstGeom>
+          <a:solidFill>
+            <a:schemeClr val="bg1"/>
+          </a:solidFill>
+        </p:spPr>
+        <p:txBody>
+          <a:bodyPr wrap="square" lIns="36000" tIns="36000" rIns="36000" bIns="36000" rtlCol="0">
+            <a:spAutoFit/>
+          </a:bodyPr>
+          <a:lstStyle/>
+          <a:p>
+            <a:r>
+              <a:rPr lang="en-CA" dirty="0">
+                <a:solidFill>
+                  <a:srgbClr val="00B050"/>
+                </a:solidFill>
+              </a:rPr>
+              <a:t>YES</a:t>
+            </a:r>
+          </a:p>
+        </p:txBody>
+      </p:sp>
+      <p:sp>
+        <p:nvSpPr>
+          <p:cNvPr id="106" name="TextBox 105">
+            <a:extLst>
+              <a:ext uri="{FF2B5EF4-FFF2-40B4-BE49-F238E27FC236}">
+                <a16:creationId xmlns:a16="http://schemas.microsoft.com/office/drawing/2014/main" id="{27EF71AD-578D-4868-A798-F923B130E349}"/>
+              </a:ext>
+            </a:extLst>
+          </p:cNvPr>
+          <p:cNvSpPr txBox="1"/>
+          <p:nvPr/>
+        </p:nvSpPr>
+        <p:spPr>
+          <a:xfrm>
+            <a:off x="6685399" y="5072069"/>
+            <a:ext cx="400678" cy="349702"/>
+          </a:xfrm>
+          <a:prstGeom prst="rect">
+            <a:avLst/>
+          </a:prstGeom>
+          <a:solidFill>
+            <a:schemeClr val="bg1"/>
+          </a:solidFill>
+        </p:spPr>
+        <p:txBody>
+          <a:bodyPr wrap="square" lIns="36000" tIns="36000" rIns="36000" bIns="36000" rtlCol="0">
+            <a:spAutoFit/>
+          </a:bodyPr>
+          <a:lstStyle/>
+          <a:p>
+            <a:r>
+              <a:rPr lang="en-CA" dirty="0">
+                <a:solidFill>
+                  <a:srgbClr val="00B050"/>
+                </a:solidFill>
+              </a:rPr>
+              <a:t>YES</a:t>
+            </a:r>
+          </a:p>
+        </p:txBody>
+      </p:sp>
+      <p:sp>
+        <p:nvSpPr>
+          <p:cNvPr id="107" name="TextBox 106">
+            <a:extLst>
+              <a:ext uri="{FF2B5EF4-FFF2-40B4-BE49-F238E27FC236}">
+                <a16:creationId xmlns:a16="http://schemas.microsoft.com/office/drawing/2014/main" id="{63846C72-F921-4863-9073-81C12C3CEAE4}"/>
+              </a:ext>
+            </a:extLst>
+          </p:cNvPr>
+          <p:cNvSpPr txBox="1"/>
+          <p:nvPr/>
+        </p:nvSpPr>
+        <p:spPr>
+          <a:xfrm>
+            <a:off x="6685399" y="5640567"/>
+            <a:ext cx="400678" cy="349702"/>
+          </a:xfrm>
+          <a:prstGeom prst="rect">
+            <a:avLst/>
+          </a:prstGeom>
+          <a:solidFill>
+            <a:schemeClr val="bg1"/>
+          </a:solidFill>
+        </p:spPr>
+        <p:txBody>
+          <a:bodyPr wrap="square" lIns="36000" tIns="36000" rIns="36000" bIns="36000" rtlCol="0">
+            <a:spAutoFit/>
+          </a:bodyPr>
+          <a:lstStyle/>
+          <a:p>
+            <a:r>
+              <a:rPr lang="en-CA" dirty="0">
+                <a:solidFill>
+                  <a:srgbClr val="00B050"/>
+                </a:solidFill>
+              </a:rPr>
+              <a:t>YES</a:t>
+            </a:r>
+          </a:p>
+        </p:txBody>
+      </p:sp>
+      <p:cxnSp>
+        <p:nvCxnSpPr>
+          <p:cNvPr id="123" name="Straight Arrow Connector 122">
+            <a:extLst>
+              <a:ext uri="{FF2B5EF4-FFF2-40B4-BE49-F238E27FC236}">
+                <a16:creationId xmlns:a16="http://schemas.microsoft.com/office/drawing/2014/main" id="{722695FF-DB0A-4BD1-8F3C-B4D9AE83C671}"/>
+              </a:ext>
+            </a:extLst>
+          </p:cNvPr>
+          <p:cNvCxnSpPr/>
+          <p:nvPr/>
+        </p:nvCxnSpPr>
+        <p:spPr>
+          <a:xfrm>
+            <a:off x="236327" y="648969"/>
+            <a:ext cx="0" cy="407690"/>
+          </a:xfrm>
+          <a:prstGeom prst="straightConnector1">
+            <a:avLst/>
+          </a:prstGeom>
+          <a:ln>
+            <a:prstDash val="sysDash"/>
+            <a:headEnd type="none"/>
+            <a:tailEnd type="triangle" w="lg" len="sm"/>
+          </a:ln>
+        </p:spPr>
+        <p:style>
+          <a:lnRef idx="1">
+            <a:schemeClr val="accent1"/>
+          </a:lnRef>
+          <a:fillRef idx="0">
+            <a:schemeClr val="accent1"/>
+          </a:fillRef>
+          <a:effectRef idx="0">
+            <a:schemeClr val="accent1"/>
+          </a:effectRef>
+          <a:fontRef idx="minor">
+            <a:schemeClr val="tx1"/>
+          </a:fontRef>
+        </p:style>
+      </p:cxnSp>
+      <p:cxnSp>
+        <p:nvCxnSpPr>
+          <p:cNvPr id="124" name="Straight Arrow Connector 123">
+            <a:extLst>
+              <a:ext uri="{FF2B5EF4-FFF2-40B4-BE49-F238E27FC236}">
+                <a16:creationId xmlns:a16="http://schemas.microsoft.com/office/drawing/2014/main" id="{AB9A135F-54AE-4FFD-A18C-633C3FCF919D}"/>
+              </a:ext>
+            </a:extLst>
+          </p:cNvPr>
+          <p:cNvCxnSpPr>
+            <a:cxnSpLocks/>
+          </p:cNvCxnSpPr>
+          <p:nvPr/>
+        </p:nvCxnSpPr>
+        <p:spPr>
+          <a:xfrm>
+            <a:off x="236327" y="1333658"/>
+            <a:ext cx="0" cy="390421"/>
+          </a:xfrm>
+          <a:prstGeom prst="straightConnector1">
+            <a:avLst/>
+          </a:prstGeom>
+          <a:ln>
+            <a:prstDash val="sysDash"/>
+            <a:headEnd type="none"/>
+            <a:tailEnd type="triangle" w="lg" len="sm"/>
+          </a:ln>
+        </p:spPr>
+        <p:style>
+          <a:lnRef idx="1">
+            <a:schemeClr val="accent1"/>
+          </a:lnRef>
+          <a:fillRef idx="0">
+            <a:schemeClr val="accent1"/>
+          </a:fillRef>
+          <a:effectRef idx="0">
+            <a:schemeClr val="accent1"/>
+          </a:effectRef>
+          <a:fontRef idx="minor">
+            <a:schemeClr val="tx1"/>
+          </a:fontRef>
+        </p:style>
+      </p:cxnSp>
+      <p:cxnSp>
+        <p:nvCxnSpPr>
+          <p:cNvPr id="127" name="Straight Arrow Connector 126">
+            <a:extLst>
+              <a:ext uri="{FF2B5EF4-FFF2-40B4-BE49-F238E27FC236}">
+                <a16:creationId xmlns:a16="http://schemas.microsoft.com/office/drawing/2014/main" id="{BD44C4E1-FEB2-4165-8C28-E756F14486AF}"/>
+              </a:ext>
+            </a:extLst>
+          </p:cNvPr>
+          <p:cNvCxnSpPr>
+            <a:cxnSpLocks/>
+          </p:cNvCxnSpPr>
+          <p:nvPr/>
+        </p:nvCxnSpPr>
+        <p:spPr>
+          <a:xfrm>
+            <a:off x="236327" y="2001078"/>
+            <a:ext cx="0" cy="388375"/>
+          </a:xfrm>
+          <a:prstGeom prst="straightConnector1">
+            <a:avLst/>
+          </a:prstGeom>
+          <a:ln>
+            <a:prstDash val="sysDash"/>
+            <a:headEnd type="none"/>
+            <a:tailEnd type="triangle" w="lg" len="sm"/>
+          </a:ln>
+        </p:spPr>
+        <p:style>
+          <a:lnRef idx="1">
+            <a:schemeClr val="accent1"/>
+          </a:lnRef>
+          <a:fillRef idx="0">
+            <a:schemeClr val="accent1"/>
+          </a:fillRef>
+          <a:effectRef idx="0">
+            <a:schemeClr val="accent1"/>
+          </a:effectRef>
+          <a:fontRef idx="minor">
+            <a:schemeClr val="tx1"/>
+          </a:fontRef>
+        </p:style>
+      </p:cxnSp>
+      <p:cxnSp>
+        <p:nvCxnSpPr>
+          <p:cNvPr id="130" name="Straight Arrow Connector 129">
+            <a:extLst>
+              <a:ext uri="{FF2B5EF4-FFF2-40B4-BE49-F238E27FC236}">
+                <a16:creationId xmlns:a16="http://schemas.microsoft.com/office/drawing/2014/main" id="{D3F13F2F-30E8-4882-AA5C-BC8711B9CDD8}"/>
+              </a:ext>
+            </a:extLst>
+          </p:cNvPr>
+          <p:cNvCxnSpPr>
+            <a:cxnSpLocks/>
+          </p:cNvCxnSpPr>
+          <p:nvPr/>
+        </p:nvCxnSpPr>
+        <p:spPr>
+          <a:xfrm>
+            <a:off x="236327" y="2666452"/>
+            <a:ext cx="0" cy="414355"/>
+          </a:xfrm>
+          <a:prstGeom prst="straightConnector1">
+            <a:avLst/>
+          </a:prstGeom>
+          <a:ln>
+            <a:prstDash val="sysDash"/>
+            <a:headEnd type="none"/>
+            <a:tailEnd type="triangle" w="lg" len="sm"/>
+          </a:ln>
+        </p:spPr>
+        <p:style>
+          <a:lnRef idx="1">
+            <a:schemeClr val="accent1"/>
+          </a:lnRef>
+          <a:fillRef idx="0">
+            <a:schemeClr val="accent1"/>
+          </a:fillRef>
+          <a:effectRef idx="0">
+            <a:schemeClr val="accent1"/>
+          </a:effectRef>
+          <a:fontRef idx="minor">
+            <a:schemeClr val="tx1"/>
+          </a:fontRef>
+        </p:style>
+      </p:cxnSp>
+      <p:cxnSp>
+        <p:nvCxnSpPr>
+          <p:cNvPr id="133" name="Straight Arrow Connector 132">
+            <a:extLst>
+              <a:ext uri="{FF2B5EF4-FFF2-40B4-BE49-F238E27FC236}">
+                <a16:creationId xmlns:a16="http://schemas.microsoft.com/office/drawing/2014/main" id="{57DE662A-4A15-4FC6-A09F-062CAA56A7C6}"/>
+              </a:ext>
+            </a:extLst>
+          </p:cNvPr>
+          <p:cNvCxnSpPr>
+            <a:cxnSpLocks/>
+          </p:cNvCxnSpPr>
+          <p:nvPr/>
+        </p:nvCxnSpPr>
+        <p:spPr>
+          <a:xfrm>
+            <a:off x="236327" y="3357806"/>
+            <a:ext cx="0" cy="409895"/>
+          </a:xfrm>
+          <a:prstGeom prst="straightConnector1">
+            <a:avLst/>
+          </a:prstGeom>
+          <a:ln>
+            <a:prstDash val="sysDash"/>
+            <a:headEnd type="none"/>
+            <a:tailEnd type="triangle" w="lg" len="sm"/>
+          </a:ln>
+        </p:spPr>
+        <p:style>
+          <a:lnRef idx="1">
+            <a:schemeClr val="accent1"/>
+          </a:lnRef>
+          <a:fillRef idx="0">
+            <a:schemeClr val="accent1"/>
+          </a:fillRef>
+          <a:effectRef idx="0">
+            <a:schemeClr val="accent1"/>
+          </a:effectRef>
+          <a:fontRef idx="minor">
+            <a:schemeClr val="tx1"/>
+          </a:fontRef>
+        </p:style>
+      </p:cxnSp>
+      <p:cxnSp>
+        <p:nvCxnSpPr>
+          <p:cNvPr id="136" name="Straight Arrow Connector 135">
+            <a:extLst>
+              <a:ext uri="{FF2B5EF4-FFF2-40B4-BE49-F238E27FC236}">
+                <a16:creationId xmlns:a16="http://schemas.microsoft.com/office/drawing/2014/main" id="{76F8C607-D9B3-4E4B-874D-D43664C7F8A7}"/>
+              </a:ext>
+            </a:extLst>
+          </p:cNvPr>
+          <p:cNvCxnSpPr>
+            <a:cxnSpLocks/>
+          </p:cNvCxnSpPr>
+          <p:nvPr/>
+        </p:nvCxnSpPr>
+        <p:spPr>
+          <a:xfrm>
+            <a:off x="236327" y="4044700"/>
+            <a:ext cx="0" cy="393597"/>
+          </a:xfrm>
+          <a:prstGeom prst="straightConnector1">
+            <a:avLst/>
+          </a:prstGeom>
+          <a:ln>
+            <a:prstDash val="sysDash"/>
+            <a:headEnd type="none"/>
+            <a:tailEnd type="triangle" w="lg" len="sm"/>
+          </a:ln>
+        </p:spPr>
+        <p:style>
+          <a:lnRef idx="1">
+            <a:schemeClr val="accent1"/>
+          </a:lnRef>
+          <a:fillRef idx="0">
+            <a:schemeClr val="accent1"/>
+          </a:fillRef>
+          <a:effectRef idx="0">
+            <a:schemeClr val="accent1"/>
+          </a:effectRef>
+          <a:fontRef idx="minor">
+            <a:schemeClr val="tx1"/>
+          </a:fontRef>
+        </p:style>
+      </p:cxnSp>
+      <p:cxnSp>
+        <p:nvCxnSpPr>
+          <p:cNvPr id="139" name="Straight Arrow Connector 138">
+            <a:extLst>
+              <a:ext uri="{FF2B5EF4-FFF2-40B4-BE49-F238E27FC236}">
+                <a16:creationId xmlns:a16="http://schemas.microsoft.com/office/drawing/2014/main" id="{1FABCA5A-90D9-48CA-BEB7-9494B078697C}"/>
+              </a:ext>
+            </a:extLst>
+          </p:cNvPr>
+          <p:cNvCxnSpPr>
+            <a:cxnSpLocks/>
+          </p:cNvCxnSpPr>
+          <p:nvPr/>
+        </p:nvCxnSpPr>
+        <p:spPr>
+          <a:xfrm>
+            <a:off x="236327" y="4715296"/>
+            <a:ext cx="0" cy="416753"/>
+          </a:xfrm>
+          <a:prstGeom prst="straightConnector1">
+            <a:avLst/>
+          </a:prstGeom>
+          <a:ln>
+            <a:prstDash val="sysDash"/>
+            <a:headEnd type="none"/>
+            <a:tailEnd type="triangle" w="lg" len="sm"/>
+          </a:ln>
+        </p:spPr>
+        <p:style>
+          <a:lnRef idx="1">
+            <a:schemeClr val="accent1"/>
+          </a:lnRef>
+          <a:fillRef idx="0">
+            <a:schemeClr val="accent1"/>
+          </a:fillRef>
+          <a:effectRef idx="0">
+            <a:schemeClr val="accent1"/>
+          </a:effectRef>
+          <a:fontRef idx="minor">
+            <a:schemeClr val="tx1"/>
+          </a:fontRef>
+        </p:style>
+      </p:cxnSp>
+      <p:cxnSp>
+        <p:nvCxnSpPr>
+          <p:cNvPr id="142" name="Straight Arrow Connector 141">
+            <a:extLst>
+              <a:ext uri="{FF2B5EF4-FFF2-40B4-BE49-F238E27FC236}">
+                <a16:creationId xmlns:a16="http://schemas.microsoft.com/office/drawing/2014/main" id="{86C0FD01-989D-4110-9492-3EE0B249988F}"/>
+              </a:ext>
+            </a:extLst>
+          </p:cNvPr>
+          <p:cNvCxnSpPr>
+            <a:cxnSpLocks/>
+          </p:cNvCxnSpPr>
+          <p:nvPr/>
+        </p:nvCxnSpPr>
+        <p:spPr>
+          <a:xfrm>
+            <a:off x="236327" y="5409048"/>
+            <a:ext cx="0" cy="292827"/>
+          </a:xfrm>
+          <a:prstGeom prst="straightConnector1">
+            <a:avLst/>
+          </a:prstGeom>
+          <a:ln>
+            <a:prstDash val="sysDash"/>
+            <a:headEnd type="none"/>
+            <a:tailEnd type="triangle" w="lg" len="sm"/>
+          </a:ln>
+        </p:spPr>
+        <p:style>
+          <a:lnRef idx="1">
+            <a:schemeClr val="accent1"/>
+          </a:lnRef>
+          <a:fillRef idx="0">
+            <a:schemeClr val="accent1"/>
+          </a:fillRef>
+          <a:effectRef idx="0">
+            <a:schemeClr val="accent1"/>
+          </a:effectRef>
+          <a:fontRef idx="minor">
+            <a:schemeClr val="tx1"/>
+          </a:fontRef>
+        </p:style>
+      </p:cxnSp>
+      <p:cxnSp>
+        <p:nvCxnSpPr>
+          <p:cNvPr id="156" name="Straight Arrow Connector 155">
+            <a:extLst>
+              <a:ext uri="{FF2B5EF4-FFF2-40B4-BE49-F238E27FC236}">
+                <a16:creationId xmlns:a16="http://schemas.microsoft.com/office/drawing/2014/main" id="{5E13D01A-D69F-48D2-9E2C-668C7E261C14}"/>
+              </a:ext>
+            </a:extLst>
+          </p:cNvPr>
+          <p:cNvCxnSpPr>
+            <a:stCxn id="3" idx="3"/>
+            <a:endCxn id="20" idx="1"/>
+          </p:cNvCxnSpPr>
+          <p:nvPr/>
+        </p:nvCxnSpPr>
+        <p:spPr>
+          <a:xfrm>
+            <a:off x="6429826" y="1185430"/>
+            <a:ext cx="2713939" cy="0"/>
+          </a:xfrm>
+          <a:prstGeom prst="straightConnector1">
+            <a:avLst/>
+          </a:prstGeom>
+          <a:ln w="12700">
+            <a:tailEnd type="triangle" w="lg" len="sm"/>
+          </a:ln>
+        </p:spPr>
+        <p:style>
+          <a:lnRef idx="1">
+            <a:schemeClr val="accent1"/>
+          </a:lnRef>
+          <a:fillRef idx="0">
+            <a:schemeClr val="accent1"/>
+          </a:fillRef>
+          <a:effectRef idx="0">
+            <a:schemeClr val="accent1"/>
+          </a:effectRef>
+          <a:fontRef idx="minor">
+            <a:schemeClr val="tx1"/>
+          </a:fontRef>
+        </p:style>
+      </p:cxnSp>
+      <p:sp>
+        <p:nvSpPr>
+          <p:cNvPr id="100" name="TextBox 99">
+            <a:extLst>
+              <a:ext uri="{FF2B5EF4-FFF2-40B4-BE49-F238E27FC236}">
+                <a16:creationId xmlns:a16="http://schemas.microsoft.com/office/drawing/2014/main" id="{F253D1C8-8A18-420C-9B83-DF8297FE0AAE}"/>
+              </a:ext>
+            </a:extLst>
+          </p:cNvPr>
+          <p:cNvSpPr txBox="1"/>
+          <p:nvPr/>
+        </p:nvSpPr>
+        <p:spPr>
+          <a:xfrm>
+            <a:off x="6698704" y="1010579"/>
+            <a:ext cx="380480" cy="349702"/>
+          </a:xfrm>
+          <a:prstGeom prst="rect">
+            <a:avLst/>
+          </a:prstGeom>
+          <a:solidFill>
+            <a:schemeClr val="bg1"/>
+          </a:solidFill>
+        </p:spPr>
+        <p:txBody>
+          <a:bodyPr wrap="none" lIns="36000" tIns="36000" rIns="36000" bIns="36000" rtlCol="0">
+            <a:spAutoFit/>
+          </a:bodyPr>
+          <a:lstStyle/>
+          <a:p>
+            <a:r>
+              <a:rPr lang="en-CA" dirty="0">
+                <a:solidFill>
+                  <a:srgbClr val="C00000"/>
+                </a:solidFill>
+              </a:rPr>
+              <a:t>NO</a:t>
+            </a:r>
+          </a:p>
+        </p:txBody>
+      </p:sp>
+      <p:cxnSp>
+        <p:nvCxnSpPr>
+          <p:cNvPr id="72" name="Connector: Elbow 71">
+            <a:extLst>
+              <a:ext uri="{FF2B5EF4-FFF2-40B4-BE49-F238E27FC236}">
+                <a16:creationId xmlns:a16="http://schemas.microsoft.com/office/drawing/2014/main" id="{21E8D17C-DEB6-4167-8715-C482260072ED}"/>
+              </a:ext>
+            </a:extLst>
+          </p:cNvPr>
+          <p:cNvCxnSpPr>
+            <a:cxnSpLocks/>
+            <a:stCxn id="88" idx="2"/>
+            <a:endCxn id="50" idx="3"/>
+          </p:cNvCxnSpPr>
+          <p:nvPr/>
+        </p:nvCxnSpPr>
+        <p:spPr>
+          <a:xfrm rot="5400000" flipH="1" flipV="1">
+            <a:off x="3313223" y="-1891466"/>
+            <a:ext cx="4793444" cy="10947236"/>
+          </a:xfrm>
+          <a:prstGeom prst="bentConnector4">
+            <a:avLst>
+              <a:gd name="adj1" fmla="val -11513"/>
+              <a:gd name="adj2" fmla="val 104788"/>
+            </a:avLst>
+          </a:prstGeom>
+          <a:ln w="12700">
+            <a:tailEnd type="triangle" w="lg" len="sm"/>
+          </a:ln>
+        </p:spPr>
+        <p:style>
+          <a:lnRef idx="1">
+            <a:schemeClr val="accent1"/>
+          </a:lnRef>
+          <a:fillRef idx="0">
+            <a:schemeClr val="accent1"/>
+          </a:fillRef>
+          <a:effectRef idx="0">
+            <a:schemeClr val="accent1"/>
+          </a:effectRef>
+          <a:fontRef idx="minor">
+            <a:schemeClr val="tx1"/>
+          </a:fontRef>
+        </p:style>
+      </p:cxnSp>
+    </p:spTree>
+    <p:extLst>
+      <p:ext uri="{BB962C8B-B14F-4D97-AF65-F5344CB8AC3E}">
+        <p14:creationId xmlns:p14="http://schemas.microsoft.com/office/powerpoint/2010/main" val="556094072"/>
+      </p:ext>
+    </p:extLst>
+  </p:cSld>
+  <p:clrMapOvr>
+    <a:masterClrMapping/>
+  </p:clrMapOvr>
+</p:sld>
+</file>
+
 <file path=ppt/theme/theme1.xml><?xml version="1.0" encoding="utf-8"?>
 <a:theme xmlns:a="http://schemas.openxmlformats.org/drawingml/2006/main" name="Office Theme">
   <a:themeElements>

</xml_diff>

<commit_message>
Left align text and bold keywords
</commit_message>
<xml_diff>
--- a/src/Planning/Illustrations.pptx
+++ b/src/Planning/Illustrations.pptx
@@ -118,7 +118,7 @@
 <file path=ppt/revisionInfo.xml><?xml version="1.0" encoding="utf-8"?>
 <p1510:revInfo xmlns:a="http://schemas.openxmlformats.org/drawingml/2006/main" xmlns:r="http://schemas.openxmlformats.org/officeDocument/2006/relationships" xmlns:p1510="http://schemas.microsoft.com/office/powerpoint/2015/10/main">
   <p1510:revLst>
-    <p1510:client id="{BCAB1FCD-C6E0-4904-9922-531ED0D800C6}" v="1543" dt="2018-07-19T18:25:53.442"/>
+    <p1510:client id="{BCAB1FCD-C6E0-4904-9922-531ED0D800C6}" v="1760" dt="2018-07-20T03:15:59.844"/>
   </p1510:revLst>
 </p1510:revInfo>
 </file>
@@ -128,7 +128,7 @@
   <pc:docChgLst>
     <pc:chgData name="Willy-Peter Schaub" userId="707b42e47e16ca84" providerId="LiveId" clId="{BCAB1FCD-C6E0-4904-9922-531ED0D800C6}"/>
     <pc:docChg chg="undo custSel addSld delSld modSld">
-      <pc:chgData name="Willy-Peter Schaub" userId="707b42e47e16ca84" providerId="LiveId" clId="{BCAB1FCD-C6E0-4904-9922-531ED0D800C6}" dt="2018-07-19T18:25:53.442" v="1521" actId="14100"/>
+      <pc:chgData name="Willy-Peter Schaub" userId="707b42e47e16ca84" providerId="LiveId" clId="{BCAB1FCD-C6E0-4904-9922-531ED0D800C6}" dt="2018-07-20T03:15:59.844" v="1738" actId="113"/>
       <pc:docMkLst>
         <pc:docMk/>
       </pc:docMkLst>
@@ -666,13 +666,13 @@
         </pc:picChg>
       </pc:sldChg>
       <pc:sldChg chg="addSp delSp modSp add">
-        <pc:chgData name="Willy-Peter Schaub" userId="707b42e47e16ca84" providerId="LiveId" clId="{BCAB1FCD-C6E0-4904-9922-531ED0D800C6}" dt="2018-07-19T18:25:53.442" v="1521" actId="14100"/>
+        <pc:chgData name="Willy-Peter Schaub" userId="707b42e47e16ca84" providerId="LiveId" clId="{BCAB1FCD-C6E0-4904-9922-531ED0D800C6}" dt="2018-07-20T03:15:59.844" v="1738" actId="113"/>
         <pc:sldMkLst>
           <pc:docMk/>
           <pc:sldMk cId="556094072" sldId="259"/>
         </pc:sldMkLst>
         <pc:spChg chg="add mod">
-          <ac:chgData name="Willy-Peter Schaub" userId="707b42e47e16ca84" providerId="LiveId" clId="{BCAB1FCD-C6E0-4904-9922-531ED0D800C6}" dt="2018-07-19T18:23:47.256" v="1479" actId="403"/>
+          <ac:chgData name="Willy-Peter Schaub" userId="707b42e47e16ca84" providerId="LiveId" clId="{BCAB1FCD-C6E0-4904-9922-531ED0D800C6}" dt="2018-07-20T03:15:20.067" v="1720" actId="113"/>
           <ac:spMkLst>
             <pc:docMk/>
             <pc:sldMk cId="556094072" sldId="259"/>
@@ -680,7 +680,7 @@
           </ac:spMkLst>
         </pc:spChg>
         <pc:spChg chg="add mod">
-          <ac:chgData name="Willy-Peter Schaub" userId="707b42e47e16ca84" providerId="LiveId" clId="{BCAB1FCD-C6E0-4904-9922-531ED0D800C6}" dt="2018-07-19T18:23:47.256" v="1479" actId="403"/>
+          <ac:chgData name="Willy-Peter Schaub" userId="707b42e47e16ca84" providerId="LiveId" clId="{BCAB1FCD-C6E0-4904-9922-531ED0D800C6}" dt="2018-07-20T03:15:23.714" v="1722" actId="113"/>
           <ac:spMkLst>
             <pc:docMk/>
             <pc:sldMk cId="556094072" sldId="259"/>
@@ -688,7 +688,7 @@
           </ac:spMkLst>
         </pc:spChg>
         <pc:spChg chg="add mod">
-          <ac:chgData name="Willy-Peter Schaub" userId="707b42e47e16ca84" providerId="LiveId" clId="{BCAB1FCD-C6E0-4904-9922-531ED0D800C6}" dt="2018-07-19T18:23:47.256" v="1479" actId="403"/>
+          <ac:chgData name="Willy-Peter Schaub" userId="707b42e47e16ca84" providerId="LiveId" clId="{BCAB1FCD-C6E0-4904-9922-531ED0D800C6}" dt="2018-07-20T03:15:27.632" v="1725" actId="113"/>
           <ac:spMkLst>
             <pc:docMk/>
             <pc:sldMk cId="556094072" sldId="259"/>
@@ -696,7 +696,7 @@
           </ac:spMkLst>
         </pc:spChg>
         <pc:spChg chg="add mod">
-          <ac:chgData name="Willy-Peter Schaub" userId="707b42e47e16ca84" providerId="LiveId" clId="{BCAB1FCD-C6E0-4904-9922-531ED0D800C6}" dt="2018-07-19T18:23:47.256" v="1479" actId="403"/>
+          <ac:chgData name="Willy-Peter Schaub" userId="707b42e47e16ca84" providerId="LiveId" clId="{BCAB1FCD-C6E0-4904-9922-531ED0D800C6}" dt="2018-07-20T03:15:31.196" v="1728" actId="113"/>
           <ac:spMkLst>
             <pc:docMk/>
             <pc:sldMk cId="556094072" sldId="259"/>
@@ -704,7 +704,7 @@
           </ac:spMkLst>
         </pc:spChg>
         <pc:spChg chg="add mod">
-          <ac:chgData name="Willy-Peter Schaub" userId="707b42e47e16ca84" providerId="LiveId" clId="{BCAB1FCD-C6E0-4904-9922-531ED0D800C6}" dt="2018-07-19T18:23:47.256" v="1479" actId="403"/>
+          <ac:chgData name="Willy-Peter Schaub" userId="707b42e47e16ca84" providerId="LiveId" clId="{BCAB1FCD-C6E0-4904-9922-531ED0D800C6}" dt="2018-07-20T03:15:59.844" v="1738" actId="113"/>
           <ac:spMkLst>
             <pc:docMk/>
             <pc:sldMk cId="556094072" sldId="259"/>
@@ -712,7 +712,7 @@
           </ac:spMkLst>
         </pc:spChg>
         <pc:spChg chg="add mod">
-          <ac:chgData name="Willy-Peter Schaub" userId="707b42e47e16ca84" providerId="LiveId" clId="{BCAB1FCD-C6E0-4904-9922-531ED0D800C6}" dt="2018-07-19T18:23:47.256" v="1479" actId="403"/>
+          <ac:chgData name="Willy-Peter Schaub" userId="707b42e47e16ca84" providerId="LiveId" clId="{BCAB1FCD-C6E0-4904-9922-531ED0D800C6}" dt="2018-07-20T03:15:37.789" v="1731" actId="113"/>
           <ac:spMkLst>
             <pc:docMk/>
             <pc:sldMk cId="556094072" sldId="259"/>
@@ -720,7 +720,7 @@
           </ac:spMkLst>
         </pc:spChg>
         <pc:spChg chg="add mod">
-          <ac:chgData name="Willy-Peter Schaub" userId="707b42e47e16ca84" providerId="LiveId" clId="{BCAB1FCD-C6E0-4904-9922-531ED0D800C6}" dt="2018-07-19T18:23:53.958" v="1480" actId="6549"/>
+          <ac:chgData name="Willy-Peter Schaub" userId="707b42e47e16ca84" providerId="LiveId" clId="{BCAB1FCD-C6E0-4904-9922-531ED0D800C6}" dt="2018-07-20T03:15:52.834" v="1737" actId="113"/>
           <ac:spMkLst>
             <pc:docMk/>
             <pc:sldMk cId="556094072" sldId="259"/>
@@ -728,7 +728,7 @@
           </ac:spMkLst>
         </pc:spChg>
         <pc:spChg chg="add mod">
-          <ac:chgData name="Willy-Peter Schaub" userId="707b42e47e16ca84" providerId="LiveId" clId="{BCAB1FCD-C6E0-4904-9922-531ED0D800C6}" dt="2018-07-19T18:23:47.256" v="1479" actId="403"/>
+          <ac:chgData name="Willy-Peter Schaub" userId="707b42e47e16ca84" providerId="LiveId" clId="{BCAB1FCD-C6E0-4904-9922-531ED0D800C6}" dt="2018-07-20T03:15:52.397" v="1736" actId="113"/>
           <ac:spMkLst>
             <pc:docMk/>
             <pc:sldMk cId="556094072" sldId="259"/>
@@ -968,7 +968,7 @@
           </ac:spMkLst>
         </pc:spChg>
         <pc:spChg chg="add mod">
-          <ac:chgData name="Willy-Peter Schaub" userId="707b42e47e16ca84" providerId="LiveId" clId="{BCAB1FCD-C6E0-4904-9922-531ED0D800C6}" dt="2018-07-19T18:23:47.256" v="1479" actId="403"/>
+          <ac:chgData name="Willy-Peter Schaub" userId="707b42e47e16ca84" providerId="LiveId" clId="{BCAB1FCD-C6E0-4904-9922-531ED0D800C6}" dt="2018-07-20T03:10:54.217" v="1524" actId="120"/>
           <ac:spMkLst>
             <pc:docMk/>
             <pc:sldMk cId="556094072" sldId="259"/>
@@ -976,7 +976,7 @@
           </ac:spMkLst>
         </pc:spChg>
         <pc:spChg chg="add mod">
-          <ac:chgData name="Willy-Peter Schaub" userId="707b42e47e16ca84" providerId="LiveId" clId="{BCAB1FCD-C6E0-4904-9922-531ED0D800C6}" dt="2018-07-19T18:23:47.256" v="1479" actId="403"/>
+          <ac:chgData name="Willy-Peter Schaub" userId="707b42e47e16ca84" providerId="LiveId" clId="{BCAB1FCD-C6E0-4904-9922-531ED0D800C6}" dt="2018-07-20T03:10:54.217" v="1524" actId="120"/>
           <ac:spMkLst>
             <pc:docMk/>
             <pc:sldMk cId="556094072" sldId="259"/>
@@ -984,7 +984,7 @@
           </ac:spMkLst>
         </pc:spChg>
         <pc:spChg chg="add mod">
-          <ac:chgData name="Willy-Peter Schaub" userId="707b42e47e16ca84" providerId="LiveId" clId="{BCAB1FCD-C6E0-4904-9922-531ED0D800C6}" dt="2018-07-19T18:23:47.256" v="1479" actId="403"/>
+          <ac:chgData name="Willy-Peter Schaub" userId="707b42e47e16ca84" providerId="LiveId" clId="{BCAB1FCD-C6E0-4904-9922-531ED0D800C6}" dt="2018-07-20T03:15:51.936" v="1735" actId="113"/>
           <ac:spMkLst>
             <pc:docMk/>
             <pc:sldMk cId="556094072" sldId="259"/>
@@ -1000,7 +1000,7 @@
           </ac:spMkLst>
         </pc:spChg>
         <pc:spChg chg="add mod">
-          <ac:chgData name="Willy-Peter Schaub" userId="707b42e47e16ca84" providerId="LiveId" clId="{BCAB1FCD-C6E0-4904-9922-531ED0D800C6}" dt="2018-07-19T18:20:34.886" v="1429" actId="113"/>
+          <ac:chgData name="Willy-Peter Schaub" userId="707b42e47e16ca84" providerId="LiveId" clId="{BCAB1FCD-C6E0-4904-9922-531ED0D800C6}" dt="2018-07-20T03:12:45.087" v="1604"/>
           <ac:spMkLst>
             <pc:docMk/>
             <pc:sldMk cId="556094072" sldId="259"/>
@@ -1008,7 +1008,7 @@
           </ac:spMkLst>
         </pc:spChg>
         <pc:spChg chg="add mod ord">
-          <ac:chgData name="Willy-Peter Schaub" userId="707b42e47e16ca84" providerId="LiveId" clId="{BCAB1FCD-C6E0-4904-9922-531ED0D800C6}" dt="2018-07-19T18:20:34.886" v="1429" actId="113"/>
+          <ac:chgData name="Willy-Peter Schaub" userId="707b42e47e16ca84" providerId="LiveId" clId="{BCAB1FCD-C6E0-4904-9922-531ED0D800C6}" dt="2018-07-20T03:12:47.173" v="1605"/>
           <ac:spMkLst>
             <pc:docMk/>
             <pc:sldMk cId="556094072" sldId="259"/>
@@ -1016,7 +1016,7 @@
           </ac:spMkLst>
         </pc:spChg>
         <pc:spChg chg="add mod">
-          <ac:chgData name="Willy-Peter Schaub" userId="707b42e47e16ca84" providerId="LiveId" clId="{BCAB1FCD-C6E0-4904-9922-531ED0D800C6}" dt="2018-07-19T18:20:34.886" v="1429" actId="113"/>
+          <ac:chgData name="Willy-Peter Schaub" userId="707b42e47e16ca84" providerId="LiveId" clId="{BCAB1FCD-C6E0-4904-9922-531ED0D800C6}" dt="2018-07-20T03:12:53.605" v="1608" actId="14100"/>
           <ac:spMkLst>
             <pc:docMk/>
             <pc:sldMk cId="556094072" sldId="259"/>
@@ -1024,7 +1024,7 @@
           </ac:spMkLst>
         </pc:spChg>
         <pc:spChg chg="add mod">
-          <ac:chgData name="Willy-Peter Schaub" userId="707b42e47e16ca84" providerId="LiveId" clId="{BCAB1FCD-C6E0-4904-9922-531ED0D800C6}" dt="2018-07-19T18:20:34.886" v="1429" actId="113"/>
+          <ac:chgData name="Willy-Peter Schaub" userId="707b42e47e16ca84" providerId="LiveId" clId="{BCAB1FCD-C6E0-4904-9922-531ED0D800C6}" dt="2018-07-20T03:12:49.887" v="1607"/>
           <ac:spMkLst>
             <pc:docMk/>
             <pc:sldMk cId="556094072" sldId="259"/>
@@ -7177,7 +7177,6 @@
           <a:bodyPr lIns="36000" tIns="36000" rIns="36000" bIns="36000" rtlCol="0" anchor="ctr"/>
           <a:lstStyle/>
           <a:p>
-            <a:pPr algn="r"/>
             <a:r>
               <a:rPr lang="en-CA" sz="1600" dirty="0">
                 <a:solidFill>
@@ -7185,7 +7184,43 @@
                 </a:solidFill>
                 <a:cs typeface="Segoe UI Light" panose="020B0502040204020203" pitchFamily="34" charset="0"/>
               </a:rPr>
-              <a:t>Do you want to manage servers and infrastructure?</a:t>
+              <a:t>Do you want to outsource </a:t>
+            </a:r>
+            <a:r>
+              <a:rPr lang="en-CA" sz="1600" b="1" dirty="0">
+                <a:solidFill>
+                  <a:srgbClr val="0070C0"/>
+                </a:solidFill>
+                <a:cs typeface="Segoe UI Light" panose="020B0502040204020203" pitchFamily="34" charset="0"/>
+              </a:rPr>
+              <a:t>servers</a:t>
+            </a:r>
+            <a:r>
+              <a:rPr lang="en-CA" sz="1600" dirty="0">
+                <a:solidFill>
+                  <a:srgbClr val="0070C0"/>
+                </a:solidFill>
+                <a:cs typeface="Segoe UI Light" panose="020B0502040204020203" pitchFamily="34" charset="0"/>
+              </a:rPr>
+              <a:t> and </a:t>
+            </a:r>
+            <a:r>
+              <a:rPr lang="en-CA" sz="1600" b="1" dirty="0">
+                <a:solidFill>
+                  <a:srgbClr val="0070C0"/>
+                </a:solidFill>
+                <a:cs typeface="Segoe UI Light" panose="020B0502040204020203" pitchFamily="34" charset="0"/>
+              </a:rPr>
+              <a:t>infrastructure</a:t>
+            </a:r>
+            <a:r>
+              <a:rPr lang="en-CA" sz="1600" dirty="0">
+                <a:solidFill>
+                  <a:srgbClr val="0070C0"/>
+                </a:solidFill>
+                <a:cs typeface="Segoe UI Light" panose="020B0502040204020203" pitchFamily="34" charset="0"/>
+              </a:rPr>
+              <a:t> management?</a:t>
             </a:r>
           </a:p>
         </p:txBody>
@@ -7229,7 +7264,6 @@
           <a:bodyPr lIns="36000" tIns="36000" rIns="36000" bIns="36000" rtlCol="0" anchor="ctr"/>
           <a:lstStyle/>
           <a:p>
-            <a:pPr algn="r"/>
             <a:r>
               <a:rPr lang="en-CA" sz="1600" dirty="0">
                 <a:solidFill>
@@ -7237,7 +7271,43 @@
                 </a:solidFill>
                 <a:cs typeface="Segoe UI Light" panose="020B0502040204020203" pitchFamily="34" charset="0"/>
               </a:rPr>
-              <a:t>Do you want to manage security and data privacy?</a:t>
+              <a:t>Do you want to outsource </a:t>
+            </a:r>
+            <a:r>
+              <a:rPr lang="en-CA" sz="1600" b="1" dirty="0">
+                <a:solidFill>
+                  <a:srgbClr val="0070C0"/>
+                </a:solidFill>
+                <a:cs typeface="Segoe UI Light" panose="020B0502040204020203" pitchFamily="34" charset="0"/>
+              </a:rPr>
+              <a:t>security</a:t>
+            </a:r>
+            <a:r>
+              <a:rPr lang="en-CA" sz="1600" dirty="0">
+                <a:solidFill>
+                  <a:srgbClr val="0070C0"/>
+                </a:solidFill>
+                <a:cs typeface="Segoe UI Light" panose="020B0502040204020203" pitchFamily="34" charset="0"/>
+              </a:rPr>
+              <a:t> and </a:t>
+            </a:r>
+            <a:r>
+              <a:rPr lang="en-CA" sz="1600" b="1" dirty="0">
+                <a:solidFill>
+                  <a:srgbClr val="0070C0"/>
+                </a:solidFill>
+                <a:cs typeface="Segoe UI Light" panose="020B0502040204020203" pitchFamily="34" charset="0"/>
+              </a:rPr>
+              <a:t>data privacy </a:t>
+            </a:r>
+            <a:r>
+              <a:rPr lang="en-CA" sz="1600" dirty="0">
+                <a:solidFill>
+                  <a:srgbClr val="0070C0"/>
+                </a:solidFill>
+                <a:cs typeface="Segoe UI Light" panose="020B0502040204020203" pitchFamily="34" charset="0"/>
+              </a:rPr>
+              <a:t>management?</a:t>
             </a:r>
           </a:p>
         </p:txBody>
@@ -7281,7 +7351,6 @@
           <a:bodyPr lIns="36000" tIns="36000" rIns="36000" bIns="36000" rtlCol="0" anchor="ctr"/>
           <a:lstStyle/>
           <a:p>
-            <a:pPr algn="r"/>
             <a:r>
               <a:rPr lang="en-CA" sz="1600" dirty="0">
                 <a:solidFill>
@@ -7289,7 +7358,61 @@
                 </a:solidFill>
                 <a:cs typeface="Segoe UI Light" panose="020B0502040204020203" pitchFamily="34" charset="0"/>
               </a:rPr>
-              <a:t>Do you want to manage data and service availability?</a:t>
+              <a:t>Do you want outsource </a:t>
+            </a:r>
+            <a:r>
+              <a:rPr lang="en-CA" sz="1600" b="1" dirty="0">
+                <a:solidFill>
+                  <a:srgbClr val="0070C0"/>
+                </a:solidFill>
+                <a:cs typeface="Segoe UI Light" panose="020B0502040204020203" pitchFamily="34" charset="0"/>
+              </a:rPr>
+              <a:t>data</a:t>
+            </a:r>
+            <a:r>
+              <a:rPr lang="en-CA" sz="1600" dirty="0">
+                <a:solidFill>
+                  <a:srgbClr val="0070C0"/>
+                </a:solidFill>
+                <a:cs typeface="Segoe UI Light" panose="020B0502040204020203" pitchFamily="34" charset="0"/>
+              </a:rPr>
+              <a:t> and </a:t>
+            </a:r>
+            <a:r>
+              <a:rPr lang="en-CA" sz="1600" b="1" dirty="0">
+                <a:solidFill>
+                  <a:srgbClr val="0070C0"/>
+                </a:solidFill>
+                <a:cs typeface="Segoe UI Light" panose="020B0502040204020203" pitchFamily="34" charset="0"/>
+              </a:rPr>
+              <a:t>service</a:t>
+            </a:r>
+            <a:r>
+              <a:rPr lang="en-CA" sz="1600" dirty="0">
+                <a:solidFill>
+                  <a:srgbClr val="0070C0"/>
+                </a:solidFill>
+                <a:cs typeface="Segoe UI Light" panose="020B0502040204020203" pitchFamily="34" charset="0"/>
+              </a:rPr>
+              <a:t> </a:t>
+            </a:r>
+            <a:r>
+              <a:rPr lang="en-CA" sz="1600" b="1" dirty="0">
+                <a:solidFill>
+                  <a:srgbClr val="0070C0"/>
+                </a:solidFill>
+                <a:cs typeface="Segoe UI Light" panose="020B0502040204020203" pitchFamily="34" charset="0"/>
+              </a:rPr>
+              <a:t>availability</a:t>
+            </a:r>
+            <a:r>
+              <a:rPr lang="en-CA" sz="1600" dirty="0">
+                <a:solidFill>
+                  <a:srgbClr val="0070C0"/>
+                </a:solidFill>
+                <a:cs typeface="Segoe UI Light" panose="020B0502040204020203" pitchFamily="34" charset="0"/>
+              </a:rPr>
+              <a:t> management?</a:t>
             </a:r>
           </a:p>
         </p:txBody>
@@ -7333,7 +7456,6 @@
           <a:bodyPr lIns="36000" tIns="36000" rIns="36000" bIns="36000" rtlCol="0" anchor="ctr"/>
           <a:lstStyle/>
           <a:p>
-            <a:pPr algn="r"/>
             <a:r>
               <a:rPr lang="en-CA" sz="1600" dirty="0">
                 <a:solidFill>
@@ -7341,7 +7463,61 @@
                 </a:solidFill>
                 <a:cs typeface="Segoe UI Light" panose="020B0502040204020203" pitchFamily="34" charset="0"/>
               </a:rPr>
-              <a:t>Do you want to manage resilience and quality assurance?</a:t>
+              <a:t>Do you want to outsource </a:t>
+            </a:r>
+            <a:r>
+              <a:rPr lang="en-CA" sz="1600" b="1" dirty="0">
+                <a:solidFill>
+                  <a:srgbClr val="0070C0"/>
+                </a:solidFill>
+                <a:cs typeface="Segoe UI Light" panose="020B0502040204020203" pitchFamily="34" charset="0"/>
+              </a:rPr>
+              <a:t>resilience</a:t>
+            </a:r>
+            <a:r>
+              <a:rPr lang="en-CA" sz="1600" dirty="0">
+                <a:solidFill>
+                  <a:srgbClr val="0070C0"/>
+                </a:solidFill>
+                <a:cs typeface="Segoe UI Light" panose="020B0502040204020203" pitchFamily="34" charset="0"/>
+              </a:rPr>
+              <a:t> and </a:t>
+            </a:r>
+            <a:r>
+              <a:rPr lang="en-CA" sz="1600" b="1" dirty="0">
+                <a:solidFill>
+                  <a:srgbClr val="0070C0"/>
+                </a:solidFill>
+                <a:cs typeface="Segoe UI Light" panose="020B0502040204020203" pitchFamily="34" charset="0"/>
+              </a:rPr>
+              <a:t>quality</a:t>
+            </a:r>
+            <a:r>
+              <a:rPr lang="en-CA" sz="1600" dirty="0">
+                <a:solidFill>
+                  <a:srgbClr val="0070C0"/>
+                </a:solidFill>
+                <a:cs typeface="Segoe UI Light" panose="020B0502040204020203" pitchFamily="34" charset="0"/>
+              </a:rPr>
+              <a:t> </a:t>
+            </a:r>
+            <a:r>
+              <a:rPr lang="en-CA" sz="1600" b="1" dirty="0">
+                <a:solidFill>
+                  <a:srgbClr val="0070C0"/>
+                </a:solidFill>
+                <a:cs typeface="Segoe UI Light" panose="020B0502040204020203" pitchFamily="34" charset="0"/>
+              </a:rPr>
+              <a:t>assurance</a:t>
+            </a:r>
+            <a:r>
+              <a:rPr lang="en-CA" sz="1600" dirty="0">
+                <a:solidFill>
+                  <a:srgbClr val="0070C0"/>
+                </a:solidFill>
+                <a:cs typeface="Segoe UI Light" panose="020B0502040204020203" pitchFamily="34" charset="0"/>
+              </a:rPr>
+              <a:t>?</a:t>
             </a:r>
           </a:p>
         </p:txBody>
@@ -7385,7 +7561,6 @@
           <a:bodyPr lIns="36000" tIns="36000" rIns="36000" bIns="36000" rtlCol="0" anchor="ctr"/>
           <a:lstStyle/>
           <a:p>
-            <a:pPr algn="r"/>
             <a:r>
               <a:rPr lang="en-CA" sz="1600" dirty="0">
                 <a:solidFill>
@@ -7393,7 +7568,25 @@
                 </a:solidFill>
                 <a:cs typeface="Segoe UI Light" panose="020B0502040204020203" pitchFamily="34" charset="0"/>
               </a:rPr>
-              <a:t>Do you always want the latest version of the services?</a:t>
+              <a:t>Do you always want the</a:t>
+            </a:r>
+            <a:r>
+              <a:rPr lang="en-CA" sz="1600" b="1" dirty="0">
+                <a:solidFill>
+                  <a:srgbClr val="0070C0"/>
+                </a:solidFill>
+                <a:cs typeface="Segoe UI Light" panose="020B0502040204020203" pitchFamily="34" charset="0"/>
+              </a:rPr>
+              <a:t> latest version </a:t>
+            </a:r>
+            <a:r>
+              <a:rPr lang="en-CA" sz="1600" dirty="0">
+                <a:solidFill>
+                  <a:srgbClr val="0070C0"/>
+                </a:solidFill>
+                <a:cs typeface="Segoe UI Light" panose="020B0502040204020203" pitchFamily="34" charset="0"/>
+              </a:rPr>
+              <a:t>of the services?</a:t>
             </a:r>
           </a:p>
         </p:txBody>
@@ -7437,7 +7630,6 @@
           <a:bodyPr lIns="36000" tIns="36000" rIns="36000" bIns="36000" rtlCol="0" anchor="ctr"/>
           <a:lstStyle/>
           <a:p>
-            <a:pPr algn="r"/>
             <a:r>
               <a:rPr lang="en-CA" sz="1600" dirty="0">
                 <a:solidFill>
@@ -7445,7 +7637,43 @@
                 </a:solidFill>
                 <a:cs typeface="Segoe UI Light" panose="020B0502040204020203" pitchFamily="34" charset="0"/>
               </a:rPr>
-              <a:t>Do you need a quick demo or experimental environment?</a:t>
+              <a:t>Do you need a </a:t>
+            </a:r>
+            <a:r>
+              <a:rPr lang="en-CA" sz="1600" b="1" dirty="0">
+                <a:solidFill>
+                  <a:srgbClr val="0070C0"/>
+                </a:solidFill>
+                <a:cs typeface="Segoe UI Light" panose="020B0502040204020203" pitchFamily="34" charset="0"/>
+              </a:rPr>
+              <a:t>quick demo </a:t>
+            </a:r>
+            <a:r>
+              <a:rPr lang="en-CA" sz="1600" dirty="0">
+                <a:solidFill>
+                  <a:srgbClr val="0070C0"/>
+                </a:solidFill>
+                <a:cs typeface="Segoe UI Light" panose="020B0502040204020203" pitchFamily="34" charset="0"/>
+              </a:rPr>
+              <a:t>or </a:t>
+            </a:r>
+            <a:r>
+              <a:rPr lang="en-CA" sz="1600" b="1" dirty="0">
+                <a:solidFill>
+                  <a:srgbClr val="0070C0"/>
+                </a:solidFill>
+                <a:cs typeface="Segoe UI Light" panose="020B0502040204020203" pitchFamily="34" charset="0"/>
+              </a:rPr>
+              <a:t>experimental</a:t>
+            </a:r>
+            <a:r>
+              <a:rPr lang="en-CA" sz="1600" dirty="0">
+                <a:solidFill>
+                  <a:srgbClr val="0070C0"/>
+                </a:solidFill>
+                <a:cs typeface="Segoe UI Light" panose="020B0502040204020203" pitchFamily="34" charset="0"/>
+              </a:rPr>
+              <a:t> environment?</a:t>
             </a:r>
           </a:p>
         </p:txBody>
@@ -7489,7 +7717,6 @@
           <a:bodyPr lIns="36000" tIns="36000" rIns="36000" bIns="36000" rtlCol="0" anchor="ctr"/>
           <a:lstStyle/>
           <a:p>
-            <a:pPr algn="r"/>
             <a:r>
               <a:rPr lang="en-CA" sz="1600" dirty="0">
                 <a:solidFill>
@@ -7541,7 +7768,6 @@
           <a:bodyPr lIns="36000" tIns="36000" rIns="36000" bIns="36000" rtlCol="0" anchor="ctr"/>
           <a:lstStyle/>
           <a:p>
-            <a:pPr algn="r"/>
             <a:r>
               <a:rPr lang="en-CA" sz="1600" dirty="0">
                 <a:solidFill>
@@ -8813,7 +9039,6 @@
           <a:bodyPr rtlCol="0" anchor="ctr"/>
           <a:lstStyle/>
           <a:p>
-            <a:pPr algn="ctr"/>
             <a:endParaRPr lang="en-CA" sz="2000">
               <a:cs typeface="Segoe UI Light" panose="020B0502040204020203" pitchFamily="34" charset="0"/>
             </a:endParaRPr>
@@ -8865,7 +9090,6 @@
           <a:bodyPr rtlCol="0" anchor="ctr"/>
           <a:lstStyle/>
           <a:p>
-            <a:pPr algn="ctr"/>
             <a:endParaRPr lang="en-CA" sz="2000">
               <a:cs typeface="Segoe UI Light" panose="020B0502040204020203" pitchFamily="34" charset="0"/>
             </a:endParaRPr>
@@ -8911,7 +9135,6 @@
           <a:bodyPr lIns="36000" tIns="36000" rIns="36000" bIns="36000" rtlCol="0" anchor="ctr"/>
           <a:lstStyle/>
           <a:p>
-            <a:pPr algn="r"/>
             <a:r>
               <a:rPr lang="en-CA" sz="1600" dirty="0">
                 <a:solidFill>
@@ -9023,7 +9246,7 @@
         <p:spPr>
           <a:xfrm>
             <a:off x="6698704" y="292847"/>
-            <a:ext cx="380480" cy="349702"/>
+            <a:ext cx="400678" cy="349702"/>
           </a:xfrm>
           <a:prstGeom prst="rect">
             <a:avLst/>
@@ -9041,11 +9264,16 @@
             <a:r>
               <a:rPr lang="en-CA" dirty="0">
                 <a:solidFill>
-                  <a:srgbClr val="C00000"/>
+                  <a:srgbClr val="00B050"/>
                 </a:solidFill>
               </a:rPr>
-              <a:t>NO</a:t>
-            </a:r>
+              <a:t>YES</a:t>
+            </a:r>
+            <a:endParaRPr lang="en-CA" dirty="0">
+              <a:solidFill>
+                <a:srgbClr val="C00000"/>
+              </a:solidFill>
+            </a:endParaRPr>
           </a:p>
         </p:txBody>
       </p:sp>
@@ -9064,7 +9292,7 @@
         <p:spPr>
           <a:xfrm>
             <a:off x="6698704" y="1670811"/>
-            <a:ext cx="374068" cy="349702"/>
+            <a:ext cx="400678" cy="349702"/>
           </a:xfrm>
           <a:prstGeom prst="rect">
             <a:avLst/>
@@ -9082,11 +9310,16 @@
             <a:r>
               <a:rPr lang="en-CA" dirty="0">
                 <a:solidFill>
-                  <a:srgbClr val="C00000"/>
+                  <a:srgbClr val="00B050"/>
                 </a:solidFill>
               </a:rPr>
-              <a:t>NO</a:t>
-            </a:r>
+              <a:t>YES</a:t>
+            </a:r>
+            <a:endParaRPr lang="en-CA" dirty="0">
+              <a:solidFill>
+                <a:srgbClr val="C00000"/>
+              </a:solidFill>
+            </a:endParaRPr>
           </a:p>
         </p:txBody>
       </p:sp>
@@ -9105,7 +9338,7 @@
         <p:spPr>
           <a:xfrm>
             <a:off x="6698704" y="2337188"/>
-            <a:ext cx="380480" cy="349702"/>
+            <a:ext cx="400678" cy="349702"/>
           </a:xfrm>
           <a:prstGeom prst="rect">
             <a:avLst/>
@@ -9121,13 +9354,18 @@
           <a:lstStyle/>
           <a:p>
             <a:r>
-              <a:rPr lang="en-CA" dirty="0">
+              <a:rPr lang="en-CA">
                 <a:solidFill>
-                  <a:srgbClr val="C00000"/>
+                  <a:srgbClr val="00B050"/>
                 </a:solidFill>
               </a:rPr>
-              <a:t>NO</a:t>
-            </a:r>
+              <a:t>YES</a:t>
+            </a:r>
+            <a:endParaRPr lang="en-CA" dirty="0">
+              <a:solidFill>
+                <a:srgbClr val="C00000"/>
+              </a:solidFill>
+            </a:endParaRPr>
           </a:p>
         </p:txBody>
       </p:sp>
@@ -9735,7 +9973,7 @@
         <p:spPr>
           <a:xfrm>
             <a:off x="6698704" y="1010579"/>
-            <a:ext cx="380480" cy="349702"/>
+            <a:ext cx="400678" cy="349702"/>
           </a:xfrm>
           <a:prstGeom prst="rect">
             <a:avLst/>
@@ -9753,11 +9991,16 @@
             <a:r>
               <a:rPr lang="en-CA" dirty="0">
                 <a:solidFill>
-                  <a:srgbClr val="C00000"/>
+                  <a:srgbClr val="00B050"/>
                 </a:solidFill>
               </a:rPr>
-              <a:t>NO</a:t>
-            </a:r>
+              <a:t>YES</a:t>
+            </a:r>
+            <a:endParaRPr lang="en-CA" dirty="0">
+              <a:solidFill>
+                <a:srgbClr val="C00000"/>
+              </a:solidFill>
+            </a:endParaRPr>
           </a:p>
         </p:txBody>
       </p:sp>

</xml_diff>

<commit_message>
Rename files and reference new workbook
</commit_message>
<xml_diff>
--- a/src/Planning/Illustrations.pptx
+++ b/src/Planning/Illustrations.pptx
@@ -115,1282 +115,48 @@
 </p:presentation>
 </file>
 
-<file path=ppt/revisionInfo.xml><?xml version="1.0" encoding="utf-8"?>
-<p1510:revInfo xmlns:a="http://schemas.openxmlformats.org/drawingml/2006/main" xmlns:r="http://schemas.openxmlformats.org/officeDocument/2006/relationships" xmlns:p1510="http://schemas.microsoft.com/office/powerpoint/2015/10/main">
-  <p1510:revLst>
-    <p1510:client id="{BCAB1FCD-C6E0-4904-9922-531ED0D800C6}" v="1760" dt="2018-07-20T03:15:59.844"/>
-  </p1510:revLst>
-</p1510:revInfo>
-</file>
-
 <file path=ppt/changesInfos/changesInfo1.xml><?xml version="1.0" encoding="utf-8"?>
 <pc:chgInfo xmlns:a="http://schemas.openxmlformats.org/drawingml/2006/main" xmlns:r="http://schemas.openxmlformats.org/officeDocument/2006/relationships" xmlns:ac="http://schemas.microsoft.com/office/drawing/2013/main/command" xmlns:pc="http://schemas.microsoft.com/office/powerpoint/2013/main/command">
   <pc:docChgLst>
     <pc:chgData name="Willy-Peter Schaub" userId="707b42e47e16ca84" providerId="LiveId" clId="{BCAB1FCD-C6E0-4904-9922-531ED0D800C6}"/>
-    <pc:docChg chg="undo custSel addSld delSld modSld">
-      <pc:chgData name="Willy-Peter Schaub" userId="707b42e47e16ca84" providerId="LiveId" clId="{BCAB1FCD-C6E0-4904-9922-531ED0D800C6}" dt="2018-07-20T03:15:59.844" v="1738" actId="113"/>
+  </pc:docChgLst>
+  <pc:docChgLst>
+    <pc:chgData name="Willy-Peter Schaub" userId="707b42e47e16ca84" providerId="LiveId" clId="{E10E4484-2D4F-42E0-B17A-6464F773B2D2}"/>
+    <pc:docChg chg="modSld">
+      <pc:chgData name="Willy-Peter Schaub" userId="707b42e47e16ca84" providerId="LiveId" clId="{E10E4484-2D4F-42E0-B17A-6464F773B2D2}" dt="2019-04-25T03:18:45.351" v="22" actId="1076"/>
       <pc:docMkLst>
         <pc:docMk/>
       </pc:docMkLst>
-      <pc:sldChg chg="addSp delSp modSp add">
-        <pc:chgData name="Willy-Peter Schaub" userId="707b42e47e16ca84" providerId="LiveId" clId="{BCAB1FCD-C6E0-4904-9922-531ED0D800C6}" dt="2018-07-11T16:26:37.073" v="195" actId="1037"/>
-        <pc:sldMkLst>
-          <pc:docMk/>
-          <pc:sldMk cId="1013297759" sldId="256"/>
-        </pc:sldMkLst>
-        <pc:spChg chg="del">
-          <ac:chgData name="Willy-Peter Schaub" userId="707b42e47e16ca84" providerId="LiveId" clId="{BCAB1FCD-C6E0-4904-9922-531ED0D800C6}" dt="2018-07-11T14:24:51.023" v="1"/>
-          <ac:spMkLst>
-            <pc:docMk/>
-            <pc:sldMk cId="1013297759" sldId="256"/>
-            <ac:spMk id="2" creationId="{67D2B270-3534-4F82-864B-BA87B45D4C29}"/>
-          </ac:spMkLst>
-        </pc:spChg>
-        <pc:spChg chg="del">
-          <ac:chgData name="Willy-Peter Schaub" userId="707b42e47e16ca84" providerId="LiveId" clId="{BCAB1FCD-C6E0-4904-9922-531ED0D800C6}" dt="2018-07-11T14:24:51.023" v="1"/>
-          <ac:spMkLst>
-            <pc:docMk/>
-            <pc:sldMk cId="1013297759" sldId="256"/>
-            <ac:spMk id="3" creationId="{64236911-1D3E-4B6F-A186-B74A2EE4E5B3}"/>
-          </ac:spMkLst>
-        </pc:spChg>
-        <pc:spChg chg="add mod">
-          <ac:chgData name="Willy-Peter Schaub" userId="707b42e47e16ca84" providerId="LiveId" clId="{BCAB1FCD-C6E0-4904-9922-531ED0D800C6}" dt="2018-07-11T16:24:40.179" v="163" actId="207"/>
-          <ac:spMkLst>
-            <pc:docMk/>
-            <pc:sldMk cId="1013297759" sldId="256"/>
-            <ac:spMk id="8" creationId="{193118A7-E6D9-45DC-AEA4-47BAABEAB0CD}"/>
-          </ac:spMkLst>
-        </pc:spChg>
-        <pc:spChg chg="add mod">
-          <ac:chgData name="Willy-Peter Schaub" userId="707b42e47e16ca84" providerId="LiveId" clId="{BCAB1FCD-C6E0-4904-9922-531ED0D800C6}" dt="2018-07-11T16:24:40.179" v="163" actId="207"/>
-          <ac:spMkLst>
-            <pc:docMk/>
-            <pc:sldMk cId="1013297759" sldId="256"/>
-            <ac:spMk id="9" creationId="{464A9600-2671-440B-AE4F-16132F1BBCAC}"/>
-          </ac:spMkLst>
-        </pc:spChg>
-        <pc:spChg chg="add mod">
-          <ac:chgData name="Willy-Peter Schaub" userId="707b42e47e16ca84" providerId="LiveId" clId="{BCAB1FCD-C6E0-4904-9922-531ED0D800C6}" dt="2018-07-11T16:24:40.179" v="163" actId="207"/>
-          <ac:spMkLst>
-            <pc:docMk/>
-            <pc:sldMk cId="1013297759" sldId="256"/>
-            <ac:spMk id="10" creationId="{E2EB1F4D-9C56-443B-955D-5DD1FB20AF03}"/>
-          </ac:spMkLst>
-        </pc:spChg>
-        <pc:spChg chg="add mod">
-          <ac:chgData name="Willy-Peter Schaub" userId="707b42e47e16ca84" providerId="LiveId" clId="{BCAB1FCD-C6E0-4904-9922-531ED0D800C6}" dt="2018-07-11T16:24:57.328" v="166" actId="1076"/>
-          <ac:spMkLst>
-            <pc:docMk/>
-            <pc:sldMk cId="1013297759" sldId="256"/>
-            <ac:spMk id="11" creationId="{FBC53BFA-79C6-4C21-BD6E-57AC241FA0B2}"/>
-          </ac:spMkLst>
-        </pc:spChg>
-        <pc:spChg chg="add mod">
-          <ac:chgData name="Willy-Peter Schaub" userId="707b42e47e16ca84" providerId="LiveId" clId="{BCAB1FCD-C6E0-4904-9922-531ED0D800C6}" dt="2018-07-11T16:25:16.019" v="179" actId="2085"/>
-          <ac:spMkLst>
-            <pc:docMk/>
-            <pc:sldMk cId="1013297759" sldId="256"/>
-            <ac:spMk id="12" creationId="{EAF3311A-032F-4706-A2A3-27A41C4418F5}"/>
-          </ac:spMkLst>
-        </pc:spChg>
-        <pc:grpChg chg="add del mod">
-          <ac:chgData name="Willy-Peter Schaub" userId="707b42e47e16ca84" providerId="LiveId" clId="{BCAB1FCD-C6E0-4904-9922-531ED0D800C6}" dt="2018-07-11T16:26:05.338" v="182" actId="478"/>
-          <ac:grpSpMkLst>
-            <pc:docMk/>
-            <pc:sldMk cId="1013297759" sldId="256"/>
-            <ac:grpSpMk id="13" creationId="{E530D910-48EA-420C-9C24-686C3B04D290}"/>
-          </ac:grpSpMkLst>
-        </pc:grpChg>
-        <pc:picChg chg="add mod">
-          <ac:chgData name="Willy-Peter Schaub" userId="707b42e47e16ca84" providerId="LiveId" clId="{BCAB1FCD-C6E0-4904-9922-531ED0D800C6}" dt="2018-07-11T16:24:49.602" v="164" actId="207"/>
-          <ac:picMkLst>
-            <pc:docMk/>
-            <pc:sldMk cId="1013297759" sldId="256"/>
-            <ac:picMk id="3" creationId="{8F19C669-C20D-4837-9710-E0DCCEB5F508}"/>
-          </ac:picMkLst>
-        </pc:picChg>
-        <pc:picChg chg="add mod">
-          <ac:chgData name="Willy-Peter Schaub" userId="707b42e47e16ca84" providerId="LiveId" clId="{BCAB1FCD-C6E0-4904-9922-531ED0D800C6}" dt="2018-07-11T16:24:49.602" v="164" actId="207"/>
-          <ac:picMkLst>
-            <pc:docMk/>
-            <pc:sldMk cId="1013297759" sldId="256"/>
-            <ac:picMk id="5" creationId="{D7BEEE79-4CF3-4B16-B7B6-E00A9F2500BE}"/>
-          </ac:picMkLst>
-        </pc:picChg>
-        <pc:picChg chg="add mod">
-          <ac:chgData name="Willy-Peter Schaub" userId="707b42e47e16ca84" providerId="LiveId" clId="{BCAB1FCD-C6E0-4904-9922-531ED0D800C6}" dt="2018-07-11T16:24:49.602" v="164" actId="207"/>
-          <ac:picMkLst>
-            <pc:docMk/>
-            <pc:sldMk cId="1013297759" sldId="256"/>
-            <ac:picMk id="7" creationId="{09C154BB-CC09-444F-959E-C84F1528012D}"/>
-          </ac:picMkLst>
-        </pc:picChg>
-        <pc:picChg chg="add mod">
-          <ac:chgData name="Willy-Peter Schaub" userId="707b42e47e16ca84" providerId="LiveId" clId="{BCAB1FCD-C6E0-4904-9922-531ED0D800C6}" dt="2018-07-11T16:26:37.073" v="195" actId="1037"/>
-          <ac:picMkLst>
-            <pc:docMk/>
-            <pc:sldMk cId="1013297759" sldId="256"/>
-            <ac:picMk id="16" creationId="{C9DDD8C3-1147-4031-958B-6DFFA2E92F17}"/>
-          </ac:picMkLst>
-        </pc:picChg>
-      </pc:sldChg>
-      <pc:sldChg chg="addSp delSp modSp add">
-        <pc:chgData name="Willy-Peter Schaub" userId="707b42e47e16ca84" providerId="LiveId" clId="{BCAB1FCD-C6E0-4904-9922-531ED0D800C6}" dt="2018-07-11T16:24:06.043" v="156" actId="1076"/>
-        <pc:sldMkLst>
-          <pc:docMk/>
-          <pc:sldMk cId="3264234225" sldId="257"/>
-        </pc:sldMkLst>
-        <pc:spChg chg="add mod">
-          <ac:chgData name="Willy-Peter Schaub" userId="707b42e47e16ca84" providerId="LiveId" clId="{BCAB1FCD-C6E0-4904-9922-531ED0D800C6}" dt="2018-07-11T16:23:42.013" v="150" actId="1076"/>
-          <ac:spMkLst>
-            <pc:docMk/>
-            <pc:sldMk cId="3264234225" sldId="257"/>
-            <ac:spMk id="16" creationId="{E755D12D-F351-45D4-9C1C-2714198B577E}"/>
-          </ac:spMkLst>
-        </pc:spChg>
-        <pc:spChg chg="add mod">
-          <ac:chgData name="Willy-Peter Schaub" userId="707b42e47e16ca84" providerId="LiveId" clId="{BCAB1FCD-C6E0-4904-9922-531ED0D800C6}" dt="2018-07-11T16:23:42.013" v="150" actId="1076"/>
-          <ac:spMkLst>
-            <pc:docMk/>
-            <pc:sldMk cId="3264234225" sldId="257"/>
-            <ac:spMk id="17" creationId="{E51559BD-570D-48BC-8B89-1B7DC562D02D}"/>
-          </ac:spMkLst>
-        </pc:spChg>
-        <pc:spChg chg="add mod">
-          <ac:chgData name="Willy-Peter Schaub" userId="707b42e47e16ca84" providerId="LiveId" clId="{BCAB1FCD-C6E0-4904-9922-531ED0D800C6}" dt="2018-07-11T16:23:42.013" v="150" actId="1076"/>
-          <ac:spMkLst>
-            <pc:docMk/>
-            <pc:sldMk cId="3264234225" sldId="257"/>
-            <ac:spMk id="18" creationId="{01371B40-F94B-41CC-B7E8-9F2D3777D082}"/>
-          </ac:spMkLst>
-        </pc:spChg>
-        <pc:spChg chg="add mod">
-          <ac:chgData name="Willy-Peter Schaub" userId="707b42e47e16ca84" providerId="LiveId" clId="{BCAB1FCD-C6E0-4904-9922-531ED0D800C6}" dt="2018-07-11T16:24:06.043" v="156" actId="1076"/>
-          <ac:spMkLst>
-            <pc:docMk/>
-            <pc:sldMk cId="3264234225" sldId="257"/>
-            <ac:spMk id="19" creationId="{265F1B5C-35D0-4F63-B943-C33E8047944A}"/>
-          </ac:spMkLst>
-        </pc:spChg>
-        <pc:spChg chg="add mod">
-          <ac:chgData name="Willy-Peter Schaub" userId="707b42e47e16ca84" providerId="LiveId" clId="{BCAB1FCD-C6E0-4904-9922-531ED0D800C6}" dt="2018-07-11T16:23:42.013" v="150" actId="1076"/>
-          <ac:spMkLst>
-            <pc:docMk/>
-            <pc:sldMk cId="3264234225" sldId="257"/>
-            <ac:spMk id="20" creationId="{3503706F-4BE3-4169-8CAC-AE5571EBD613}"/>
-          </ac:spMkLst>
-        </pc:spChg>
-        <pc:spChg chg="add mod">
-          <ac:chgData name="Willy-Peter Schaub" userId="707b42e47e16ca84" providerId="LiveId" clId="{BCAB1FCD-C6E0-4904-9922-531ED0D800C6}" dt="2018-07-11T16:23:42.013" v="150" actId="1076"/>
-          <ac:spMkLst>
-            <pc:docMk/>
-            <pc:sldMk cId="3264234225" sldId="257"/>
-            <ac:spMk id="21" creationId="{B8B039F9-CD2D-46C6-9EE2-BDCC5F4C97A1}"/>
-          </ac:spMkLst>
-        </pc:spChg>
-        <pc:grpChg chg="add del">
-          <ac:chgData name="Willy-Peter Schaub" userId="707b42e47e16ca84" providerId="LiveId" clId="{BCAB1FCD-C6E0-4904-9922-531ED0D800C6}" dt="2018-07-11T16:23:27.545" v="148"/>
-          <ac:grpSpMkLst>
-            <pc:docMk/>
-            <pc:sldMk cId="3264234225" sldId="257"/>
-            <ac:grpSpMk id="2" creationId="{B7841691-67DF-4971-8023-7F0365314EE3}"/>
-          </ac:grpSpMkLst>
-        </pc:grpChg>
-        <pc:grpChg chg="add mod">
-          <ac:chgData name="Willy-Peter Schaub" userId="707b42e47e16ca84" providerId="LiveId" clId="{BCAB1FCD-C6E0-4904-9922-531ED0D800C6}" dt="2018-07-11T16:23:42.013" v="150" actId="1076"/>
-          <ac:grpSpMkLst>
-            <pc:docMk/>
-            <pc:sldMk cId="3264234225" sldId="257"/>
-            <ac:grpSpMk id="9" creationId="{36353F0C-FA64-4B4D-BFF4-BB1C31D22B91}"/>
-          </ac:grpSpMkLst>
-        </pc:grpChg>
-      </pc:sldChg>
-      <pc:sldChg chg="addSp delSp modSp add">
-        <pc:chgData name="Willy-Peter Schaub" userId="707b42e47e16ca84" providerId="LiveId" clId="{BCAB1FCD-C6E0-4904-9922-531ED0D800C6}" dt="2018-07-13T17:18:40.240" v="426" actId="166"/>
-        <pc:sldMkLst>
-          <pc:docMk/>
-          <pc:sldMk cId="1004767918" sldId="258"/>
-        </pc:sldMkLst>
-        <pc:spChg chg="add mod">
-          <ac:chgData name="Willy-Peter Schaub" userId="707b42e47e16ca84" providerId="LiveId" clId="{BCAB1FCD-C6E0-4904-9922-531ED0D800C6}" dt="2018-07-11T16:29:05.899" v="245" actId="20577"/>
-          <ac:spMkLst>
-            <pc:docMk/>
-            <pc:sldMk cId="1004767918" sldId="258"/>
-            <ac:spMk id="5" creationId="{7E054CDD-AFAA-4B6A-8CBF-AE76A32D9077}"/>
-          </ac:spMkLst>
-        </pc:spChg>
-        <pc:spChg chg="add mod">
-          <ac:chgData name="Willy-Peter Schaub" userId="707b42e47e16ca84" providerId="LiveId" clId="{BCAB1FCD-C6E0-4904-9922-531ED0D800C6}" dt="2018-07-13T17:13:24.567" v="358" actId="20577"/>
-          <ac:spMkLst>
-            <pc:docMk/>
-            <pc:sldMk cId="1004767918" sldId="258"/>
-            <ac:spMk id="6" creationId="{FABF903C-1F15-4794-870F-366A71F5CB8F}"/>
-          </ac:spMkLst>
-        </pc:spChg>
-        <pc:spChg chg="add mod">
-          <ac:chgData name="Willy-Peter Schaub" userId="707b42e47e16ca84" providerId="LiveId" clId="{BCAB1FCD-C6E0-4904-9922-531ED0D800C6}" dt="2018-07-11T16:29:43.958" v="261" actId="1076"/>
-          <ac:spMkLst>
-            <pc:docMk/>
-            <pc:sldMk cId="1004767918" sldId="258"/>
-            <ac:spMk id="7" creationId="{8265D06C-7808-435B-8684-7CDC22600ABB}"/>
-          </ac:spMkLst>
-        </pc:spChg>
-        <pc:spChg chg="add mod">
-          <ac:chgData name="Willy-Peter Schaub" userId="707b42e47e16ca84" providerId="LiveId" clId="{BCAB1FCD-C6E0-4904-9922-531ED0D800C6}" dt="2018-07-11T16:29:58.132" v="272" actId="1076"/>
-          <ac:spMkLst>
-            <pc:docMk/>
-            <pc:sldMk cId="1004767918" sldId="258"/>
-            <ac:spMk id="8" creationId="{AB1D389E-DFB1-4A58-9FC2-0930FA26F126}"/>
-          </ac:spMkLst>
-        </pc:spChg>
-        <pc:spChg chg="add mod ord">
-          <ac:chgData name="Willy-Peter Schaub" userId="707b42e47e16ca84" providerId="LiveId" clId="{BCAB1FCD-C6E0-4904-9922-531ED0D800C6}" dt="2018-07-13T17:16:23.443" v="395" actId="1076"/>
-          <ac:spMkLst>
-            <pc:docMk/>
-            <pc:sldMk cId="1004767918" sldId="258"/>
-            <ac:spMk id="9" creationId="{45FE0AEE-21E3-46F3-9237-DED8682EF883}"/>
-          </ac:spMkLst>
-        </pc:spChg>
-        <pc:spChg chg="add mod">
-          <ac:chgData name="Willy-Peter Schaub" userId="707b42e47e16ca84" providerId="LiveId" clId="{BCAB1FCD-C6E0-4904-9922-531ED0D800C6}" dt="2018-07-13T17:18:32.064" v="423" actId="208"/>
-          <ac:spMkLst>
-            <pc:docMk/>
-            <pc:sldMk cId="1004767918" sldId="258"/>
-            <ac:spMk id="10" creationId="{53646253-7167-44B1-B2F1-D30A4BBE4AEF}"/>
-          </ac:spMkLst>
-        </pc:spChg>
-        <pc:spChg chg="add del mod">
-          <ac:chgData name="Willy-Peter Schaub" userId="707b42e47e16ca84" providerId="LiveId" clId="{BCAB1FCD-C6E0-4904-9922-531ED0D800C6}" dt="2018-07-11T16:31:38.719" v="305" actId="478"/>
-          <ac:spMkLst>
-            <pc:docMk/>
-            <pc:sldMk cId="1004767918" sldId="258"/>
-            <ac:spMk id="11" creationId="{2F9716E4-544C-46C0-8B88-FE8FA999C424}"/>
-          </ac:spMkLst>
-        </pc:spChg>
-        <pc:spChg chg="add del mod">
-          <ac:chgData name="Willy-Peter Schaub" userId="707b42e47e16ca84" providerId="LiveId" clId="{BCAB1FCD-C6E0-4904-9922-531ED0D800C6}" dt="2018-07-13T17:12:58.122" v="337"/>
-          <ac:spMkLst>
-            <pc:docMk/>
-            <pc:sldMk cId="1004767918" sldId="258"/>
-            <ac:spMk id="12" creationId="{B80D3410-1BC6-4E2B-9A40-B66BDE61FCA2}"/>
-          </ac:spMkLst>
-        </pc:spChg>
-        <pc:spChg chg="add del mod">
-          <ac:chgData name="Willy-Peter Schaub" userId="707b42e47e16ca84" providerId="LiveId" clId="{BCAB1FCD-C6E0-4904-9922-531ED0D800C6}" dt="2018-07-13T17:12:58.122" v="337"/>
-          <ac:spMkLst>
-            <pc:docMk/>
-            <pc:sldMk cId="1004767918" sldId="258"/>
-            <ac:spMk id="13" creationId="{24764FCC-57FD-4DBC-BC5E-A866EBD4D0D9}"/>
-          </ac:spMkLst>
-        </pc:spChg>
-        <pc:spChg chg="add del mod">
-          <ac:chgData name="Willy-Peter Schaub" userId="707b42e47e16ca84" providerId="LiveId" clId="{BCAB1FCD-C6E0-4904-9922-531ED0D800C6}" dt="2018-07-13T17:12:58.122" v="337"/>
-          <ac:spMkLst>
-            <pc:docMk/>
-            <pc:sldMk cId="1004767918" sldId="258"/>
-            <ac:spMk id="14" creationId="{D9151CAE-F5BE-41CC-BF75-B86D40DC3DB8}"/>
-          </ac:spMkLst>
-        </pc:spChg>
-        <pc:spChg chg="add del mod">
-          <ac:chgData name="Willy-Peter Schaub" userId="707b42e47e16ca84" providerId="LiveId" clId="{BCAB1FCD-C6E0-4904-9922-531ED0D800C6}" dt="2018-07-13T17:12:58.122" v="337"/>
-          <ac:spMkLst>
-            <pc:docMk/>
-            <pc:sldMk cId="1004767918" sldId="258"/>
-            <ac:spMk id="15" creationId="{C1596F56-041B-47D7-8F64-C90A4F36D059}"/>
-          </ac:spMkLst>
-        </pc:spChg>
-        <pc:spChg chg="add del mod">
-          <ac:chgData name="Willy-Peter Schaub" userId="707b42e47e16ca84" providerId="LiveId" clId="{BCAB1FCD-C6E0-4904-9922-531ED0D800C6}" dt="2018-07-13T17:12:58.122" v="337"/>
-          <ac:spMkLst>
-            <pc:docMk/>
-            <pc:sldMk cId="1004767918" sldId="258"/>
-            <ac:spMk id="16" creationId="{31DE5705-2BBC-4809-ADFF-579A3BE24C74}"/>
-          </ac:spMkLst>
-        </pc:spChg>
-        <pc:spChg chg="add mod">
-          <ac:chgData name="Willy-Peter Schaub" userId="707b42e47e16ca84" providerId="LiveId" clId="{BCAB1FCD-C6E0-4904-9922-531ED0D800C6}" dt="2018-07-13T17:13:40.602" v="359" actId="1076"/>
-          <ac:spMkLst>
-            <pc:docMk/>
-            <pc:sldMk cId="1004767918" sldId="258"/>
-            <ac:spMk id="19" creationId="{661D991E-A8E3-4BF6-B922-072FFF817D58}"/>
-          </ac:spMkLst>
-        </pc:spChg>
-        <pc:spChg chg="add del mod">
-          <ac:chgData name="Willy-Peter Schaub" userId="707b42e47e16ca84" providerId="LiveId" clId="{BCAB1FCD-C6E0-4904-9922-531ED0D800C6}" dt="2018-07-13T17:13:09.836" v="340" actId="478"/>
-          <ac:spMkLst>
-            <pc:docMk/>
-            <pc:sldMk cId="1004767918" sldId="258"/>
-            <ac:spMk id="20" creationId="{1E364BCF-870F-417C-B488-03F03B0DCC3E}"/>
-          </ac:spMkLst>
-        </pc:spChg>
-        <pc:spChg chg="add del mod">
-          <ac:chgData name="Willy-Peter Schaub" userId="707b42e47e16ca84" providerId="LiveId" clId="{BCAB1FCD-C6E0-4904-9922-531ED0D800C6}" dt="2018-07-13T17:13:13.463" v="342" actId="478"/>
-          <ac:spMkLst>
-            <pc:docMk/>
-            <pc:sldMk cId="1004767918" sldId="258"/>
-            <ac:spMk id="21" creationId="{A988BB02-25DF-47BA-A3EB-212DD3DBAAA6}"/>
-          </ac:spMkLst>
-        </pc:spChg>
-        <pc:spChg chg="add del mod">
-          <ac:chgData name="Willy-Peter Schaub" userId="707b42e47e16ca84" providerId="LiveId" clId="{BCAB1FCD-C6E0-4904-9922-531ED0D800C6}" dt="2018-07-13T17:13:12.696" v="341" actId="478"/>
-          <ac:spMkLst>
-            <pc:docMk/>
-            <pc:sldMk cId="1004767918" sldId="258"/>
-            <ac:spMk id="22" creationId="{2668471B-1D2A-487C-A7F6-18D22DD7745C}"/>
-          </ac:spMkLst>
-        </pc:spChg>
-        <pc:spChg chg="add del mod">
-          <ac:chgData name="Willy-Peter Schaub" userId="707b42e47e16ca84" providerId="LiveId" clId="{BCAB1FCD-C6E0-4904-9922-531ED0D800C6}" dt="2018-07-13T17:13:09.836" v="340" actId="478"/>
-          <ac:spMkLst>
-            <pc:docMk/>
-            <pc:sldMk cId="1004767918" sldId="258"/>
-            <ac:spMk id="23" creationId="{72251EC3-3953-4D5F-93EF-B7214034CEBE}"/>
-          </ac:spMkLst>
-        </pc:spChg>
-        <pc:spChg chg="add mod">
-          <ac:chgData name="Willy-Peter Schaub" userId="707b42e47e16ca84" providerId="LiveId" clId="{BCAB1FCD-C6E0-4904-9922-531ED0D800C6}" dt="2018-07-13T17:17:43.928" v="413" actId="1076"/>
-          <ac:spMkLst>
-            <pc:docMk/>
-            <pc:sldMk cId="1004767918" sldId="258"/>
-            <ac:spMk id="24" creationId="{86313812-FD22-48FF-A13C-D499E79E8BDD}"/>
-          </ac:spMkLst>
-        </pc:spChg>
-        <pc:spChg chg="add mod">
-          <ac:chgData name="Willy-Peter Schaub" userId="707b42e47e16ca84" providerId="LiveId" clId="{BCAB1FCD-C6E0-4904-9922-531ED0D800C6}" dt="2018-07-13T17:17:43.928" v="413" actId="1076"/>
-          <ac:spMkLst>
-            <pc:docMk/>
-            <pc:sldMk cId="1004767918" sldId="258"/>
-            <ac:spMk id="25" creationId="{7DA156EE-C2E7-4676-B84C-B1897B6EE61A}"/>
-          </ac:spMkLst>
-        </pc:spChg>
-        <pc:spChg chg="add del mod ord">
-          <ac:chgData name="Willy-Peter Schaub" userId="707b42e47e16ca84" providerId="LiveId" clId="{BCAB1FCD-C6E0-4904-9922-531ED0D800C6}" dt="2018-07-13T17:15:44.771" v="384" actId="478"/>
-          <ac:spMkLst>
-            <pc:docMk/>
-            <pc:sldMk cId="1004767918" sldId="258"/>
-            <ac:spMk id="26" creationId="{D7493103-F84B-4B2C-BED2-A77B93574EF5}"/>
-          </ac:spMkLst>
-        </pc:spChg>
-        <pc:spChg chg="add del mod">
-          <ac:chgData name="Willy-Peter Schaub" userId="707b42e47e16ca84" providerId="LiveId" clId="{BCAB1FCD-C6E0-4904-9922-531ED0D800C6}" dt="2018-07-13T17:16:15.121" v="394" actId="478"/>
-          <ac:spMkLst>
-            <pc:docMk/>
-            <pc:sldMk cId="1004767918" sldId="258"/>
-            <ac:spMk id="27" creationId="{DF36E5FD-3D03-40CC-B87B-4C475B5B81E9}"/>
-          </ac:spMkLst>
-        </pc:spChg>
-        <pc:spChg chg="add mod ord">
-          <ac:chgData name="Willy-Peter Schaub" userId="707b42e47e16ca84" providerId="LiveId" clId="{BCAB1FCD-C6E0-4904-9922-531ED0D800C6}" dt="2018-07-13T17:16:31.430" v="398" actId="167"/>
-          <ac:spMkLst>
-            <pc:docMk/>
-            <pc:sldMk cId="1004767918" sldId="258"/>
-            <ac:spMk id="28" creationId="{F46C9C2E-03AB-4609-AC7C-E311F5360658}"/>
-          </ac:spMkLst>
-        </pc:spChg>
-        <pc:spChg chg="add mod ord">
-          <ac:chgData name="Willy-Peter Schaub" userId="707b42e47e16ca84" providerId="LiveId" clId="{BCAB1FCD-C6E0-4904-9922-531ED0D800C6}" dt="2018-07-13T17:16:37.392" v="401" actId="167"/>
-          <ac:spMkLst>
-            <pc:docMk/>
-            <pc:sldMk cId="1004767918" sldId="258"/>
-            <ac:spMk id="29" creationId="{C1E5DD80-9DDB-49BC-AC06-45F7862D1E9A}"/>
-          </ac:spMkLst>
-        </pc:spChg>
-        <pc:spChg chg="add mod ord">
-          <ac:chgData name="Willy-Peter Schaub" userId="707b42e47e16ca84" providerId="LiveId" clId="{BCAB1FCD-C6E0-4904-9922-531ED0D800C6}" dt="2018-07-13T17:16:48.840" v="404" actId="167"/>
-          <ac:spMkLst>
-            <pc:docMk/>
-            <pc:sldMk cId="1004767918" sldId="258"/>
-            <ac:spMk id="30" creationId="{64403DCA-A631-415A-BDFD-D0C7D9DE37CF}"/>
-          </ac:spMkLst>
-        </pc:spChg>
-        <pc:spChg chg="add mod ord">
-          <ac:chgData name="Willy-Peter Schaub" userId="707b42e47e16ca84" providerId="LiveId" clId="{BCAB1FCD-C6E0-4904-9922-531ED0D800C6}" dt="2018-07-13T17:16:48.840" v="404" actId="167"/>
-          <ac:spMkLst>
-            <pc:docMk/>
-            <pc:sldMk cId="1004767918" sldId="258"/>
-            <ac:spMk id="31" creationId="{3835CF37-40DA-42B5-96B9-AC7DCD7A7542}"/>
-          </ac:spMkLst>
-        </pc:spChg>
-        <pc:spChg chg="add mod ord">
-          <ac:chgData name="Willy-Peter Schaub" userId="707b42e47e16ca84" providerId="LiveId" clId="{BCAB1FCD-C6E0-4904-9922-531ED0D800C6}" dt="2018-07-13T17:17:04.304" v="405" actId="166"/>
-          <ac:spMkLst>
-            <pc:docMk/>
-            <pc:sldMk cId="1004767918" sldId="258"/>
-            <ac:spMk id="32" creationId="{C7A697F2-9467-499B-8F9A-7086888540A0}"/>
-          </ac:spMkLst>
-        </pc:spChg>
-        <pc:spChg chg="add mod">
-          <ac:chgData name="Willy-Peter Schaub" userId="707b42e47e16ca84" providerId="LiveId" clId="{BCAB1FCD-C6E0-4904-9922-531ED0D800C6}" dt="2018-07-13T17:18:35.887" v="425" actId="1076"/>
-          <ac:spMkLst>
-            <pc:docMk/>
-            <pc:sldMk cId="1004767918" sldId="258"/>
-            <ac:spMk id="33" creationId="{11C97EDE-6312-4B03-99CE-D834205F461F}"/>
-          </ac:spMkLst>
-        </pc:spChg>
-        <pc:picChg chg="add mod">
-          <ac:chgData name="Willy-Peter Schaub" userId="707b42e47e16ca84" providerId="LiveId" clId="{BCAB1FCD-C6E0-4904-9922-531ED0D800C6}" dt="2018-07-11T16:27:53.053" v="198" actId="1076"/>
-          <ac:picMkLst>
-            <pc:docMk/>
-            <pc:sldMk cId="1004767918" sldId="258"/>
-            <ac:picMk id="2" creationId="{3915A906-C423-47CA-9F96-1324653F89AD}"/>
-          </ac:picMkLst>
-        </pc:picChg>
-        <pc:picChg chg="add mod">
-          <ac:chgData name="Willy-Peter Schaub" userId="707b42e47e16ca84" providerId="LiveId" clId="{BCAB1FCD-C6E0-4904-9922-531ED0D800C6}" dt="2018-07-11T16:27:56.362" v="200" actId="1076"/>
-          <ac:picMkLst>
-            <pc:docMk/>
-            <pc:sldMk cId="1004767918" sldId="258"/>
-            <ac:picMk id="3" creationId="{3205687A-B2C8-4C93-872A-7B6B13A08848}"/>
-          </ac:picMkLst>
-        </pc:picChg>
-        <pc:picChg chg="add mod">
-          <ac:chgData name="Willy-Peter Schaub" userId="707b42e47e16ca84" providerId="LiveId" clId="{BCAB1FCD-C6E0-4904-9922-531ED0D800C6}" dt="2018-07-11T16:28:02.114" v="202" actId="1076"/>
-          <ac:picMkLst>
-            <pc:docMk/>
-            <pc:sldMk cId="1004767918" sldId="258"/>
-            <ac:picMk id="4" creationId="{8036DBCC-9C44-4D21-B0D0-86E793C5AFAC}"/>
-          </ac:picMkLst>
-        </pc:picChg>
-        <pc:picChg chg="add del mod">
-          <ac:chgData name="Willy-Peter Schaub" userId="707b42e47e16ca84" providerId="LiveId" clId="{BCAB1FCD-C6E0-4904-9922-531ED0D800C6}" dt="2018-07-11T16:31:37.093" v="304" actId="478"/>
-          <ac:picMkLst>
-            <pc:docMk/>
-            <pc:sldMk cId="1004767918" sldId="258"/>
-            <ac:picMk id="9" creationId="{C4D663FA-1CD7-42C5-9333-98F564BB0E7D}"/>
-          </ac:picMkLst>
-        </pc:picChg>
-        <pc:picChg chg="add del mod">
-          <ac:chgData name="Willy-Peter Schaub" userId="707b42e47e16ca84" providerId="LiveId" clId="{BCAB1FCD-C6E0-4904-9922-531ED0D800C6}" dt="2018-07-11T16:31:37.093" v="304" actId="478"/>
-          <ac:picMkLst>
-            <pc:docMk/>
-            <pc:sldMk cId="1004767918" sldId="258"/>
-            <ac:picMk id="10" creationId="{0EC9637C-3DC3-4492-9FE2-ADCF9B58B970}"/>
-          </ac:picMkLst>
-        </pc:picChg>
-        <pc:picChg chg="add del mod">
-          <ac:chgData name="Willy-Peter Schaub" userId="707b42e47e16ca84" providerId="LiveId" clId="{BCAB1FCD-C6E0-4904-9922-531ED0D800C6}" dt="2018-07-13T17:12:58.122" v="337"/>
-          <ac:picMkLst>
-            <pc:docMk/>
-            <pc:sldMk cId="1004767918" sldId="258"/>
-            <ac:picMk id="11" creationId="{97D7480E-ABFD-4877-BCF1-5B27E9314766}"/>
-          </ac:picMkLst>
-        </pc:picChg>
-        <pc:picChg chg="add del mod ord">
-          <ac:chgData name="Willy-Peter Schaub" userId="707b42e47e16ca84" providerId="LiveId" clId="{BCAB1FCD-C6E0-4904-9922-531ED0D800C6}" dt="2018-07-11T16:30:53.742" v="293" actId="478"/>
-          <ac:picMkLst>
-            <pc:docMk/>
-            <pc:sldMk cId="1004767918" sldId="258"/>
-            <ac:picMk id="12" creationId="{8DABE9BE-B28A-4820-8159-68E04E0960FD}"/>
-          </ac:picMkLst>
-        </pc:picChg>
-        <pc:picChg chg="add del mod">
-          <ac:chgData name="Willy-Peter Schaub" userId="707b42e47e16ca84" providerId="LiveId" clId="{BCAB1FCD-C6E0-4904-9922-531ED0D800C6}" dt="2018-07-11T16:30:54.741" v="295" actId="478"/>
-          <ac:picMkLst>
-            <pc:docMk/>
-            <pc:sldMk cId="1004767918" sldId="258"/>
-            <ac:picMk id="13" creationId="{3BC97868-90A6-4044-AD5B-23C75C3F1A55}"/>
-          </ac:picMkLst>
-        </pc:picChg>
-        <pc:picChg chg="add del mod">
-          <ac:chgData name="Willy-Peter Schaub" userId="707b42e47e16ca84" providerId="LiveId" clId="{BCAB1FCD-C6E0-4904-9922-531ED0D800C6}" dt="2018-07-11T16:30:52.581" v="292" actId="478"/>
-          <ac:picMkLst>
-            <pc:docMk/>
-            <pc:sldMk cId="1004767918" sldId="258"/>
-            <ac:picMk id="14" creationId="{3E3434E6-57EB-46FA-93CC-DBC1C1B6EAC7}"/>
-          </ac:picMkLst>
-        </pc:picChg>
-        <pc:picChg chg="add del mod">
-          <ac:chgData name="Willy-Peter Schaub" userId="707b42e47e16ca84" providerId="LiveId" clId="{BCAB1FCD-C6E0-4904-9922-531ED0D800C6}" dt="2018-07-11T16:30:54.214" v="294" actId="478"/>
-          <ac:picMkLst>
-            <pc:docMk/>
-            <pc:sldMk cId="1004767918" sldId="258"/>
-            <ac:picMk id="15" creationId="{CF501BA5-1790-44FA-B21D-95703EA11EAF}"/>
-          </ac:picMkLst>
-        </pc:picChg>
-        <pc:picChg chg="add del mod">
-          <ac:chgData name="Willy-Peter Schaub" userId="707b42e47e16ca84" providerId="LiveId" clId="{BCAB1FCD-C6E0-4904-9922-531ED0D800C6}" dt="2018-07-11T16:31:37.093" v="304" actId="478"/>
-          <ac:picMkLst>
-            <pc:docMk/>
-            <pc:sldMk cId="1004767918" sldId="258"/>
-            <ac:picMk id="16" creationId="{7DD304C5-0163-4F83-AF0C-F9FF6A99F834}"/>
-          </ac:picMkLst>
-        </pc:picChg>
-        <pc:picChg chg="add mod ord">
-          <ac:chgData name="Willy-Peter Schaub" userId="707b42e47e16ca84" providerId="LiveId" clId="{BCAB1FCD-C6E0-4904-9922-531ED0D800C6}" dt="2018-07-13T17:18:40.240" v="426" actId="166"/>
-          <ac:picMkLst>
-            <pc:docMk/>
-            <pc:sldMk cId="1004767918" sldId="258"/>
-            <ac:picMk id="17" creationId="{148169F0-3D2D-4F32-8BB2-637A583D16E0}"/>
-          </ac:picMkLst>
-        </pc:picChg>
-        <pc:picChg chg="add del mod">
-          <ac:chgData name="Willy-Peter Schaub" userId="707b42e47e16ca84" providerId="LiveId" clId="{BCAB1FCD-C6E0-4904-9922-531ED0D800C6}" dt="2018-07-11T16:31:37.093" v="304" actId="478"/>
-          <ac:picMkLst>
-            <pc:docMk/>
-            <pc:sldMk cId="1004767918" sldId="258"/>
-            <ac:picMk id="17" creationId="{3FFBEE36-02D8-4226-A593-B6D70E8F7BA8}"/>
-          </ac:picMkLst>
-        </pc:picChg>
-        <pc:picChg chg="add mod ord">
-          <ac:chgData name="Willy-Peter Schaub" userId="707b42e47e16ca84" providerId="LiveId" clId="{BCAB1FCD-C6E0-4904-9922-531ED0D800C6}" dt="2018-07-13T17:18:40.240" v="426" actId="166"/>
-          <ac:picMkLst>
-            <pc:docMk/>
-            <pc:sldMk cId="1004767918" sldId="258"/>
-            <ac:picMk id="18" creationId="{875197FA-1B3E-4364-9DF7-ABBF22D92697}"/>
-          </ac:picMkLst>
-        </pc:picChg>
-        <pc:picChg chg="add del">
-          <ac:chgData name="Willy-Peter Schaub" userId="707b42e47e16ca84" providerId="LiveId" clId="{BCAB1FCD-C6E0-4904-9922-531ED0D800C6}" dt="2018-07-11T16:31:37.093" v="304" actId="478"/>
-          <ac:picMkLst>
-            <pc:docMk/>
-            <pc:sldMk cId="1004767918" sldId="258"/>
-            <ac:picMk id="18" creationId="{DDB01B90-FC77-4354-BA36-0B960F38157A}"/>
-          </ac:picMkLst>
-        </pc:picChg>
-        <pc:picChg chg="add del">
-          <ac:chgData name="Willy-Peter Schaub" userId="707b42e47e16ca84" providerId="LiveId" clId="{BCAB1FCD-C6E0-4904-9922-531ED0D800C6}" dt="2018-07-11T16:31:37.093" v="304" actId="478"/>
-          <ac:picMkLst>
-            <pc:docMk/>
-            <pc:sldMk cId="1004767918" sldId="258"/>
-            <ac:picMk id="19" creationId="{F841DE78-3A1D-453B-B8CF-19514A19A587}"/>
-          </ac:picMkLst>
-        </pc:picChg>
-        <pc:picChg chg="add del">
-          <ac:chgData name="Willy-Peter Schaub" userId="707b42e47e16ca84" providerId="LiveId" clId="{BCAB1FCD-C6E0-4904-9922-531ED0D800C6}" dt="2018-07-11T16:31:37.093" v="304" actId="478"/>
-          <ac:picMkLst>
-            <pc:docMk/>
-            <pc:sldMk cId="1004767918" sldId="258"/>
-            <ac:picMk id="20" creationId="{3E86917C-7C99-4C6F-B76E-555AC84E05D8}"/>
-          </ac:picMkLst>
-        </pc:picChg>
-      </pc:sldChg>
-      <pc:sldChg chg="addSp delSp modSp add">
-        <pc:chgData name="Willy-Peter Schaub" userId="707b42e47e16ca84" providerId="LiveId" clId="{BCAB1FCD-C6E0-4904-9922-531ED0D800C6}" dt="2018-07-20T03:15:59.844" v="1738" actId="113"/>
+      <pc:sldChg chg="modSp">
+        <pc:chgData name="Willy-Peter Schaub" userId="707b42e47e16ca84" providerId="LiveId" clId="{E10E4484-2D4F-42E0-B17A-6464F773B2D2}" dt="2019-04-25T03:18:45.351" v="22" actId="1076"/>
         <pc:sldMkLst>
           <pc:docMk/>
           <pc:sldMk cId="556094072" sldId="259"/>
         </pc:sldMkLst>
-        <pc:spChg chg="add mod">
-          <ac:chgData name="Willy-Peter Schaub" userId="707b42e47e16ca84" providerId="LiveId" clId="{BCAB1FCD-C6E0-4904-9922-531ED0D800C6}" dt="2018-07-20T03:15:20.067" v="1720" actId="113"/>
-          <ac:spMkLst>
-            <pc:docMk/>
-            <pc:sldMk cId="556094072" sldId="259"/>
-            <ac:spMk id="2" creationId="{3C43FB5C-4BFE-40E8-80E3-2B97592FDE12}"/>
-          </ac:spMkLst>
-        </pc:spChg>
-        <pc:spChg chg="add mod">
-          <ac:chgData name="Willy-Peter Schaub" userId="707b42e47e16ca84" providerId="LiveId" clId="{BCAB1FCD-C6E0-4904-9922-531ED0D800C6}" dt="2018-07-20T03:15:23.714" v="1722" actId="113"/>
-          <ac:spMkLst>
-            <pc:docMk/>
-            <pc:sldMk cId="556094072" sldId="259"/>
-            <ac:spMk id="3" creationId="{325D024E-AA16-480D-BE98-CD2DFC135D39}"/>
-          </ac:spMkLst>
-        </pc:spChg>
-        <pc:spChg chg="add mod">
-          <ac:chgData name="Willy-Peter Schaub" userId="707b42e47e16ca84" providerId="LiveId" clId="{BCAB1FCD-C6E0-4904-9922-531ED0D800C6}" dt="2018-07-20T03:15:27.632" v="1725" actId="113"/>
-          <ac:spMkLst>
-            <pc:docMk/>
-            <pc:sldMk cId="556094072" sldId="259"/>
-            <ac:spMk id="4" creationId="{1CCAAE3C-4AA8-4654-8CF7-EFB4F0601C90}"/>
-          </ac:spMkLst>
-        </pc:spChg>
-        <pc:spChg chg="add mod">
-          <ac:chgData name="Willy-Peter Schaub" userId="707b42e47e16ca84" providerId="LiveId" clId="{BCAB1FCD-C6E0-4904-9922-531ED0D800C6}" dt="2018-07-20T03:15:31.196" v="1728" actId="113"/>
-          <ac:spMkLst>
-            <pc:docMk/>
-            <pc:sldMk cId="556094072" sldId="259"/>
-            <ac:spMk id="5" creationId="{320F45C4-3AC8-4ABF-824D-AEEE6B605A3D}"/>
-          </ac:spMkLst>
-        </pc:spChg>
-        <pc:spChg chg="add mod">
-          <ac:chgData name="Willy-Peter Schaub" userId="707b42e47e16ca84" providerId="LiveId" clId="{BCAB1FCD-C6E0-4904-9922-531ED0D800C6}" dt="2018-07-20T03:15:59.844" v="1738" actId="113"/>
-          <ac:spMkLst>
-            <pc:docMk/>
-            <pc:sldMk cId="556094072" sldId="259"/>
-            <ac:spMk id="6" creationId="{4276B958-2557-478D-8C01-4245DBEE5BF5}"/>
-          </ac:spMkLst>
-        </pc:spChg>
-        <pc:spChg chg="add mod">
-          <ac:chgData name="Willy-Peter Schaub" userId="707b42e47e16ca84" providerId="LiveId" clId="{BCAB1FCD-C6E0-4904-9922-531ED0D800C6}" dt="2018-07-20T03:15:37.789" v="1731" actId="113"/>
-          <ac:spMkLst>
-            <pc:docMk/>
-            <pc:sldMk cId="556094072" sldId="259"/>
-            <ac:spMk id="7" creationId="{92C6B7A8-6496-470B-8367-9E755AAA1CD8}"/>
-          </ac:spMkLst>
-        </pc:spChg>
-        <pc:spChg chg="add mod">
-          <ac:chgData name="Willy-Peter Schaub" userId="707b42e47e16ca84" providerId="LiveId" clId="{BCAB1FCD-C6E0-4904-9922-531ED0D800C6}" dt="2018-07-20T03:15:52.834" v="1737" actId="113"/>
-          <ac:spMkLst>
-            <pc:docMk/>
-            <pc:sldMk cId="556094072" sldId="259"/>
-            <ac:spMk id="8" creationId="{A0CB3A8D-409A-4664-BFFF-22C703363A1E}"/>
-          </ac:spMkLst>
-        </pc:spChg>
-        <pc:spChg chg="add mod">
-          <ac:chgData name="Willy-Peter Schaub" userId="707b42e47e16ca84" providerId="LiveId" clId="{BCAB1FCD-C6E0-4904-9922-531ED0D800C6}" dt="2018-07-20T03:15:52.397" v="1736" actId="113"/>
-          <ac:spMkLst>
-            <pc:docMk/>
-            <pc:sldMk cId="556094072" sldId="259"/>
-            <ac:spMk id="9" creationId="{5425E45C-9DFB-4424-BF0E-731207FE09A1}"/>
-          </ac:spMkLst>
-        </pc:spChg>
-        <pc:spChg chg="add mod">
-          <ac:chgData name="Willy-Peter Schaub" userId="707b42e47e16ca84" providerId="LiveId" clId="{BCAB1FCD-C6E0-4904-9922-531ED0D800C6}" dt="2018-07-19T18:10:11.093" v="1402" actId="12788"/>
-          <ac:spMkLst>
-            <pc:docMk/>
-            <pc:sldMk cId="556094072" sldId="259"/>
-            <ac:spMk id="10" creationId="{5FE4A2AD-2B8C-49A0-BD36-A997F904C422}"/>
-          </ac:spMkLst>
-        </pc:spChg>
-        <pc:spChg chg="add mod">
-          <ac:chgData name="Willy-Peter Schaub" userId="707b42e47e16ca84" providerId="LiveId" clId="{BCAB1FCD-C6E0-4904-9922-531ED0D800C6}" dt="2018-07-19T18:10:11.093" v="1402" actId="12788"/>
-          <ac:spMkLst>
-            <pc:docMk/>
-            <pc:sldMk cId="556094072" sldId="259"/>
-            <ac:spMk id="11" creationId="{04479A0C-6794-4524-B8F7-3EEC30B5A68A}"/>
-          </ac:spMkLst>
-        </pc:spChg>
-        <pc:spChg chg="add mod">
-          <ac:chgData name="Willy-Peter Schaub" userId="707b42e47e16ca84" providerId="LiveId" clId="{BCAB1FCD-C6E0-4904-9922-531ED0D800C6}" dt="2018-07-19T18:10:11.093" v="1402" actId="12788"/>
-          <ac:spMkLst>
-            <pc:docMk/>
-            <pc:sldMk cId="556094072" sldId="259"/>
-            <ac:spMk id="12" creationId="{5903C7DD-6B7C-4B83-87E5-5152234617D2}"/>
-          </ac:spMkLst>
-        </pc:spChg>
-        <pc:spChg chg="add mod">
-          <ac:chgData name="Willy-Peter Schaub" userId="707b42e47e16ca84" providerId="LiveId" clId="{BCAB1FCD-C6E0-4904-9922-531ED0D800C6}" dt="2018-07-19T18:10:11.093" v="1402" actId="12788"/>
-          <ac:spMkLst>
-            <pc:docMk/>
-            <pc:sldMk cId="556094072" sldId="259"/>
-            <ac:spMk id="13" creationId="{62470D09-5959-43F6-A485-79D6EF88F0AB}"/>
-          </ac:spMkLst>
-        </pc:spChg>
-        <pc:spChg chg="add mod">
-          <ac:chgData name="Willy-Peter Schaub" userId="707b42e47e16ca84" providerId="LiveId" clId="{BCAB1FCD-C6E0-4904-9922-531ED0D800C6}" dt="2018-07-19T18:10:11.093" v="1402" actId="12788"/>
-          <ac:spMkLst>
-            <pc:docMk/>
-            <pc:sldMk cId="556094072" sldId="259"/>
-            <ac:spMk id="14" creationId="{6403546B-7216-4435-BD3C-7E59A1231AA7}"/>
-          </ac:spMkLst>
-        </pc:spChg>
-        <pc:spChg chg="add mod">
-          <ac:chgData name="Willy-Peter Schaub" userId="707b42e47e16ca84" providerId="LiveId" clId="{BCAB1FCD-C6E0-4904-9922-531ED0D800C6}" dt="2018-07-19T18:10:11.093" v="1402" actId="12788"/>
-          <ac:spMkLst>
-            <pc:docMk/>
-            <pc:sldMk cId="556094072" sldId="259"/>
-            <ac:spMk id="15" creationId="{8FAD26E0-E097-4193-A678-C95C946D650E}"/>
-          </ac:spMkLst>
-        </pc:spChg>
-        <pc:spChg chg="add mod">
-          <ac:chgData name="Willy-Peter Schaub" userId="707b42e47e16ca84" providerId="LiveId" clId="{BCAB1FCD-C6E0-4904-9922-531ED0D800C6}" dt="2018-07-19T18:10:11.093" v="1402" actId="12788"/>
-          <ac:spMkLst>
-            <pc:docMk/>
-            <pc:sldMk cId="556094072" sldId="259"/>
-            <ac:spMk id="16" creationId="{40425BB6-F5B4-4EEB-9F00-CFB8846CCCE6}"/>
-          </ac:spMkLst>
-        </pc:spChg>
-        <pc:spChg chg="add mod">
-          <ac:chgData name="Willy-Peter Schaub" userId="707b42e47e16ca84" providerId="LiveId" clId="{BCAB1FCD-C6E0-4904-9922-531ED0D800C6}" dt="2018-07-19T18:10:11.093" v="1402" actId="12788"/>
-          <ac:spMkLst>
-            <pc:docMk/>
-            <pc:sldMk cId="556094072" sldId="259"/>
-            <ac:spMk id="17" creationId="{0A37915C-3DD9-4AB7-AF87-3F29A00C2903}"/>
-          </ac:spMkLst>
-        </pc:spChg>
-        <pc:spChg chg="add del mod">
-          <ac:chgData name="Willy-Peter Schaub" userId="707b42e47e16ca84" providerId="LiveId" clId="{BCAB1FCD-C6E0-4904-9922-531ED0D800C6}" dt="2018-07-19T17:54:49.879" v="1058" actId="478"/>
-          <ac:spMkLst>
-            <pc:docMk/>
-            <pc:sldMk cId="556094072" sldId="259"/>
-            <ac:spMk id="18" creationId="{CAB7CE80-9273-42B7-96B1-13772C805F97}"/>
-          </ac:spMkLst>
-        </pc:spChg>
-        <pc:spChg chg="add del mod">
-          <ac:chgData name="Willy-Peter Schaub" userId="707b42e47e16ca84" providerId="LiveId" clId="{BCAB1FCD-C6E0-4904-9922-531ED0D800C6}" dt="2018-07-19T17:54:49.879" v="1058" actId="478"/>
-          <ac:spMkLst>
-            <pc:docMk/>
-            <pc:sldMk cId="556094072" sldId="259"/>
-            <ac:spMk id="19" creationId="{857011FF-2879-4156-AF23-C2C6AC28F8EC}"/>
-          </ac:spMkLst>
-        </pc:spChg>
-        <pc:spChg chg="add del mod">
-          <ac:chgData name="Willy-Peter Schaub" userId="707b42e47e16ca84" providerId="LiveId" clId="{BCAB1FCD-C6E0-4904-9922-531ED0D800C6}" dt="2018-07-19T17:58:59.483" v="1146" actId="478"/>
-          <ac:spMkLst>
-            <pc:docMk/>
-            <pc:sldMk cId="556094072" sldId="259"/>
-            <ac:spMk id="24" creationId="{1A077186-5B05-47EC-9922-8BCCC7CEAA52}"/>
-          </ac:spMkLst>
-        </pc:spChg>
-        <pc:spChg chg="add del mod">
-          <ac:chgData name="Willy-Peter Schaub" userId="707b42e47e16ca84" providerId="LiveId" clId="{BCAB1FCD-C6E0-4904-9922-531ED0D800C6}" dt="2018-07-19T17:58:59.483" v="1146" actId="478"/>
-          <ac:spMkLst>
-            <pc:docMk/>
-            <pc:sldMk cId="556094072" sldId="259"/>
-            <ac:spMk id="25" creationId="{8BEC3990-E2E9-4B49-B31E-1794BE32FB43}"/>
-          </ac:spMkLst>
-        </pc:spChg>
-        <pc:spChg chg="add del mod">
-          <ac:chgData name="Willy-Peter Schaub" userId="707b42e47e16ca84" providerId="LiveId" clId="{BCAB1FCD-C6E0-4904-9922-531ED0D800C6}" dt="2018-07-19T17:58:59.483" v="1146" actId="478"/>
-          <ac:spMkLst>
-            <pc:docMk/>
-            <pc:sldMk cId="556094072" sldId="259"/>
-            <ac:spMk id="26" creationId="{1B9404DF-85C0-4067-A8A9-1634758D3D1C}"/>
-          </ac:spMkLst>
-        </pc:spChg>
-        <pc:spChg chg="add del mod">
-          <ac:chgData name="Willy-Peter Schaub" userId="707b42e47e16ca84" providerId="LiveId" clId="{BCAB1FCD-C6E0-4904-9922-531ED0D800C6}" dt="2018-07-19T17:58:59.483" v="1146" actId="478"/>
-          <ac:spMkLst>
-            <pc:docMk/>
-            <pc:sldMk cId="556094072" sldId="259"/>
-            <ac:spMk id="27" creationId="{3C016919-1880-4702-9700-7EF3E4DB4FF0}"/>
-          </ac:spMkLst>
-        </pc:spChg>
-        <pc:spChg chg="add mod">
-          <ac:chgData name="Willy-Peter Schaub" userId="707b42e47e16ca84" providerId="LiveId" clId="{BCAB1FCD-C6E0-4904-9922-531ED0D800C6}" dt="2018-07-19T18:25:46.363" v="1519" actId="1035"/>
+        <pc:spChg chg="mod">
+          <ac:chgData name="Willy-Peter Schaub" userId="707b42e47e16ca84" providerId="LiveId" clId="{E10E4484-2D4F-42E0-B17A-6464F773B2D2}" dt="2019-04-25T03:18:36.075" v="17" actId="1076"/>
           <ac:spMkLst>
             <pc:docMk/>
             <pc:sldMk cId="556094072" sldId="259"/>
             <ac:spMk id="31" creationId="{6A773C66-7295-44F3-A5C8-318E2A7CA63A}"/>
           </ac:spMkLst>
         </pc:spChg>
-        <pc:spChg chg="add mod">
-          <ac:chgData name="Willy-Peter Schaub" userId="707b42e47e16ca84" providerId="LiveId" clId="{BCAB1FCD-C6E0-4904-9922-531ED0D800C6}" dt="2018-07-19T18:20:34.886" v="1429" actId="113"/>
+        <pc:spChg chg="mod">
+          <ac:chgData name="Willy-Peter Schaub" userId="707b42e47e16ca84" providerId="LiveId" clId="{E10E4484-2D4F-42E0-B17A-6464F773B2D2}" dt="2019-04-25T03:18:41.919" v="20" actId="1076"/>
           <ac:spMkLst>
             <pc:docMk/>
             <pc:sldMk cId="556094072" sldId="259"/>
             <ac:spMk id="32" creationId="{46E12690-F490-4F84-A70A-B2E43436D582}"/>
           </ac:spMkLst>
         </pc:spChg>
-        <pc:spChg chg="add del mod">
-          <ac:chgData name="Willy-Peter Schaub" userId="707b42e47e16ca84" providerId="LiveId" clId="{BCAB1FCD-C6E0-4904-9922-531ED0D800C6}" dt="2018-07-19T17:58:59.483" v="1146" actId="478"/>
-          <ac:spMkLst>
-            <pc:docMk/>
-            <pc:sldMk cId="556094072" sldId="259"/>
-            <ac:spMk id="33" creationId="{C7F29F28-BF18-4795-85F8-405B0FA18CBD}"/>
-          </ac:spMkLst>
-        </pc:spChg>
-        <pc:spChg chg="add del mod">
-          <ac:chgData name="Willy-Peter Schaub" userId="707b42e47e16ca84" providerId="LiveId" clId="{BCAB1FCD-C6E0-4904-9922-531ED0D800C6}" dt="2018-07-19T17:58:59.483" v="1146" actId="478"/>
-          <ac:spMkLst>
-            <pc:docMk/>
-            <pc:sldMk cId="556094072" sldId="259"/>
-            <ac:spMk id="34" creationId="{9C66F412-B258-45FF-84B1-344CBC9D6DD9}"/>
-          </ac:spMkLst>
-        </pc:spChg>
-        <pc:spChg chg="add del mod">
-          <ac:chgData name="Willy-Peter Schaub" userId="707b42e47e16ca84" providerId="LiveId" clId="{BCAB1FCD-C6E0-4904-9922-531ED0D800C6}" dt="2018-07-19T17:58:59.483" v="1146" actId="478"/>
-          <ac:spMkLst>
-            <pc:docMk/>
-            <pc:sldMk cId="556094072" sldId="259"/>
-            <ac:spMk id="35" creationId="{AF2437B9-2B22-488A-B550-5A505AAE614E}"/>
-          </ac:spMkLst>
-        </pc:spChg>
-        <pc:spChg chg="add del mod">
-          <ac:chgData name="Willy-Peter Schaub" userId="707b42e47e16ca84" providerId="LiveId" clId="{BCAB1FCD-C6E0-4904-9922-531ED0D800C6}" dt="2018-07-19T17:58:59.483" v="1146" actId="478"/>
-          <ac:spMkLst>
-            <pc:docMk/>
-            <pc:sldMk cId="556094072" sldId="259"/>
-            <ac:spMk id="36" creationId="{5C788249-5F88-4186-A6CF-C72C08DDC4E4}"/>
-          </ac:spMkLst>
-        </pc:spChg>
-        <pc:spChg chg="add del mod">
-          <ac:chgData name="Willy-Peter Schaub" userId="707b42e47e16ca84" providerId="LiveId" clId="{BCAB1FCD-C6E0-4904-9922-531ED0D800C6}" dt="2018-07-19T17:59:03.081" v="1148" actId="478"/>
-          <ac:spMkLst>
-            <pc:docMk/>
-            <pc:sldMk cId="556094072" sldId="259"/>
-            <ac:spMk id="37" creationId="{455D5182-A88A-4ED2-BF45-63FADDD0B4CD}"/>
-          </ac:spMkLst>
-        </pc:spChg>
-        <pc:spChg chg="add del mod">
-          <ac:chgData name="Willy-Peter Schaub" userId="707b42e47e16ca84" providerId="LiveId" clId="{BCAB1FCD-C6E0-4904-9922-531ED0D800C6}" dt="2018-07-19T17:58:59.483" v="1146" actId="478"/>
-          <ac:spMkLst>
-            <pc:docMk/>
-            <pc:sldMk cId="556094072" sldId="259"/>
-            <ac:spMk id="38" creationId="{611A6720-84D6-4090-9904-B37235FBFC60}"/>
-          </ac:spMkLst>
-        </pc:spChg>
-        <pc:spChg chg="add del mod">
-          <ac:chgData name="Willy-Peter Schaub" userId="707b42e47e16ca84" providerId="LiveId" clId="{BCAB1FCD-C6E0-4904-9922-531ED0D800C6}" dt="2018-07-19T17:58:59.483" v="1146" actId="478"/>
-          <ac:spMkLst>
-            <pc:docMk/>
-            <pc:sldMk cId="556094072" sldId="259"/>
-            <ac:spMk id="39" creationId="{FD1C7603-2E84-4A82-AB1A-C24BBDE6A23D}"/>
-          </ac:spMkLst>
-        </pc:spChg>
-        <pc:spChg chg="add del mod">
-          <ac:chgData name="Willy-Peter Schaub" userId="707b42e47e16ca84" providerId="LiveId" clId="{BCAB1FCD-C6E0-4904-9922-531ED0D800C6}" dt="2018-07-19T17:58:59.483" v="1146" actId="478"/>
-          <ac:spMkLst>
-            <pc:docMk/>
-            <pc:sldMk cId="556094072" sldId="259"/>
-            <ac:spMk id="40" creationId="{03BE99C3-71DF-44D0-B964-9592887F627E}"/>
-          </ac:spMkLst>
-        </pc:spChg>
-        <pc:spChg chg="add del mod">
-          <ac:chgData name="Willy-Peter Schaub" userId="707b42e47e16ca84" providerId="LiveId" clId="{BCAB1FCD-C6E0-4904-9922-531ED0D800C6}" dt="2018-07-19T17:58:59.483" v="1146" actId="478"/>
-          <ac:spMkLst>
-            <pc:docMk/>
-            <pc:sldMk cId="556094072" sldId="259"/>
-            <ac:spMk id="41" creationId="{DEA47356-8EEF-4531-8F11-3DBA4F254FAF}"/>
-          </ac:spMkLst>
-        </pc:spChg>
-        <pc:spChg chg="add del mod">
-          <ac:chgData name="Willy-Peter Schaub" userId="707b42e47e16ca84" providerId="LiveId" clId="{BCAB1FCD-C6E0-4904-9922-531ED0D800C6}" dt="2018-07-19T17:57:16.315" v="1091" actId="478"/>
-          <ac:spMkLst>
-            <pc:docMk/>
-            <pc:sldMk cId="556094072" sldId="259"/>
-            <ac:spMk id="46" creationId="{48BB6CFA-49F2-4940-832F-BEE08C0C1C1D}"/>
-          </ac:spMkLst>
-        </pc:spChg>
-        <pc:spChg chg="add mod">
-          <ac:chgData name="Willy-Peter Schaub" userId="707b42e47e16ca84" providerId="LiveId" clId="{BCAB1FCD-C6E0-4904-9922-531ED0D800C6}" dt="2018-07-19T18:20:34.886" v="1429" actId="113"/>
+        <pc:spChg chg="mod">
+          <ac:chgData name="Willy-Peter Schaub" userId="707b42e47e16ca84" providerId="LiveId" clId="{E10E4484-2D4F-42E0-B17A-6464F773B2D2}" dt="2019-04-25T03:18:45.351" v="22" actId="1076"/>
           <ac:spMkLst>
             <pc:docMk/>
             <pc:sldMk cId="556094072" sldId="259"/>
             <ac:spMk id="47" creationId="{97704393-243E-4A38-A773-E573C1FF9490}"/>
           </ac:spMkLst>
         </pc:spChg>
-        <pc:spChg chg="add mod">
-          <ac:chgData name="Willy-Peter Schaub" userId="707b42e47e16ca84" providerId="LiveId" clId="{BCAB1FCD-C6E0-4904-9922-531ED0D800C6}" dt="2018-07-19T18:20:34.886" v="1429" actId="113"/>
-          <ac:spMkLst>
-            <pc:docMk/>
-            <pc:sldMk cId="556094072" sldId="259"/>
-            <ac:spMk id="50" creationId="{4FA5112B-99DA-48AB-A1AA-99EB08FDD832}"/>
-          </ac:spMkLst>
-        </pc:spChg>
-        <pc:spChg chg="add del mod">
-          <ac:chgData name="Willy-Peter Schaub" userId="707b42e47e16ca84" providerId="LiveId" clId="{BCAB1FCD-C6E0-4904-9922-531ED0D800C6}" dt="2018-07-19T18:22:58.087" v="1445" actId="478"/>
-          <ac:spMkLst>
-            <pc:docMk/>
-            <pc:sldMk cId="556094072" sldId="259"/>
-            <ac:spMk id="69" creationId="{BB562614-FA94-435D-AE77-123FB2D6D6A0}"/>
-          </ac:spMkLst>
-        </pc:spChg>
-        <pc:spChg chg="add mod">
-          <ac:chgData name="Willy-Peter Schaub" userId="707b42e47e16ca84" providerId="LiveId" clId="{BCAB1FCD-C6E0-4904-9922-531ED0D800C6}" dt="2018-07-20T03:10:54.217" v="1524" actId="120"/>
-          <ac:spMkLst>
-            <pc:docMk/>
-            <pc:sldMk cId="556094072" sldId="259"/>
-            <ac:spMk id="83" creationId="{FC131873-A574-4BD7-BD23-14AD2C950241}"/>
-          </ac:spMkLst>
-        </pc:spChg>
-        <pc:spChg chg="add mod">
-          <ac:chgData name="Willy-Peter Schaub" userId="707b42e47e16ca84" providerId="LiveId" clId="{BCAB1FCD-C6E0-4904-9922-531ED0D800C6}" dt="2018-07-20T03:10:54.217" v="1524" actId="120"/>
-          <ac:spMkLst>
-            <pc:docMk/>
-            <pc:sldMk cId="556094072" sldId="259"/>
-            <ac:spMk id="84" creationId="{650E1386-D9D1-4D49-9914-769BCE348192}"/>
-          </ac:spMkLst>
-        </pc:spChg>
-        <pc:spChg chg="add mod">
-          <ac:chgData name="Willy-Peter Schaub" userId="707b42e47e16ca84" providerId="LiveId" clId="{BCAB1FCD-C6E0-4904-9922-531ED0D800C6}" dt="2018-07-20T03:15:51.936" v="1735" actId="113"/>
-          <ac:spMkLst>
-            <pc:docMk/>
-            <pc:sldMk cId="556094072" sldId="259"/>
-            <ac:spMk id="87" creationId="{CED94FA3-9A2B-4671-94D0-7CA1C69F2EA1}"/>
-          </ac:spMkLst>
-        </pc:spChg>
-        <pc:spChg chg="add mod">
-          <ac:chgData name="Willy-Peter Schaub" userId="707b42e47e16ca84" providerId="LiveId" clId="{BCAB1FCD-C6E0-4904-9922-531ED0D800C6}" dt="2018-07-19T18:10:11.093" v="1402" actId="12788"/>
-          <ac:spMkLst>
-            <pc:docMk/>
-            <pc:sldMk cId="556094072" sldId="259"/>
-            <ac:spMk id="88" creationId="{54F961EE-446C-4D03-A53A-E3EC28F83F39}"/>
-          </ac:spMkLst>
-        </pc:spChg>
-        <pc:spChg chg="add mod">
-          <ac:chgData name="Willy-Peter Schaub" userId="707b42e47e16ca84" providerId="LiveId" clId="{BCAB1FCD-C6E0-4904-9922-531ED0D800C6}" dt="2018-07-20T03:12:45.087" v="1604"/>
-          <ac:spMkLst>
-            <pc:docMk/>
-            <pc:sldMk cId="556094072" sldId="259"/>
-            <ac:spMk id="99" creationId="{B0081B56-A73C-4F91-A88E-2115F05CAF21}"/>
-          </ac:spMkLst>
-        </pc:spChg>
-        <pc:spChg chg="add mod ord">
-          <ac:chgData name="Willy-Peter Schaub" userId="707b42e47e16ca84" providerId="LiveId" clId="{BCAB1FCD-C6E0-4904-9922-531ED0D800C6}" dt="2018-07-20T03:12:47.173" v="1605"/>
-          <ac:spMkLst>
-            <pc:docMk/>
-            <pc:sldMk cId="556094072" sldId="259"/>
-            <ac:spMk id="100" creationId="{F253D1C8-8A18-420C-9B83-DF8297FE0AAE}"/>
-          </ac:spMkLst>
-        </pc:spChg>
-        <pc:spChg chg="add mod">
-          <ac:chgData name="Willy-Peter Schaub" userId="707b42e47e16ca84" providerId="LiveId" clId="{BCAB1FCD-C6E0-4904-9922-531ED0D800C6}" dt="2018-07-20T03:12:53.605" v="1608" actId="14100"/>
-          <ac:spMkLst>
-            <pc:docMk/>
-            <pc:sldMk cId="556094072" sldId="259"/>
-            <ac:spMk id="101" creationId="{A7103BC0-8E2F-410F-95BF-CDE0398D43EC}"/>
-          </ac:spMkLst>
-        </pc:spChg>
-        <pc:spChg chg="add mod">
-          <ac:chgData name="Willy-Peter Schaub" userId="707b42e47e16ca84" providerId="LiveId" clId="{BCAB1FCD-C6E0-4904-9922-531ED0D800C6}" dt="2018-07-20T03:12:49.887" v="1607"/>
-          <ac:spMkLst>
-            <pc:docMk/>
-            <pc:sldMk cId="556094072" sldId="259"/>
-            <ac:spMk id="102" creationId="{12E7575F-E0AE-4E48-8190-4BC4450A57C9}"/>
-          </ac:spMkLst>
-        </pc:spChg>
-        <pc:spChg chg="add mod">
-          <ac:chgData name="Willy-Peter Schaub" userId="707b42e47e16ca84" providerId="LiveId" clId="{BCAB1FCD-C6E0-4904-9922-531ED0D800C6}" dt="2018-07-19T18:20:34.886" v="1429" actId="113"/>
-          <ac:spMkLst>
-            <pc:docMk/>
-            <pc:sldMk cId="556094072" sldId="259"/>
-            <ac:spMk id="103" creationId="{FAB6785B-BF40-482F-809A-9F62B8CACD1A}"/>
-          </ac:spMkLst>
-        </pc:spChg>
-        <pc:spChg chg="add mod">
-          <ac:chgData name="Willy-Peter Schaub" userId="707b42e47e16ca84" providerId="LiveId" clId="{BCAB1FCD-C6E0-4904-9922-531ED0D800C6}" dt="2018-07-19T18:20:34.886" v="1429" actId="113"/>
-          <ac:spMkLst>
-            <pc:docMk/>
-            <pc:sldMk cId="556094072" sldId="259"/>
-            <ac:spMk id="104" creationId="{FCEA1195-6B6B-4657-8BC6-35DAA084DBAF}"/>
-          </ac:spMkLst>
-        </pc:spChg>
-        <pc:spChg chg="add mod">
-          <ac:chgData name="Willy-Peter Schaub" userId="707b42e47e16ca84" providerId="LiveId" clId="{BCAB1FCD-C6E0-4904-9922-531ED0D800C6}" dt="2018-07-19T18:20:34.886" v="1429" actId="113"/>
-          <ac:spMkLst>
-            <pc:docMk/>
-            <pc:sldMk cId="556094072" sldId="259"/>
-            <ac:spMk id="105" creationId="{9FBB4387-5AAA-42AD-B49B-A8CE399081AE}"/>
-          </ac:spMkLst>
-        </pc:spChg>
-        <pc:spChg chg="add mod">
-          <ac:chgData name="Willy-Peter Schaub" userId="707b42e47e16ca84" providerId="LiveId" clId="{BCAB1FCD-C6E0-4904-9922-531ED0D800C6}" dt="2018-07-19T18:20:34.886" v="1429" actId="113"/>
-          <ac:spMkLst>
-            <pc:docMk/>
-            <pc:sldMk cId="556094072" sldId="259"/>
-            <ac:spMk id="106" creationId="{27EF71AD-578D-4868-A798-F923B130E349}"/>
-          </ac:spMkLst>
-        </pc:spChg>
-        <pc:spChg chg="add mod">
-          <ac:chgData name="Willy-Peter Schaub" userId="707b42e47e16ca84" providerId="LiveId" clId="{BCAB1FCD-C6E0-4904-9922-531ED0D800C6}" dt="2018-07-19T18:20:34.886" v="1429" actId="113"/>
-          <ac:spMkLst>
-            <pc:docMk/>
-            <pc:sldMk cId="556094072" sldId="259"/>
-            <ac:spMk id="107" creationId="{63846C72-F921-4863-9073-81C12C3CEAE4}"/>
-          </ac:spMkLst>
-        </pc:spChg>
-        <pc:spChg chg="add del mod">
-          <ac:chgData name="Willy-Peter Schaub" userId="707b42e47e16ca84" providerId="LiveId" clId="{BCAB1FCD-C6E0-4904-9922-531ED0D800C6}" dt="2018-07-19T18:07:42.099" v="1330" actId="478"/>
-          <ac:spMkLst>
-            <pc:docMk/>
-            <pc:sldMk cId="556094072" sldId="259"/>
-            <ac:spMk id="108" creationId="{8E2D01B9-6DBC-4362-A2CC-985E5066C77B}"/>
-          </ac:spMkLst>
-        </pc:spChg>
-        <pc:grpChg chg="add mod">
-          <ac:chgData name="Willy-Peter Schaub" userId="707b42e47e16ca84" providerId="LiveId" clId="{BCAB1FCD-C6E0-4904-9922-531ED0D800C6}" dt="2018-07-19T18:21:42.580" v="1433" actId="1076"/>
-          <ac:grpSpMkLst>
-            <pc:docMk/>
-            <pc:sldMk cId="556094072" sldId="259"/>
-            <ac:grpSpMk id="90" creationId="{A26D1EAA-ECE8-403C-9D52-1B2B6BBC1808}"/>
-          </ac:grpSpMkLst>
-        </pc:grpChg>
-        <pc:grpChg chg="add mod">
-          <ac:chgData name="Willy-Peter Schaub" userId="707b42e47e16ca84" providerId="LiveId" clId="{BCAB1FCD-C6E0-4904-9922-531ED0D800C6}" dt="2018-07-19T18:03:45.169" v="1268" actId="1036"/>
-          <ac:grpSpMkLst>
-            <pc:docMk/>
-            <pc:sldMk cId="556094072" sldId="259"/>
-            <ac:grpSpMk id="91" creationId="{B7A4BFA0-9EF9-49E8-A2B3-247A8C66DA2B}"/>
-          </ac:grpSpMkLst>
-        </pc:grpChg>
-        <pc:picChg chg="add mod">
-          <ac:chgData name="Willy-Peter Schaub" userId="707b42e47e16ca84" providerId="LiveId" clId="{BCAB1FCD-C6E0-4904-9922-531ED0D800C6}" dt="2018-07-19T18:10:37.809" v="1403" actId="1076"/>
-          <ac:picMkLst>
-            <pc:docMk/>
-            <pc:sldMk cId="556094072" sldId="259"/>
-            <ac:picMk id="20" creationId="{912175BC-720C-446D-A9B9-46E66865268B}"/>
-          </ac:picMkLst>
-        </pc:picChg>
-        <pc:picChg chg="add del mod">
-          <ac:chgData name="Willy-Peter Schaub" userId="707b42e47e16ca84" providerId="LiveId" clId="{BCAB1FCD-C6E0-4904-9922-531ED0D800C6}" dt="2018-07-19T17:55:39.668" v="1064" actId="478"/>
-          <ac:picMkLst>
-            <pc:docMk/>
-            <pc:sldMk cId="556094072" sldId="259"/>
-            <ac:picMk id="21" creationId="{3A2613FF-2C5D-4AFD-B6BE-63CBC72845D5}"/>
-          </ac:picMkLst>
-        </pc:picChg>
-        <pc:picChg chg="add mod">
-          <ac:chgData name="Willy-Peter Schaub" userId="707b42e47e16ca84" providerId="LiveId" clId="{BCAB1FCD-C6E0-4904-9922-531ED0D800C6}" dt="2018-07-19T18:10:37.809" v="1403" actId="1076"/>
-          <ac:picMkLst>
-            <pc:docMk/>
-            <pc:sldMk cId="556094072" sldId="259"/>
-            <ac:picMk id="23" creationId="{6096B1C1-AE4D-4DC4-9464-45EA49545516}"/>
-          </ac:picMkLst>
-        </pc:picChg>
-        <pc:picChg chg="add mod">
-          <ac:chgData name="Willy-Peter Schaub" userId="707b42e47e16ca84" providerId="LiveId" clId="{BCAB1FCD-C6E0-4904-9922-531ED0D800C6}" dt="2018-07-19T18:25:46.363" v="1519" actId="1035"/>
-          <ac:picMkLst>
-            <pc:docMk/>
-            <pc:sldMk cId="556094072" sldId="259"/>
-            <ac:picMk id="28" creationId="{F217EB96-5E0E-49E2-B41F-46CB9DFEC35C}"/>
-          </ac:picMkLst>
-        </pc:picChg>
-        <pc:picChg chg="add del mod">
-          <ac:chgData name="Willy-Peter Schaub" userId="707b42e47e16ca84" providerId="LiveId" clId="{BCAB1FCD-C6E0-4904-9922-531ED0D800C6}" dt="2018-07-19T17:59:01.021" v="1147" actId="478"/>
-          <ac:picMkLst>
-            <pc:docMk/>
-            <pc:sldMk cId="556094072" sldId="259"/>
-            <ac:picMk id="29" creationId="{FFFB3080-9E77-4796-B686-7FAD591470C5}"/>
-          </ac:picMkLst>
-        </pc:picChg>
-        <pc:picChg chg="add del mod">
-          <ac:chgData name="Willy-Peter Schaub" userId="707b42e47e16ca84" providerId="LiveId" clId="{BCAB1FCD-C6E0-4904-9922-531ED0D800C6}" dt="2018-07-19T17:58:59.483" v="1146" actId="478"/>
-          <ac:picMkLst>
-            <pc:docMk/>
-            <pc:sldMk cId="556094072" sldId="259"/>
-            <ac:picMk id="30" creationId="{F98A0870-3DFD-47FE-9A9A-4DF9CD962172}"/>
-          </ac:picMkLst>
-        </pc:picChg>
-        <pc:picChg chg="add del mod">
-          <ac:chgData name="Willy-Peter Schaub" userId="707b42e47e16ca84" providerId="LiveId" clId="{BCAB1FCD-C6E0-4904-9922-531ED0D800C6}" dt="2018-07-19T17:58:59.483" v="1146" actId="478"/>
-          <ac:picMkLst>
-            <pc:docMk/>
-            <pc:sldMk cId="556094072" sldId="259"/>
-            <ac:picMk id="42" creationId="{701CBB70-ACFD-4E78-B62C-6EEB912A53C3}"/>
-          </ac:picMkLst>
-        </pc:picChg>
-        <pc:picChg chg="add del mod">
-          <ac:chgData name="Willy-Peter Schaub" userId="707b42e47e16ca84" providerId="LiveId" clId="{BCAB1FCD-C6E0-4904-9922-531ED0D800C6}" dt="2018-07-19T17:58:59.483" v="1146" actId="478"/>
-          <ac:picMkLst>
-            <pc:docMk/>
-            <pc:sldMk cId="556094072" sldId="259"/>
-            <ac:picMk id="43" creationId="{EF055BB7-3DFA-45CE-BE4B-68C1FF23172A}"/>
-          </ac:picMkLst>
-        </pc:picChg>
-        <pc:picChg chg="add mod">
-          <ac:chgData name="Willy-Peter Schaub" userId="707b42e47e16ca84" providerId="LiveId" clId="{BCAB1FCD-C6E0-4904-9922-531ED0D800C6}" dt="2018-07-19T18:03:28.417" v="1259" actId="164"/>
-          <ac:picMkLst>
-            <pc:docMk/>
-            <pc:sldMk cId="556094072" sldId="259"/>
-            <ac:picMk id="44" creationId="{00AB93CB-C135-4182-A0F9-8478382FAB36}"/>
-          </ac:picMkLst>
-        </pc:picChg>
-        <pc:picChg chg="add mod">
-          <ac:chgData name="Willy-Peter Schaub" userId="707b42e47e16ca84" providerId="LiveId" clId="{BCAB1FCD-C6E0-4904-9922-531ED0D800C6}" dt="2018-07-19T18:03:28.417" v="1259" actId="164"/>
-          <ac:picMkLst>
-            <pc:docMk/>
-            <pc:sldMk cId="556094072" sldId="259"/>
-            <ac:picMk id="45" creationId="{ADF69656-8733-4CC0-A9BE-DFFF1F4CE015}"/>
-          </ac:picMkLst>
-        </pc:picChg>
-        <pc:picChg chg="add mod">
-          <ac:chgData name="Willy-Peter Schaub" userId="707b42e47e16ca84" providerId="LiveId" clId="{BCAB1FCD-C6E0-4904-9922-531ED0D800C6}" dt="2018-07-19T18:02:55.133" v="1256" actId="164"/>
-          <ac:picMkLst>
-            <pc:docMk/>
-            <pc:sldMk cId="556094072" sldId="259"/>
-            <ac:picMk id="48" creationId="{5E7B6EB3-0C9C-4549-A87A-0CAB1C4411E4}"/>
-          </ac:picMkLst>
-        </pc:picChg>
-        <pc:picChg chg="add mod">
-          <ac:chgData name="Willy-Peter Schaub" userId="707b42e47e16ca84" providerId="LiveId" clId="{BCAB1FCD-C6E0-4904-9922-531ED0D800C6}" dt="2018-07-19T18:02:55.133" v="1256" actId="164"/>
-          <ac:picMkLst>
-            <pc:docMk/>
-            <pc:sldMk cId="556094072" sldId="259"/>
-            <ac:picMk id="49" creationId="{30EE586D-CADB-4AF2-A802-84FA754DE9FB}"/>
-          </ac:picMkLst>
-        </pc:picChg>
-        <pc:cxnChg chg="add del mod">
-          <ac:chgData name="Willy-Peter Schaub" userId="707b42e47e16ca84" providerId="LiveId" clId="{BCAB1FCD-C6E0-4904-9922-531ED0D800C6}" dt="2018-07-19T18:12:50.457" v="1420" actId="478"/>
-          <ac:cxnSpMkLst>
-            <pc:docMk/>
-            <pc:sldMk cId="556094072" sldId="259"/>
-            <ac:cxnSpMk id="52" creationId="{5A652A5E-0DCC-46D5-B97F-7AAA8CFA72E1}"/>
-          </ac:cxnSpMkLst>
-        </pc:cxnChg>
-        <pc:cxnChg chg="add del mod">
-          <ac:chgData name="Willy-Peter Schaub" userId="707b42e47e16ca84" providerId="LiveId" clId="{BCAB1FCD-C6E0-4904-9922-531ED0D800C6}" dt="2018-07-19T18:12:52.937" v="1421" actId="478"/>
-          <ac:cxnSpMkLst>
-            <pc:docMk/>
-            <pc:sldMk cId="556094072" sldId="259"/>
-            <ac:cxnSpMk id="53" creationId="{23C382FF-FF7B-47A5-B126-9798AE9A4775}"/>
-          </ac:cxnSpMkLst>
-        </pc:cxnChg>
-        <pc:cxnChg chg="add del mod">
-          <ac:chgData name="Willy-Peter Schaub" userId="707b42e47e16ca84" providerId="LiveId" clId="{BCAB1FCD-C6E0-4904-9922-531ED0D800C6}" dt="2018-07-19T18:12:47.307" v="1418" actId="478"/>
-          <ac:cxnSpMkLst>
-            <pc:docMk/>
-            <pc:sldMk cId="556094072" sldId="259"/>
-            <ac:cxnSpMk id="56" creationId="{A2EE9A62-A67C-468E-932E-D1AF162CFA55}"/>
-          </ac:cxnSpMkLst>
-        </pc:cxnChg>
-        <pc:cxnChg chg="add del mod">
-          <ac:chgData name="Willy-Peter Schaub" userId="707b42e47e16ca84" providerId="LiveId" clId="{BCAB1FCD-C6E0-4904-9922-531ED0D800C6}" dt="2018-07-19T18:12:43.922" v="1416" actId="478"/>
-          <ac:cxnSpMkLst>
-            <pc:docMk/>
-            <pc:sldMk cId="556094072" sldId="259"/>
-            <ac:cxnSpMk id="59" creationId="{53A01454-6378-4E54-84A2-A5826F64C486}"/>
-          </ac:cxnSpMkLst>
-        </pc:cxnChg>
-        <pc:cxnChg chg="add del mod">
-          <ac:chgData name="Willy-Peter Schaub" userId="707b42e47e16ca84" providerId="LiveId" clId="{BCAB1FCD-C6E0-4904-9922-531ED0D800C6}" dt="2018-07-19T18:12:37.871" v="1414" actId="478"/>
-          <ac:cxnSpMkLst>
-            <pc:docMk/>
-            <pc:sldMk cId="556094072" sldId="259"/>
-            <ac:cxnSpMk id="62" creationId="{583319C1-C157-45B1-8DCB-2AD2703BB4DD}"/>
-          </ac:cxnSpMkLst>
-        </pc:cxnChg>
-        <pc:cxnChg chg="add del mod">
-          <ac:chgData name="Willy-Peter Schaub" userId="707b42e47e16ca84" providerId="LiveId" clId="{BCAB1FCD-C6E0-4904-9922-531ED0D800C6}" dt="2018-07-19T18:22:57.015" v="1444" actId="478"/>
-          <ac:cxnSpMkLst>
-            <pc:docMk/>
-            <pc:sldMk cId="556094072" sldId="259"/>
-            <ac:cxnSpMk id="63" creationId="{205958BB-A855-4683-8AA2-DD3D0F4AC8B2}"/>
-          </ac:cxnSpMkLst>
-        </pc:cxnChg>
-        <pc:cxnChg chg="add del mod">
-          <ac:chgData name="Willy-Peter Schaub" userId="707b42e47e16ca84" providerId="LiveId" clId="{BCAB1FCD-C6E0-4904-9922-531ED0D800C6}" dt="2018-07-19T18:12:32.239" v="1412" actId="478"/>
-          <ac:cxnSpMkLst>
-            <pc:docMk/>
-            <pc:sldMk cId="556094072" sldId="259"/>
-            <ac:cxnSpMk id="65" creationId="{5E7D57C4-7910-49A6-A9DD-2D6B5F071CE1}"/>
-          </ac:cxnSpMkLst>
-        </pc:cxnChg>
-        <pc:cxnChg chg="add mod">
-          <ac:chgData name="Willy-Peter Schaub" userId="707b42e47e16ca84" providerId="LiveId" clId="{BCAB1FCD-C6E0-4904-9922-531ED0D800C6}" dt="2018-07-19T18:25:53.442" v="1521" actId="14100"/>
-          <ac:cxnSpMkLst>
-            <pc:docMk/>
-            <pc:sldMk cId="556094072" sldId="259"/>
-            <ac:cxnSpMk id="68" creationId="{6BCB2922-9D9F-4072-998A-3DA7668F73BF}"/>
-          </ac:cxnSpMkLst>
-        </pc:cxnChg>
-        <pc:cxnChg chg="add mod">
-          <ac:chgData name="Willy-Peter Schaub" userId="707b42e47e16ca84" providerId="LiveId" clId="{BCAB1FCD-C6E0-4904-9922-531ED0D800C6}" dt="2018-07-19T18:22:23.420" v="1443" actId="14100"/>
-          <ac:cxnSpMkLst>
-            <pc:docMk/>
-            <pc:sldMk cId="556094072" sldId="259"/>
-            <ac:cxnSpMk id="71" creationId="{DB35B8E3-2639-4460-86BE-67EE826D563A}"/>
-          </ac:cxnSpMkLst>
-        </pc:cxnChg>
-        <pc:cxnChg chg="add mod">
-          <ac:chgData name="Willy-Peter Schaub" userId="707b42e47e16ca84" providerId="LiveId" clId="{BCAB1FCD-C6E0-4904-9922-531ED0D800C6}" dt="2018-07-19T18:24:29.121" v="1485" actId="14100"/>
-          <ac:cxnSpMkLst>
-            <pc:docMk/>
-            <pc:sldMk cId="556094072" sldId="259"/>
-            <ac:cxnSpMk id="72" creationId="{21E8D17C-DEB6-4167-8715-C482260072ED}"/>
-          </ac:cxnSpMkLst>
-        </pc:cxnChg>
-        <pc:cxnChg chg="add mod">
-          <ac:chgData name="Willy-Peter Schaub" userId="707b42e47e16ca84" providerId="LiveId" clId="{BCAB1FCD-C6E0-4904-9922-531ED0D800C6}" dt="2018-07-19T18:21:42.580" v="1433" actId="1076"/>
-          <ac:cxnSpMkLst>
-            <pc:docMk/>
-            <pc:sldMk cId="556094072" sldId="259"/>
-            <ac:cxnSpMk id="75" creationId="{FE109AF0-05B7-4676-A368-D5EEED99764E}"/>
-          </ac:cxnSpMkLst>
-        </pc:cxnChg>
-        <pc:cxnChg chg="add mod">
-          <ac:chgData name="Willy-Peter Schaub" userId="707b42e47e16ca84" providerId="LiveId" clId="{BCAB1FCD-C6E0-4904-9922-531ED0D800C6}" dt="2018-07-19T18:25:50.857" v="1520" actId="14100"/>
-          <ac:cxnSpMkLst>
-            <pc:docMk/>
-            <pc:sldMk cId="556094072" sldId="259"/>
-            <ac:cxnSpMk id="94" creationId="{A7DA876C-71B2-4B13-A6FF-03676DE371E3}"/>
-          </ac:cxnSpMkLst>
-        </pc:cxnChg>
-        <pc:cxnChg chg="add del mod">
-          <ac:chgData name="Willy-Peter Schaub" userId="707b42e47e16ca84" providerId="LiveId" clId="{BCAB1FCD-C6E0-4904-9922-531ED0D800C6}" dt="2018-07-19T18:08:39.978" v="1348" actId="478"/>
-          <ac:cxnSpMkLst>
-            <pc:docMk/>
-            <pc:sldMk cId="556094072" sldId="259"/>
-            <ac:cxnSpMk id="109" creationId="{7EA27A68-CB9D-4144-A5A9-E298AE9BA3C9}"/>
-          </ac:cxnSpMkLst>
-        </pc:cxnChg>
-        <pc:cxnChg chg="add del mod">
-          <ac:chgData name="Willy-Peter Schaub" userId="707b42e47e16ca84" providerId="LiveId" clId="{BCAB1FCD-C6E0-4904-9922-531ED0D800C6}" dt="2018-07-19T18:08:39.078" v="1347" actId="478"/>
-          <ac:cxnSpMkLst>
-            <pc:docMk/>
-            <pc:sldMk cId="556094072" sldId="259"/>
-            <ac:cxnSpMk id="112" creationId="{91AB3A21-EA7A-4BFE-AD72-A2F240ADC324}"/>
-          </ac:cxnSpMkLst>
-        </pc:cxnChg>
-        <pc:cxnChg chg="add del mod">
-          <ac:chgData name="Willy-Peter Schaub" userId="707b42e47e16ca84" providerId="LiveId" clId="{BCAB1FCD-C6E0-4904-9922-531ED0D800C6}" dt="2018-07-19T18:08:38.662" v="1346" actId="478"/>
-          <ac:cxnSpMkLst>
-            <pc:docMk/>
-            <pc:sldMk cId="556094072" sldId="259"/>
-            <ac:cxnSpMk id="115" creationId="{663A225A-BAD0-4FDC-B434-80BAF1C22A54}"/>
-          </ac:cxnSpMkLst>
-        </pc:cxnChg>
-        <pc:cxnChg chg="add del mod">
-          <ac:chgData name="Willy-Peter Schaub" userId="707b42e47e16ca84" providerId="LiveId" clId="{BCAB1FCD-C6E0-4904-9922-531ED0D800C6}" dt="2018-07-19T18:08:36.897" v="1345" actId="478"/>
-          <ac:cxnSpMkLst>
-            <pc:docMk/>
-            <pc:sldMk cId="556094072" sldId="259"/>
-            <ac:cxnSpMk id="118" creationId="{3F65CEE1-5A1C-47D6-8346-409ABE32E4F4}"/>
-          </ac:cxnSpMkLst>
-        </pc:cxnChg>
-        <pc:cxnChg chg="add mod">
-          <ac:chgData name="Willy-Peter Schaub" userId="707b42e47e16ca84" providerId="LiveId" clId="{BCAB1FCD-C6E0-4904-9922-531ED0D800C6}" dt="2018-07-19T18:10:11.093" v="1402" actId="12788"/>
-          <ac:cxnSpMkLst>
-            <pc:docMk/>
-            <pc:sldMk cId="556094072" sldId="259"/>
-            <ac:cxnSpMk id="123" creationId="{722695FF-DB0A-4BD1-8F3C-B4D9AE83C671}"/>
-          </ac:cxnSpMkLst>
-        </pc:cxnChg>
-        <pc:cxnChg chg="add mod">
-          <ac:chgData name="Willy-Peter Schaub" userId="707b42e47e16ca84" providerId="LiveId" clId="{BCAB1FCD-C6E0-4904-9922-531ED0D800C6}" dt="2018-07-19T18:10:11.093" v="1402" actId="12788"/>
-          <ac:cxnSpMkLst>
-            <pc:docMk/>
-            <pc:sldMk cId="556094072" sldId="259"/>
-            <ac:cxnSpMk id="124" creationId="{AB9A135F-54AE-4FFD-A18C-633C3FCF919D}"/>
-          </ac:cxnSpMkLst>
-        </pc:cxnChg>
-        <pc:cxnChg chg="add mod">
-          <ac:chgData name="Willy-Peter Schaub" userId="707b42e47e16ca84" providerId="LiveId" clId="{BCAB1FCD-C6E0-4904-9922-531ED0D800C6}" dt="2018-07-19T18:10:11.093" v="1402" actId="12788"/>
-          <ac:cxnSpMkLst>
-            <pc:docMk/>
-            <pc:sldMk cId="556094072" sldId="259"/>
-            <ac:cxnSpMk id="127" creationId="{BD44C4E1-FEB2-4165-8C28-E756F14486AF}"/>
-          </ac:cxnSpMkLst>
-        </pc:cxnChg>
-        <pc:cxnChg chg="add mod">
-          <ac:chgData name="Willy-Peter Schaub" userId="707b42e47e16ca84" providerId="LiveId" clId="{BCAB1FCD-C6E0-4904-9922-531ED0D800C6}" dt="2018-07-19T18:10:11.093" v="1402" actId="12788"/>
-          <ac:cxnSpMkLst>
-            <pc:docMk/>
-            <pc:sldMk cId="556094072" sldId="259"/>
-            <ac:cxnSpMk id="130" creationId="{D3F13F2F-30E8-4882-AA5C-BC8711B9CDD8}"/>
-          </ac:cxnSpMkLst>
-        </pc:cxnChg>
-        <pc:cxnChg chg="add mod">
-          <ac:chgData name="Willy-Peter Schaub" userId="707b42e47e16ca84" providerId="LiveId" clId="{BCAB1FCD-C6E0-4904-9922-531ED0D800C6}" dt="2018-07-19T18:10:11.093" v="1402" actId="12788"/>
-          <ac:cxnSpMkLst>
-            <pc:docMk/>
-            <pc:sldMk cId="556094072" sldId="259"/>
-            <ac:cxnSpMk id="133" creationId="{57DE662A-4A15-4FC6-A09F-062CAA56A7C6}"/>
-          </ac:cxnSpMkLst>
-        </pc:cxnChg>
-        <pc:cxnChg chg="add mod">
-          <ac:chgData name="Willy-Peter Schaub" userId="707b42e47e16ca84" providerId="LiveId" clId="{BCAB1FCD-C6E0-4904-9922-531ED0D800C6}" dt="2018-07-19T18:10:11.093" v="1402" actId="12788"/>
-          <ac:cxnSpMkLst>
-            <pc:docMk/>
-            <pc:sldMk cId="556094072" sldId="259"/>
-            <ac:cxnSpMk id="136" creationId="{76F8C607-D9B3-4E4B-874D-D43664C7F8A7}"/>
-          </ac:cxnSpMkLst>
-        </pc:cxnChg>
-        <pc:cxnChg chg="add mod">
-          <ac:chgData name="Willy-Peter Schaub" userId="707b42e47e16ca84" providerId="LiveId" clId="{BCAB1FCD-C6E0-4904-9922-531ED0D800C6}" dt="2018-07-19T18:10:11.093" v="1402" actId="12788"/>
-          <ac:cxnSpMkLst>
-            <pc:docMk/>
-            <pc:sldMk cId="556094072" sldId="259"/>
-            <ac:cxnSpMk id="139" creationId="{1FABCA5A-90D9-48CA-BEB7-9494B078697C}"/>
-          </ac:cxnSpMkLst>
-        </pc:cxnChg>
-        <pc:cxnChg chg="add mod">
-          <ac:chgData name="Willy-Peter Schaub" userId="707b42e47e16ca84" providerId="LiveId" clId="{BCAB1FCD-C6E0-4904-9922-531ED0D800C6}" dt="2018-07-19T18:10:11.093" v="1402" actId="12788"/>
-          <ac:cxnSpMkLst>
-            <pc:docMk/>
-            <pc:sldMk cId="556094072" sldId="259"/>
-            <ac:cxnSpMk id="142" creationId="{86C0FD01-989D-4110-9492-3EE0B249988F}"/>
-          </ac:cxnSpMkLst>
-        </pc:cxnChg>
-        <pc:cxnChg chg="add mod">
-          <ac:chgData name="Willy-Peter Schaub" userId="707b42e47e16ca84" providerId="LiveId" clId="{BCAB1FCD-C6E0-4904-9922-531ED0D800C6}" dt="2018-07-19T18:13:15.894" v="1425" actId="692"/>
-          <ac:cxnSpMkLst>
-            <pc:docMk/>
-            <pc:sldMk cId="556094072" sldId="259"/>
-            <ac:cxnSpMk id="156" creationId="{5E13D01A-D69F-48D2-9E2C-668C7E261C14}"/>
-          </ac:cxnSpMkLst>
-        </pc:cxnChg>
       </pc:sldChg>
     </pc:docChg>
   </pc:docChgLst>
@@ -1546,7 +312,7 @@
           <a:p>
             <a:fld id="{CC509A15-3992-46FA-B277-442CE81F42DA}" type="datetimeFigureOut">
               <a:rPr lang="en-CA" smtClean="0"/>
-              <a:t>2018-07-19</a:t>
+              <a:t>2019-04-24</a:t>
             </a:fld>
             <a:endParaRPr lang="en-CA"/>
           </a:p>
@@ -1746,7 +512,7 @@
           <a:p>
             <a:fld id="{CC509A15-3992-46FA-B277-442CE81F42DA}" type="datetimeFigureOut">
               <a:rPr lang="en-CA" smtClean="0"/>
-              <a:t>2018-07-19</a:t>
+              <a:t>2019-04-24</a:t>
             </a:fld>
             <a:endParaRPr lang="en-CA"/>
           </a:p>
@@ -1956,7 +722,7 @@
           <a:p>
             <a:fld id="{CC509A15-3992-46FA-B277-442CE81F42DA}" type="datetimeFigureOut">
               <a:rPr lang="en-CA" smtClean="0"/>
-              <a:t>2018-07-19</a:t>
+              <a:t>2019-04-24</a:t>
             </a:fld>
             <a:endParaRPr lang="en-CA"/>
           </a:p>
@@ -2156,7 +922,7 @@
           <a:p>
             <a:fld id="{CC509A15-3992-46FA-B277-442CE81F42DA}" type="datetimeFigureOut">
               <a:rPr lang="en-CA" smtClean="0"/>
-              <a:t>2018-07-19</a:t>
+              <a:t>2019-04-24</a:t>
             </a:fld>
             <a:endParaRPr lang="en-CA"/>
           </a:p>
@@ -2432,7 +1198,7 @@
           <a:p>
             <a:fld id="{CC509A15-3992-46FA-B277-442CE81F42DA}" type="datetimeFigureOut">
               <a:rPr lang="en-CA" smtClean="0"/>
-              <a:t>2018-07-19</a:t>
+              <a:t>2019-04-24</a:t>
             </a:fld>
             <a:endParaRPr lang="en-CA"/>
           </a:p>
@@ -2700,7 +1466,7 @@
           <a:p>
             <a:fld id="{CC509A15-3992-46FA-B277-442CE81F42DA}" type="datetimeFigureOut">
               <a:rPr lang="en-CA" smtClean="0"/>
-              <a:t>2018-07-19</a:t>
+              <a:t>2019-04-24</a:t>
             </a:fld>
             <a:endParaRPr lang="en-CA"/>
           </a:p>
@@ -3115,7 +1881,7 @@
           <a:p>
             <a:fld id="{CC509A15-3992-46FA-B277-442CE81F42DA}" type="datetimeFigureOut">
               <a:rPr lang="en-CA" smtClean="0"/>
-              <a:t>2018-07-19</a:t>
+              <a:t>2019-04-24</a:t>
             </a:fld>
             <a:endParaRPr lang="en-CA"/>
           </a:p>
@@ -3257,7 +2023,7 @@
           <a:p>
             <a:fld id="{CC509A15-3992-46FA-B277-442CE81F42DA}" type="datetimeFigureOut">
               <a:rPr lang="en-CA" smtClean="0"/>
-              <a:t>2018-07-19</a:t>
+              <a:t>2019-04-24</a:t>
             </a:fld>
             <a:endParaRPr lang="en-CA"/>
           </a:p>
@@ -3370,7 +2136,7 @@
           <a:p>
             <a:fld id="{CC509A15-3992-46FA-B277-442CE81F42DA}" type="datetimeFigureOut">
               <a:rPr lang="en-CA" smtClean="0"/>
-              <a:t>2018-07-19</a:t>
+              <a:t>2019-04-24</a:t>
             </a:fld>
             <a:endParaRPr lang="en-CA"/>
           </a:p>
@@ -3683,7 +2449,7 @@
           <a:p>
             <a:fld id="{CC509A15-3992-46FA-B277-442CE81F42DA}" type="datetimeFigureOut">
               <a:rPr lang="en-CA" smtClean="0"/>
-              <a:t>2018-07-19</a:t>
+              <a:t>2019-04-24</a:t>
             </a:fld>
             <a:endParaRPr lang="en-CA"/>
           </a:p>
@@ -3972,7 +2738,7 @@
           <a:p>
             <a:fld id="{CC509A15-3992-46FA-B277-442CE81F42DA}" type="datetimeFigureOut">
               <a:rPr lang="en-CA" smtClean="0"/>
-              <a:t>2018-07-19</a:t>
+              <a:t>2019-04-24</a:t>
             </a:fld>
             <a:endParaRPr lang="en-CA"/>
           </a:p>
@@ -4215,7 +2981,7 @@
           <a:p>
             <a:fld id="{CC509A15-3992-46FA-B277-442CE81F42DA}" type="datetimeFigureOut">
               <a:rPr lang="en-CA" smtClean="0"/>
-              <a:t>2018-07-19</a:t>
+              <a:t>2019-04-24</a:t>
             </a:fld>
             <a:endParaRPr lang="en-CA"/>
           </a:p>
@@ -8221,8 +6987,8 @@
         </p:nvSpPr>
         <p:spPr>
           <a:xfrm>
-            <a:off x="10134430" y="2798314"/>
-            <a:ext cx="1450717" cy="923330"/>
+            <a:off x="10161583" y="2951257"/>
+            <a:ext cx="1396408" cy="646331"/>
           </a:xfrm>
           <a:prstGeom prst="rect">
             <a:avLst/>
@@ -8234,18 +7000,6 @@
             <a:spAutoFit/>
           </a:bodyPr>
           <a:lstStyle/>
-          <a:p>
-            <a:pPr algn="ctr"/>
-            <a:r>
-              <a:rPr lang="en-CA" dirty="0">
-                <a:solidFill>
-                  <a:srgbClr val="0070C0"/>
-                </a:solidFill>
-                <a:cs typeface="Segoe UI Light" panose="020B0502040204020203" pitchFamily="34" charset="0"/>
-              </a:rPr>
-              <a:t>TFS</a:t>
-            </a:r>
-          </a:p>
           <a:p>
             <a:pPr algn="ctr"/>
             <a:r>
@@ -8287,9 +7041,9 @@
         <p:grpSpPr>
           <a:xfrm>
             <a:off x="8716122" y="4045705"/>
-            <a:ext cx="2789196" cy="1042726"/>
+            <a:ext cx="2776947" cy="1042726"/>
             <a:chOff x="8725418" y="3430723"/>
-            <a:chExt cx="2789196" cy="1042726"/>
+            <a:chExt cx="2776947" cy="1042726"/>
           </a:xfrm>
         </p:grpSpPr>
         <p:sp>
@@ -8306,8 +7060,8 @@
           </p:nvSpPr>
           <p:spPr>
             <a:xfrm>
-              <a:off x="10204961" y="3490421"/>
-              <a:ext cx="1309653" cy="923330"/>
+              <a:off x="10235800" y="3634220"/>
+              <a:ext cx="1266565" cy="646331"/>
             </a:xfrm>
             <a:prstGeom prst="rect">
               <a:avLst/>
@@ -8319,18 +7073,6 @@
               <a:spAutoFit/>
             </a:bodyPr>
             <a:lstStyle/>
-            <a:p>
-              <a:pPr algn="ctr"/>
-              <a:r>
-                <a:rPr lang="en-CA" dirty="0">
-                  <a:solidFill>
-                    <a:srgbClr val="0070C0"/>
-                  </a:solidFill>
-                  <a:cs typeface="Segoe UI Light" panose="020B0502040204020203" pitchFamily="34" charset="0"/>
-                </a:rPr>
-                <a:t>TFS</a:t>
-              </a:r>
-            </a:p>
             <a:p>
               <a:pPr algn="ctr"/>
               <a:r>
@@ -8451,9 +7193,9 @@
         <p:grpSpPr>
           <a:xfrm>
             <a:off x="8725418" y="5307535"/>
-            <a:ext cx="2823661" cy="1046222"/>
+            <a:ext cx="2813336" cy="1046222"/>
             <a:chOff x="8725418" y="5307535"/>
-            <a:chExt cx="2823661" cy="1046222"/>
+            <a:chExt cx="2813336" cy="1046222"/>
           </a:xfrm>
         </p:grpSpPr>
         <p:sp>
@@ -8470,8 +7212,8 @@
           </p:nvSpPr>
           <p:spPr>
             <a:xfrm>
-              <a:off x="10170496" y="5397177"/>
-              <a:ext cx="1378583" cy="923330"/>
+              <a:off x="10180818" y="5481314"/>
+              <a:ext cx="1357936" cy="646331"/>
             </a:xfrm>
             <a:prstGeom prst="rect">
               <a:avLst/>
@@ -8483,18 +7225,6 @@
               <a:spAutoFit/>
             </a:bodyPr>
             <a:lstStyle/>
-            <a:p>
-              <a:pPr algn="ctr"/>
-              <a:r>
-                <a:rPr lang="en-CA" dirty="0">
-                  <a:solidFill>
-                    <a:srgbClr val="0070C0"/>
-                  </a:solidFill>
-                  <a:cs typeface="Segoe UI Light" panose="020B0502040204020203" pitchFamily="34" charset="0"/>
-                </a:rPr>
-                <a:t>TFS</a:t>
-              </a:r>
-            </a:p>
             <a:p>
               <a:pPr algn="ctr"/>
               <a:r>

</xml_diff>